<commit_message>
Changed the Abstract Factory, so now the concrete classes don't set the ivars, instead the abstract class handles that, meaning that there is only one place to make changes
</commit_message>
<xml_diff>
--- a/Other Files/Factories.pptx
+++ b/Other Files/Factories.pptx
@@ -254,7 +254,7 @@
               <a:pPr>
                 <a:defRPr/>
               </a:pPr>
-              <a:t>27/08/2014</a:t>
+              <a:t>23/09/2014</a:t>
             </a:fld>
             <a:endParaRPr lang="en-US"/>
           </a:p>
@@ -457,7 +457,7 @@
               <a:pPr>
                 <a:defRPr/>
               </a:pPr>
-              <a:t>27/08/2014</a:t>
+              <a:t>23/09/2014</a:t>
             </a:fld>
             <a:endParaRPr lang="en-US"/>
           </a:p>
@@ -1869,7 +1869,7 @@
             <a:fld id="{5430FA34-CEAD-4CAB-BC8B-561C252A95F7}" type="datetimeFigureOut">
               <a:rPr lang="en-IE" altLang="en-US"/>
               <a:pPr/>
-              <a:t>27/08/2014</a:t>
+              <a:t>23/09/2014</a:t>
             </a:fld>
             <a:endParaRPr lang="en-IE" altLang="en-US"/>
           </a:p>
@@ -2571,7 +2571,7 @@
           <a:p>
             <a:r>
               <a:rPr lang="en-IE" sz="2000" dirty="0" smtClean="0"/>
-              <a:t>22/08/14</a:t>
+              <a:t>25/09/14</a:t>
             </a:r>
             <a:endParaRPr lang="en-IE" sz="2000" dirty="0"/>
           </a:p>
@@ -2897,15 +2897,7 @@
           <a:p>
             <a:r>
               <a:rPr lang="en-IE" dirty="0" smtClean="0"/>
-              <a:t>The Abstract </a:t>
-            </a:r>
-            <a:r>
-              <a:rPr lang="en-IE" dirty="0" smtClean="0"/>
-              <a:t>Factory </a:t>
-            </a:r>
-            <a:r>
-              <a:rPr lang="en-IE" dirty="0" smtClean="0"/>
-              <a:t>Pattern</a:t>
+              <a:t>The Abstract Factory Pattern</a:t>
             </a:r>
             <a:endParaRPr lang="en-IE" dirty="0"/>
           </a:p>
@@ -2937,8 +2929,38 @@
             </a:pPr>
             <a:r>
               <a:rPr lang="en-IE" dirty="0" smtClean="0"/>
-              <a:t>Used if you have families of products that need to be created.</a:t>
-            </a:r>
+              <a:t>Used if you </a:t>
+            </a:r>
+            <a:r>
+              <a:rPr lang="en-IE" dirty="0" smtClean="0"/>
+              <a:t>need to create objects using specific families </a:t>
+            </a:r>
+            <a:r>
+              <a:rPr lang="en-IE" dirty="0" smtClean="0"/>
+              <a:t>of </a:t>
+            </a:r>
+            <a:r>
+              <a:rPr lang="en-IE" dirty="0" smtClean="0"/>
+              <a:t>products.</a:t>
+            </a:r>
+          </a:p>
+          <a:p>
+            <a:pPr marL="0" indent="0">
+              <a:buNone/>
+            </a:pPr>
+            <a:r>
+              <a:rPr lang="en-IE" dirty="0"/>
+              <a:t>	</a:t>
+            </a:r>
+            <a:r>
+              <a:rPr lang="en-IE" dirty="0" err="1" smtClean="0"/>
+              <a:t>ie</a:t>
+            </a:r>
+            <a:r>
+              <a:rPr lang="en-IE" dirty="0" smtClean="0"/>
+              <a:t>, create a pizza using a specific set of ingredients.</a:t>
+            </a:r>
+            <a:endParaRPr lang="en-IE" dirty="0" smtClean="0"/>
           </a:p>
           <a:p>
             <a:pPr marL="0" indent="0">
@@ -2953,8 +2975,40 @@
             </a:pPr>
             <a:r>
               <a:rPr lang="en-IE" dirty="0" smtClean="0"/>
-              <a:t>Ensures that clients create products that belong together.</a:t>
-            </a:r>
+              <a:t>Ensures that clients create products that belong together</a:t>
+            </a:r>
+            <a:r>
+              <a:rPr lang="en-IE" dirty="0" smtClean="0"/>
+              <a:t>.</a:t>
+            </a:r>
+          </a:p>
+          <a:p>
+            <a:pPr marL="0" indent="0">
+              <a:buNone/>
+            </a:pPr>
+            <a:r>
+              <a:rPr lang="en-IE" dirty="0" smtClean="0"/>
+              <a:t>	</a:t>
+            </a:r>
+            <a:r>
+              <a:rPr lang="en-IE" dirty="0" err="1" smtClean="0"/>
+              <a:t>ie</a:t>
+            </a:r>
+            <a:r>
+              <a:rPr lang="en-IE" dirty="0" smtClean="0"/>
+              <a:t>, an ingredient factory will produce a specific set of ingredient.</a:t>
+            </a:r>
+          </a:p>
+          <a:p>
+            <a:pPr marL="0" indent="0">
+              <a:buNone/>
+            </a:pPr>
+            <a:endParaRPr lang="en-IE" dirty="0"/>
+          </a:p>
+          <a:p>
+            <a:pPr marL="0" indent="0">
+              <a:buNone/>
+            </a:pPr>
             <a:endParaRPr lang="en-IE" dirty="0"/>
           </a:p>
         </p:txBody>
@@ -3217,12 +3271,39 @@
           <a:bodyPr/>
           <a:lstStyle/>
           <a:p>
+            <a:pPr marL="0" indent="0" algn="ctr">
+              <a:buNone/>
+            </a:pPr>
+            <a:r>
+              <a:rPr lang="en-IE" sz="2800" dirty="0"/>
+              <a:t>Factories provide a way of </a:t>
+            </a:r>
+            <a:r>
+              <a:rPr lang="en-IE" sz="2800" b="1" dirty="0"/>
+              <a:t>decoupling object instantiation code </a:t>
+            </a:r>
+            <a:r>
+              <a:rPr lang="en-IE" sz="2800" dirty="0"/>
+              <a:t>away from client classes, and encapsulate that code into its own class. </a:t>
+            </a:r>
+          </a:p>
+          <a:p>
             <a:pPr marL="0" indent="0">
               <a:buNone/>
             </a:pPr>
+            <a:endParaRPr lang="en-IE" sz="2000" b="1" dirty="0" smtClean="0"/>
+          </a:p>
+          <a:p>
+            <a:pPr marL="0" indent="0">
+              <a:buNone/>
+            </a:pPr>
             <a:r>
               <a:rPr lang="en-IE" sz="2000" b="1" dirty="0" smtClean="0"/>
-              <a:t>Why Would You Use a Factory?</a:t>
+              <a:t>Why </a:t>
+            </a:r>
+            <a:r>
+              <a:rPr lang="en-IE" sz="2000" b="1" dirty="0" smtClean="0"/>
+              <a:t>Would You Use a Factory?</a:t>
             </a:r>
             <a:endParaRPr lang="en-IE" sz="2000" b="1" dirty="0"/>
           </a:p>
@@ -3232,21 +3313,15 @@
           <a:p>
             <a:r>
               <a:rPr lang="en-IE" sz="2000" dirty="0"/>
-              <a:t>Factories provide a way of decoupling object instantiation code away from client </a:t>
-            </a:r>
-            <a:r>
-              <a:rPr lang="en-IE" sz="2000" dirty="0" smtClean="0"/>
-              <a:t>classes, and encapsulate that code into its own class. </a:t>
-            </a:r>
-            <a:endParaRPr lang="en-IE" sz="2000" dirty="0" smtClean="0"/>
-          </a:p>
-          <a:p>
-            <a:endParaRPr lang="en-IE" sz="2000" dirty="0"/>
-          </a:p>
-          <a:p>
-            <a:r>
-              <a:rPr lang="en-IE" sz="2000" dirty="0"/>
-              <a:t>Allows several classes to be clients of your factory, creating a one to many relationship.  This centralises the code</a:t>
+              <a:t>If you need to </a:t>
+            </a:r>
+            <a:r>
+              <a:rPr lang="en-IE" sz="2000" b="1" dirty="0"/>
+              <a:t>create one of several possible classes that share a common </a:t>
+            </a:r>
+            <a:r>
+              <a:rPr lang="en-IE" sz="2000" b="1" dirty="0" smtClean="0"/>
+              <a:t>interface</a:t>
             </a:r>
             <a:r>
               <a:rPr lang="en-IE" sz="2000" dirty="0" smtClean="0"/>
@@ -3255,21 +3330,48 @@
             <a:endParaRPr lang="en-IE" sz="2000" dirty="0"/>
           </a:p>
           <a:p>
-            <a:endParaRPr lang="en-IE" sz="2000" dirty="0" smtClean="0"/>
-          </a:p>
-          <a:p>
+            <a:pPr marL="0" indent="0">
+              <a:buNone/>
+            </a:pPr>
+            <a:endParaRPr lang="en-IE" sz="2000" dirty="0"/>
+          </a:p>
+          <a:p>
+            <a:r>
+              <a:rPr lang="en-IE" sz="2000" dirty="0"/>
+              <a:t>Allows several classes to be </a:t>
+            </a:r>
+            <a:r>
+              <a:rPr lang="en-IE" sz="2000" b="1" dirty="0"/>
+              <a:t>clients of your factory</a:t>
+            </a:r>
+            <a:r>
+              <a:rPr lang="en-IE" sz="2000" dirty="0"/>
+              <a:t>, creating a one to many relationship.  This centralises the code</a:t>
+            </a:r>
             <a:r>
               <a:rPr lang="en-IE" sz="2000" dirty="0" smtClean="0"/>
-              <a:t>If you need to create one of several possible classes that share a common interface, but don’t know which one until runtime.</a:t>
-            </a:r>
-          </a:p>
-          <a:p>
+              <a:t>.</a:t>
+            </a:r>
             <a:endParaRPr lang="en-IE" sz="2000" dirty="0"/>
           </a:p>
           <a:p>
+            <a:pPr marL="0" indent="0">
+              <a:buNone/>
+            </a:pPr>
+            <a:endParaRPr lang="en-IE" sz="2000" dirty="0"/>
+          </a:p>
+          <a:p>
             <a:r>
               <a:rPr lang="en-IE" sz="2000" dirty="0" smtClean="0"/>
-              <a:t>Makes it possible to choose which object to instantiate at runtime.</a:t>
+              <a:t>Makes it possible to </a:t>
+            </a:r>
+            <a:r>
+              <a:rPr lang="en-IE" sz="2000" b="1" dirty="0" smtClean="0"/>
+              <a:t>choose which object to instantiate at runtime</a:t>
+            </a:r>
+            <a:r>
+              <a:rPr lang="en-IE" sz="2000" dirty="0" smtClean="0"/>
+              <a:t>.</a:t>
             </a:r>
           </a:p>
           <a:p>
@@ -3410,6 +3512,8 @@
                 <a:solidFill>
                   <a:srgbClr val="00B050"/>
                 </a:solidFill>
+                <a:latin typeface="Consolas" panose="020B0609020204030204" pitchFamily="49" charset="0"/>
+                <a:cs typeface="Consolas" panose="020B0609020204030204" pitchFamily="49" charset="0"/>
               </a:rPr>
               <a:t>InterfaceType</a:t>
             </a:r>
@@ -3418,8 +3522,10 @@
                 <a:solidFill>
                   <a:srgbClr val="00B050"/>
                 </a:solidFill>
-              </a:rPr>
-              <a:t>* </a:t>
+                <a:latin typeface="Consolas" panose="020B0609020204030204" pitchFamily="49" charset="0"/>
+                <a:cs typeface="Consolas" panose="020B0609020204030204" pitchFamily="49" charset="0"/>
+              </a:rPr>
+              <a:t> *&lt;name&gt;  </a:t>
             </a:r>
             <a:r>
               <a:rPr lang="en-IE" sz="2000" b="1" dirty="0" err="1" smtClean="0">
@@ -3428,6 +3534,8 @@
                     <a:lumMod val="50000"/>
                   </a:schemeClr>
                 </a:solidFill>
+                <a:latin typeface="Consolas" panose="020B0609020204030204" pitchFamily="49" charset="0"/>
+                <a:cs typeface="Consolas" panose="020B0609020204030204" pitchFamily="49" charset="0"/>
               </a:rPr>
               <a:t>createObject</a:t>
             </a:r>
@@ -3438,6 +3546,8 @@
                     <a:lumMod val="50000"/>
                   </a:schemeClr>
                 </a:solidFill>
+                <a:latin typeface="Consolas" panose="020B0609020204030204" pitchFamily="49" charset="0"/>
+                <a:cs typeface="Consolas" panose="020B0609020204030204" pitchFamily="49" charset="0"/>
               </a:rPr>
               <a:t>(</a:t>
             </a:r>
@@ -3448,6 +3558,8 @@
                     <a:lumMod val="75000"/>
                   </a:schemeClr>
                 </a:solidFill>
+                <a:latin typeface="Consolas" panose="020B0609020204030204" pitchFamily="49" charset="0"/>
+                <a:cs typeface="Consolas" panose="020B0609020204030204" pitchFamily="49" charset="0"/>
               </a:rPr>
               <a:t>arg</a:t>
             </a:r>
@@ -3458,11 +3570,16 @@
                     <a:lumMod val="50000"/>
                   </a:schemeClr>
                 </a:solidFill>
+                <a:latin typeface="Consolas" panose="020B0609020204030204" pitchFamily="49" charset="0"/>
+                <a:cs typeface="Consolas" panose="020B0609020204030204" pitchFamily="49" charset="0"/>
               </a:rPr>
               <a:t>)</a:t>
             </a:r>
             <a:r>
-              <a:rPr lang="en-IE" sz="2000" dirty="0" smtClean="0"/>
+              <a:rPr lang="en-IE" sz="2000" dirty="0" smtClean="0">
+                <a:latin typeface="Consolas" panose="020B0609020204030204" pitchFamily="49" charset="0"/>
+                <a:cs typeface="Consolas" panose="020B0609020204030204" pitchFamily="49" charset="0"/>
+              </a:rPr>
               <a:t> </a:t>
             </a:r>
           </a:p>
@@ -5852,10 +5969,10 @@
         </p:nvGrpSpPr>
         <p:grpSpPr>
           <a:xfrm rot="20968962">
-            <a:off x="4813615" y="531263"/>
-            <a:ext cx="2535344" cy="2226846"/>
+            <a:off x="4370932" y="352347"/>
+            <a:ext cx="3423776" cy="2243666"/>
             <a:chOff x="5139388" y="1284960"/>
-            <a:chExt cx="1375712" cy="1700787"/>
+            <a:chExt cx="1386091" cy="1200368"/>
           </a:xfrm>
         </p:grpSpPr>
         <p:grpSp>
@@ -5866,10 +5983,10 @@
           </p:nvGrpSpPr>
           <p:grpSpPr>
             <a:xfrm>
-              <a:off x="5168900" y="1701801"/>
-              <a:ext cx="1346200" cy="1283946"/>
-              <a:chOff x="5168900" y="1701801"/>
-              <a:chExt cx="1346200" cy="1283946"/>
+              <a:off x="5179279" y="1504353"/>
+              <a:ext cx="1346200" cy="980975"/>
+              <a:chOff x="5179279" y="1504353"/>
+              <a:chExt cx="1346200" cy="980975"/>
             </a:xfrm>
           </p:grpSpPr>
           <p:sp>
@@ -5880,7 +5997,7 @@
             </p:nvSpPr>
             <p:spPr>
               <a:xfrm>
-                <a:off x="5168900" y="1701801"/>
+                <a:off x="5179279" y="1504353"/>
                 <a:ext cx="1346200" cy="980975"/>
               </a:xfrm>
               <a:prstGeom prst="rect">
@@ -5931,8 +6048,8 @@
             </p:nvSpPr>
             <p:spPr>
               <a:xfrm>
-                <a:off x="5174614" y="1739880"/>
-                <a:ext cx="1308104" cy="1245867"/>
+                <a:off x="5212776" y="1552993"/>
+                <a:ext cx="1308104" cy="839771"/>
               </a:xfrm>
               <a:prstGeom prst="rect">
                 <a:avLst/>
@@ -5949,21 +6066,21 @@
                   <a:buNone/>
                 </a:pPr>
                 <a:r>
-                  <a:rPr lang="en-IE" sz="1200" dirty="0" smtClean="0">
+                  <a:rPr lang="en-IE" sz="1600" dirty="0" smtClean="0">
                     <a:latin typeface="Consolas" panose="020B0609020204030204" pitchFamily="49" charset="0"/>
                     <a:cs typeface="Consolas" panose="020B0609020204030204" pitchFamily="49" charset="0"/>
                   </a:rPr>
                   <a:t>Duck</a:t>
                 </a:r>
                 <a:r>
-                  <a:rPr lang="en-IE" sz="1200" dirty="0">
+                  <a:rPr lang="en-IE" sz="1600" dirty="0">
                     <a:latin typeface="Consolas" panose="020B0609020204030204" pitchFamily="49" charset="0"/>
                     <a:cs typeface="Consolas" panose="020B0609020204030204" pitchFamily="49" charset="0"/>
                   </a:rPr>
                   <a:t>* duck</a:t>
                 </a:r>
                 <a:r>
-                  <a:rPr lang="en-IE" sz="1200" dirty="0" smtClean="0">
+                  <a:rPr lang="en-IE" sz="1600" dirty="0" smtClean="0">
                     <a:latin typeface="Consolas" panose="020B0609020204030204" pitchFamily="49" charset="0"/>
                     <a:cs typeface="Consolas" panose="020B0609020204030204" pitchFamily="49" charset="0"/>
                   </a:rPr>
@@ -5975,28 +6092,28 @@
                   <a:buNone/>
                 </a:pPr>
                 <a:r>
-                  <a:rPr lang="en-IE" sz="1200" dirty="0" err="1" smtClean="0">
+                  <a:rPr lang="en-IE" sz="1600" dirty="0" err="1" smtClean="0">
                     <a:latin typeface="Consolas" panose="020B0609020204030204" pitchFamily="49" charset="0"/>
                     <a:cs typeface="Consolas" panose="020B0609020204030204" pitchFamily="49" charset="0"/>
                   </a:rPr>
                   <a:t>DuckFactory</a:t>
                 </a:r>
                 <a:r>
-                  <a:rPr lang="en-IE" sz="1200" dirty="0" smtClean="0">
+                  <a:rPr lang="en-IE" sz="1600" dirty="0" smtClean="0">
                     <a:latin typeface="Consolas" panose="020B0609020204030204" pitchFamily="49" charset="0"/>
                     <a:cs typeface="Consolas" panose="020B0609020204030204" pitchFamily="49" charset="0"/>
                   </a:rPr>
                   <a:t> </a:t>
                 </a:r>
                 <a:r>
-                  <a:rPr lang="en-IE" sz="1200" dirty="0" err="1" smtClean="0">
+                  <a:rPr lang="en-IE" sz="1600" dirty="0" err="1" smtClean="0">
                     <a:latin typeface="Consolas" panose="020B0609020204030204" pitchFamily="49" charset="0"/>
                     <a:cs typeface="Consolas" panose="020B0609020204030204" pitchFamily="49" charset="0"/>
                   </a:rPr>
                   <a:t>df</a:t>
                 </a:r>
                 <a:r>
-                  <a:rPr lang="en-IE" sz="1200" dirty="0" smtClean="0">
+                  <a:rPr lang="en-IE" sz="1600" dirty="0" smtClean="0">
                     <a:latin typeface="Consolas" panose="020B0609020204030204" pitchFamily="49" charset="0"/>
                     <a:cs typeface="Consolas" panose="020B0609020204030204" pitchFamily="49" charset="0"/>
                   </a:rPr>
@@ -6008,21 +6125,21 @@
                   <a:buNone/>
                 </a:pPr>
                 <a:r>
-                  <a:rPr lang="en-IE" sz="1200" dirty="0" smtClean="0">
+                  <a:rPr lang="en-IE" sz="1600" dirty="0" smtClean="0">
                     <a:latin typeface="Consolas" panose="020B0609020204030204" pitchFamily="49" charset="0"/>
                     <a:cs typeface="Consolas" panose="020B0609020204030204" pitchFamily="49" charset="0"/>
                   </a:rPr>
                   <a:t>new </a:t>
                 </a:r>
                 <a:r>
-                  <a:rPr lang="en-IE" sz="1200" dirty="0" err="1" smtClean="0">
+                  <a:rPr lang="en-IE" sz="1600" dirty="0" err="1" smtClean="0">
                     <a:latin typeface="Consolas" panose="020B0609020204030204" pitchFamily="49" charset="0"/>
                     <a:cs typeface="Consolas" panose="020B0609020204030204" pitchFamily="49" charset="0"/>
                   </a:rPr>
                   <a:t>DuckFactory</a:t>
                 </a:r>
                 <a:r>
-                  <a:rPr lang="en-IE" sz="1200" dirty="0" smtClean="0">
+                  <a:rPr lang="en-IE" sz="1600" dirty="0" smtClean="0">
                     <a:latin typeface="Consolas" panose="020B0609020204030204" pitchFamily="49" charset="0"/>
                     <a:cs typeface="Consolas" panose="020B0609020204030204" pitchFamily="49" charset="0"/>
                   </a:rPr>
@@ -6033,7 +6150,7 @@
                 <a:pPr marL="0" indent="0">
                   <a:buNone/>
                 </a:pPr>
-                <a:endParaRPr lang="en-IE" sz="1200" dirty="0">
+                <a:endParaRPr lang="en-IE" sz="1600" dirty="0">
                   <a:latin typeface="Consolas" panose="020B0609020204030204" pitchFamily="49" charset="0"/>
                   <a:cs typeface="Consolas" panose="020B0609020204030204" pitchFamily="49" charset="0"/>
                 </a:endParaRPr>
@@ -6043,27 +6160,27 @@
                   <a:buNone/>
                 </a:pPr>
                 <a:r>
-                  <a:rPr lang="en-IE" sz="1200" dirty="0" smtClean="0">
+                  <a:rPr lang="en-IE" sz="1600" dirty="0" smtClean="0">
                     <a:latin typeface="Consolas" panose="020B0609020204030204" pitchFamily="49" charset="0"/>
                     <a:cs typeface="Consolas" panose="020B0609020204030204" pitchFamily="49" charset="0"/>
                   </a:rPr>
                   <a:t>Duck = </a:t>
                 </a:r>
                 <a:r>
-                  <a:rPr lang="en-IE" sz="1200" dirty="0" err="1" smtClean="0">
+                  <a:rPr lang="en-IE" sz="1600" dirty="0" err="1" smtClean="0">
                     <a:latin typeface="Consolas" panose="020B0609020204030204" pitchFamily="49" charset="0"/>
                     <a:cs typeface="Consolas" panose="020B0609020204030204" pitchFamily="49" charset="0"/>
                   </a:rPr>
                   <a:t>df.createDuck</a:t>
                 </a:r>
                 <a:r>
-                  <a:rPr lang="en-IE" sz="1200" dirty="0" smtClean="0">
+                  <a:rPr lang="en-IE" sz="1600" dirty="0" smtClean="0">
                     <a:latin typeface="Consolas" panose="020B0609020204030204" pitchFamily="49" charset="0"/>
                     <a:cs typeface="Consolas" panose="020B0609020204030204" pitchFamily="49" charset="0"/>
                   </a:rPr>
                   <a:t>(“Picnic”);</a:t>
                 </a:r>
-                <a:endParaRPr lang="en-IE" sz="1200" dirty="0">
+                <a:endParaRPr lang="en-IE" sz="1600" dirty="0">
                   <a:latin typeface="Consolas" panose="020B0609020204030204" pitchFamily="49" charset="0"/>
                   <a:cs typeface="Consolas" panose="020B0609020204030204" pitchFamily="49" charset="0"/>
                 </a:endParaRPr>
@@ -6126,275 +6243,13 @@
       </p:grpSp>
       <p:grpSp>
         <p:nvGrpSpPr>
-          <p:cNvPr id="9" name="Group 8"/>
-          <p:cNvGrpSpPr/>
-          <p:nvPr/>
-        </p:nvGrpSpPr>
-        <p:grpSpPr>
-          <a:xfrm rot="567057">
-            <a:off x="7297782" y="478741"/>
-            <a:ext cx="1259173" cy="1839316"/>
-            <a:chOff x="5168900" y="1277816"/>
-            <a:chExt cx="1346201" cy="2201984"/>
-          </a:xfrm>
-        </p:grpSpPr>
-        <p:grpSp>
-          <p:nvGrpSpPr>
-            <p:cNvPr id="10" name="Group 9"/>
-            <p:cNvGrpSpPr/>
-            <p:nvPr/>
-          </p:nvGrpSpPr>
-          <p:grpSpPr>
-            <a:xfrm>
-              <a:off x="5168900" y="1701800"/>
-              <a:ext cx="1346201" cy="1778000"/>
-              <a:chOff x="5168900" y="1701800"/>
-              <a:chExt cx="1346201" cy="1778000"/>
-            </a:xfrm>
-          </p:grpSpPr>
-          <p:sp>
-            <p:nvSpPr>
-              <p:cNvPr id="12" name="Rectangle 11"/>
-              <p:cNvSpPr/>
-              <p:nvPr/>
-            </p:nvSpPr>
-            <p:spPr>
-              <a:xfrm>
-                <a:off x="5168900" y="1701800"/>
-                <a:ext cx="1346200" cy="1778000"/>
-              </a:xfrm>
-              <a:prstGeom prst="rect">
-                <a:avLst/>
-              </a:prstGeom>
-              <a:gradFill>
-                <a:gsLst>
-                  <a:gs pos="0">
-                    <a:srgbClr val="FFE9A3"/>
-                  </a:gs>
-                  <a:gs pos="100000">
-                    <a:schemeClr val="accent6">
-                      <a:lumMod val="20000"/>
-                      <a:lumOff val="80000"/>
-                    </a:schemeClr>
-                  </a:gs>
-                </a:gsLst>
-              </a:gradFill>
-            </p:spPr>
-            <p:style>
-              <a:lnRef idx="1">
-                <a:schemeClr val="accent1"/>
-              </a:lnRef>
-              <a:fillRef idx="3">
-                <a:schemeClr val="accent1"/>
-              </a:fillRef>
-              <a:effectRef idx="2">
-                <a:schemeClr val="accent1"/>
-              </a:effectRef>
-              <a:fontRef idx="minor">
-                <a:schemeClr val="lt1"/>
-              </a:fontRef>
-            </p:style>
-            <p:txBody>
-              <a:bodyPr rtlCol="0" anchor="ctr"/>
-              <a:lstStyle/>
-              <a:p>
-                <a:pPr algn="ctr"/>
-                <a:endParaRPr lang="en-IE"/>
-              </a:p>
-            </p:txBody>
-          </p:sp>
-          <p:sp>
-            <p:nvSpPr>
-              <p:cNvPr id="13" name="TextBox 12"/>
-              <p:cNvSpPr txBox="1"/>
-              <p:nvPr/>
-            </p:nvSpPr>
-            <p:spPr>
-              <a:xfrm>
-                <a:off x="5207001" y="2064586"/>
-                <a:ext cx="1308100" cy="1289619"/>
-              </a:xfrm>
-              <a:prstGeom prst="rect">
-                <a:avLst/>
-              </a:prstGeom>
-              <a:noFill/>
-            </p:spPr>
-            <p:txBody>
-              <a:bodyPr wrap="square" rtlCol="0">
-                <a:spAutoFit/>
-              </a:bodyPr>
-              <a:lstStyle/>
-              <a:p>
-                <a:pPr marL="0" indent="0">
-                  <a:buNone/>
-                </a:pPr>
-                <a:r>
-                  <a:rPr lang="en-IE" sz="800" dirty="0">
-                    <a:latin typeface="Consolas" panose="020B0609020204030204" pitchFamily="49" charset="0"/>
-                    <a:cs typeface="Consolas" panose="020B0609020204030204" pitchFamily="49" charset="0"/>
-                  </a:rPr>
-                  <a:t>Duck* duck;</a:t>
-                </a:r>
-              </a:p>
-              <a:p>
-                <a:pPr marL="0" indent="0">
-                  <a:buNone/>
-                </a:pPr>
-                <a:r>
-                  <a:rPr lang="en-IE" sz="800" dirty="0" err="1">
-                    <a:latin typeface="Consolas" panose="020B0609020204030204" pitchFamily="49" charset="0"/>
-                    <a:cs typeface="Consolas" panose="020B0609020204030204" pitchFamily="49" charset="0"/>
-                  </a:rPr>
-                  <a:t>DuckFactory</a:t>
-                </a:r>
-                <a:r>
-                  <a:rPr lang="en-IE" sz="800" dirty="0">
-                    <a:latin typeface="Consolas" panose="020B0609020204030204" pitchFamily="49" charset="0"/>
-                    <a:cs typeface="Consolas" panose="020B0609020204030204" pitchFamily="49" charset="0"/>
-                  </a:rPr>
-                  <a:t> </a:t>
-                </a:r>
-                <a:r>
-                  <a:rPr lang="en-IE" sz="800" dirty="0" err="1">
-                    <a:latin typeface="Consolas" panose="020B0609020204030204" pitchFamily="49" charset="0"/>
-                    <a:cs typeface="Consolas" panose="020B0609020204030204" pitchFamily="49" charset="0"/>
-                  </a:rPr>
-                  <a:t>df</a:t>
-                </a:r>
-                <a:r>
-                  <a:rPr lang="en-IE" sz="800" dirty="0">
-                    <a:latin typeface="Consolas" panose="020B0609020204030204" pitchFamily="49" charset="0"/>
-                    <a:cs typeface="Consolas" panose="020B0609020204030204" pitchFamily="49" charset="0"/>
-                  </a:rPr>
-                  <a:t> = </a:t>
-                </a:r>
-              </a:p>
-              <a:p>
-                <a:pPr marL="0" indent="0">
-                  <a:buNone/>
-                </a:pPr>
-                <a:r>
-                  <a:rPr lang="en-IE" sz="800" dirty="0">
-                    <a:latin typeface="Consolas" panose="020B0609020204030204" pitchFamily="49" charset="0"/>
-                    <a:cs typeface="Consolas" panose="020B0609020204030204" pitchFamily="49" charset="0"/>
-                  </a:rPr>
-                  <a:t>new </a:t>
-                </a:r>
-                <a:r>
-                  <a:rPr lang="en-IE" sz="800" dirty="0" err="1">
-                    <a:latin typeface="Consolas" panose="020B0609020204030204" pitchFamily="49" charset="0"/>
-                    <a:cs typeface="Consolas" panose="020B0609020204030204" pitchFamily="49" charset="0"/>
-                  </a:rPr>
-                  <a:t>DuckFactory</a:t>
-                </a:r>
-                <a:r>
-                  <a:rPr lang="en-IE" sz="800" dirty="0">
-                    <a:latin typeface="Consolas" panose="020B0609020204030204" pitchFamily="49" charset="0"/>
-                    <a:cs typeface="Consolas" panose="020B0609020204030204" pitchFamily="49" charset="0"/>
-                  </a:rPr>
-                  <a:t>();</a:t>
-                </a:r>
-              </a:p>
-              <a:p>
-                <a:pPr marL="0" indent="0">
-                  <a:buNone/>
-                </a:pPr>
-                <a:endParaRPr lang="en-IE" sz="800" dirty="0">
-                  <a:latin typeface="Consolas" panose="020B0609020204030204" pitchFamily="49" charset="0"/>
-                  <a:cs typeface="Consolas" panose="020B0609020204030204" pitchFamily="49" charset="0"/>
-                </a:endParaRPr>
-              </a:p>
-              <a:p>
-                <a:pPr marL="0" indent="0">
-                  <a:buNone/>
-                </a:pPr>
-                <a:r>
-                  <a:rPr lang="en-IE" sz="800" dirty="0">
-                    <a:latin typeface="Consolas" panose="020B0609020204030204" pitchFamily="49" charset="0"/>
-                    <a:cs typeface="Consolas" panose="020B0609020204030204" pitchFamily="49" charset="0"/>
-                  </a:rPr>
-                  <a:t>Duck = </a:t>
-                </a:r>
-                <a:r>
-                  <a:rPr lang="en-IE" sz="800" dirty="0" err="1">
-                    <a:latin typeface="Consolas" panose="020B0609020204030204" pitchFamily="49" charset="0"/>
-                    <a:cs typeface="Consolas" panose="020B0609020204030204" pitchFamily="49" charset="0"/>
-                  </a:rPr>
-                  <a:t>df.createDuck</a:t>
-                </a:r>
-                <a:r>
-                  <a:rPr lang="en-IE" sz="800" dirty="0">
-                    <a:latin typeface="Consolas" panose="020B0609020204030204" pitchFamily="49" charset="0"/>
-                    <a:cs typeface="Consolas" panose="020B0609020204030204" pitchFamily="49" charset="0"/>
-                  </a:rPr>
-                  <a:t>();</a:t>
-                </a:r>
-              </a:p>
-              <a:p>
-                <a:endParaRPr lang="en-IE" sz="800" dirty="0"/>
-              </a:p>
-              <a:p>
-                <a:endParaRPr lang="en-IE" sz="800" dirty="0"/>
-              </a:p>
-            </p:txBody>
-          </p:sp>
-        </p:grpSp>
-        <p:sp>
-          <p:nvSpPr>
-            <p:cNvPr id="11" name="TextBox 10"/>
-            <p:cNvSpPr txBox="1"/>
-            <p:nvPr/>
-          </p:nvSpPr>
-          <p:spPr>
-            <a:xfrm>
-              <a:off x="5186939" y="1277816"/>
-              <a:ext cx="1308100" cy="331616"/>
-            </a:xfrm>
-            <a:prstGeom prst="rect">
-              <a:avLst/>
-            </a:prstGeom>
-            <a:noFill/>
-          </p:spPr>
-          <p:txBody>
-            <a:bodyPr wrap="square" rtlCol="0">
-              <a:spAutoFit/>
-            </a:bodyPr>
-            <a:lstStyle/>
-            <a:p>
-              <a:r>
-                <a:rPr lang="en-IE" sz="1200" b="1" dirty="0" err="1" smtClean="0">
-                  <a:solidFill>
-                    <a:srgbClr val="00B050"/>
-                  </a:solidFill>
-                </a:rPr>
-                <a:t>DuckShop</a:t>
-              </a:r>
-              <a:r>
-                <a:rPr lang="en-IE" sz="1200" b="1" dirty="0" smtClean="0">
-                  <a:solidFill>
-                    <a:srgbClr val="00B050"/>
-                  </a:solidFill>
-                </a:rPr>
-                <a:t> Class</a:t>
-              </a:r>
-              <a:endParaRPr lang="en-IE" sz="1200" b="1" dirty="0">
-                <a:solidFill>
-                  <a:srgbClr val="00B050"/>
-                </a:solidFill>
-              </a:endParaRPr>
-            </a:p>
-          </p:txBody>
-        </p:sp>
-      </p:grpSp>
-      <p:grpSp>
-        <p:nvGrpSpPr>
           <p:cNvPr id="14" name="Group 13"/>
           <p:cNvGrpSpPr/>
           <p:nvPr/>
         </p:nvGrpSpPr>
         <p:grpSpPr>
           <a:xfrm>
-            <a:off x="6531346" y="2966563"/>
+            <a:off x="6988546" y="3068163"/>
             <a:ext cx="1259173" cy="2143784"/>
             <a:chOff x="5168900" y="1156184"/>
             <a:chExt cx="1346201" cy="2566484"/>
@@ -6717,13 +6572,16 @@
       <p:cxnSp>
         <p:nvCxnSpPr>
           <p:cNvPr id="22" name="Straight Arrow Connector 21"/>
-          <p:cNvCxnSpPr/>
+          <p:cNvCxnSpPr>
+            <a:stCxn id="7" idx="2"/>
+            <a:endCxn id="16" idx="1"/>
+          </p:cNvCxnSpPr>
           <p:nvPr/>
         </p:nvCxnSpPr>
         <p:spPr>
           <a:xfrm>
-            <a:off x="7021475" y="2358154"/>
-            <a:ext cx="0" cy="572819"/>
+            <a:off x="6336031" y="2568174"/>
+            <a:ext cx="669388" cy="730822"/>
           </a:xfrm>
           <a:prstGeom prst="straightConnector1">
             <a:avLst/>
@@ -6780,6 +6638,306 @@
           </a:p>
         </p:txBody>
       </p:sp>
+      <p:grpSp>
+        <p:nvGrpSpPr>
+          <p:cNvPr id="9" name="Group 8"/>
+          <p:cNvGrpSpPr/>
+          <p:nvPr/>
+        </p:nvGrpSpPr>
+        <p:grpSpPr>
+          <a:xfrm rot="567057">
+            <a:off x="7704182" y="478741"/>
+            <a:ext cx="1259173" cy="1839316"/>
+            <a:chOff x="5168900" y="1277816"/>
+            <a:chExt cx="1346201" cy="2201984"/>
+          </a:xfrm>
+        </p:grpSpPr>
+        <p:grpSp>
+          <p:nvGrpSpPr>
+            <p:cNvPr id="10" name="Group 9"/>
+            <p:cNvGrpSpPr/>
+            <p:nvPr/>
+          </p:nvGrpSpPr>
+          <p:grpSpPr>
+            <a:xfrm>
+              <a:off x="5168900" y="1701800"/>
+              <a:ext cx="1346201" cy="1778000"/>
+              <a:chOff x="5168900" y="1701800"/>
+              <a:chExt cx="1346201" cy="1778000"/>
+            </a:xfrm>
+          </p:grpSpPr>
+          <p:sp>
+            <p:nvSpPr>
+              <p:cNvPr id="12" name="Rectangle 11"/>
+              <p:cNvSpPr/>
+              <p:nvPr/>
+            </p:nvSpPr>
+            <p:spPr>
+              <a:xfrm>
+                <a:off x="5168900" y="1701800"/>
+                <a:ext cx="1346200" cy="1778000"/>
+              </a:xfrm>
+              <a:prstGeom prst="rect">
+                <a:avLst/>
+              </a:prstGeom>
+              <a:gradFill>
+                <a:gsLst>
+                  <a:gs pos="0">
+                    <a:srgbClr val="FFE9A3"/>
+                  </a:gs>
+                  <a:gs pos="100000">
+                    <a:schemeClr val="accent6">
+                      <a:lumMod val="20000"/>
+                      <a:lumOff val="80000"/>
+                    </a:schemeClr>
+                  </a:gs>
+                </a:gsLst>
+              </a:gradFill>
+            </p:spPr>
+            <p:style>
+              <a:lnRef idx="1">
+                <a:schemeClr val="accent1"/>
+              </a:lnRef>
+              <a:fillRef idx="3">
+                <a:schemeClr val="accent1"/>
+              </a:fillRef>
+              <a:effectRef idx="2">
+                <a:schemeClr val="accent1"/>
+              </a:effectRef>
+              <a:fontRef idx="minor">
+                <a:schemeClr val="lt1"/>
+              </a:fontRef>
+            </p:style>
+            <p:txBody>
+              <a:bodyPr rtlCol="0" anchor="ctr"/>
+              <a:lstStyle/>
+              <a:p>
+                <a:pPr algn="ctr"/>
+                <a:endParaRPr lang="en-IE"/>
+              </a:p>
+            </p:txBody>
+          </p:sp>
+          <p:sp>
+            <p:nvSpPr>
+              <p:cNvPr id="13" name="TextBox 12"/>
+              <p:cNvSpPr txBox="1"/>
+              <p:nvPr/>
+            </p:nvSpPr>
+            <p:spPr>
+              <a:xfrm>
+                <a:off x="5207001" y="2064586"/>
+                <a:ext cx="1308100" cy="1289619"/>
+              </a:xfrm>
+              <a:prstGeom prst="rect">
+                <a:avLst/>
+              </a:prstGeom>
+              <a:noFill/>
+            </p:spPr>
+            <p:txBody>
+              <a:bodyPr wrap="square" rtlCol="0">
+                <a:spAutoFit/>
+              </a:bodyPr>
+              <a:lstStyle/>
+              <a:p>
+                <a:pPr marL="0" indent="0">
+                  <a:buNone/>
+                </a:pPr>
+                <a:r>
+                  <a:rPr lang="en-IE" sz="800" dirty="0">
+                    <a:latin typeface="Consolas" panose="020B0609020204030204" pitchFamily="49" charset="0"/>
+                    <a:cs typeface="Consolas" panose="020B0609020204030204" pitchFamily="49" charset="0"/>
+                  </a:rPr>
+                  <a:t>Duck* duck;</a:t>
+                </a:r>
+              </a:p>
+              <a:p>
+                <a:pPr marL="0" indent="0">
+                  <a:buNone/>
+                </a:pPr>
+                <a:r>
+                  <a:rPr lang="en-IE" sz="800" dirty="0" err="1">
+                    <a:latin typeface="Consolas" panose="020B0609020204030204" pitchFamily="49" charset="0"/>
+                    <a:cs typeface="Consolas" panose="020B0609020204030204" pitchFamily="49" charset="0"/>
+                  </a:rPr>
+                  <a:t>DuckFactory</a:t>
+                </a:r>
+                <a:r>
+                  <a:rPr lang="en-IE" sz="800" dirty="0">
+                    <a:latin typeface="Consolas" panose="020B0609020204030204" pitchFamily="49" charset="0"/>
+                    <a:cs typeface="Consolas" panose="020B0609020204030204" pitchFamily="49" charset="0"/>
+                  </a:rPr>
+                  <a:t> </a:t>
+                </a:r>
+                <a:r>
+                  <a:rPr lang="en-IE" sz="800" dirty="0" err="1">
+                    <a:latin typeface="Consolas" panose="020B0609020204030204" pitchFamily="49" charset="0"/>
+                    <a:cs typeface="Consolas" panose="020B0609020204030204" pitchFamily="49" charset="0"/>
+                  </a:rPr>
+                  <a:t>df</a:t>
+                </a:r>
+                <a:r>
+                  <a:rPr lang="en-IE" sz="800" dirty="0">
+                    <a:latin typeface="Consolas" panose="020B0609020204030204" pitchFamily="49" charset="0"/>
+                    <a:cs typeface="Consolas" panose="020B0609020204030204" pitchFamily="49" charset="0"/>
+                  </a:rPr>
+                  <a:t> = </a:t>
+                </a:r>
+              </a:p>
+              <a:p>
+                <a:pPr marL="0" indent="0">
+                  <a:buNone/>
+                </a:pPr>
+                <a:r>
+                  <a:rPr lang="en-IE" sz="800" dirty="0">
+                    <a:latin typeface="Consolas" panose="020B0609020204030204" pitchFamily="49" charset="0"/>
+                    <a:cs typeface="Consolas" panose="020B0609020204030204" pitchFamily="49" charset="0"/>
+                  </a:rPr>
+                  <a:t>new </a:t>
+                </a:r>
+                <a:r>
+                  <a:rPr lang="en-IE" sz="800" dirty="0" err="1">
+                    <a:latin typeface="Consolas" panose="020B0609020204030204" pitchFamily="49" charset="0"/>
+                    <a:cs typeface="Consolas" panose="020B0609020204030204" pitchFamily="49" charset="0"/>
+                  </a:rPr>
+                  <a:t>DuckFactory</a:t>
+                </a:r>
+                <a:r>
+                  <a:rPr lang="en-IE" sz="800" dirty="0">
+                    <a:latin typeface="Consolas" panose="020B0609020204030204" pitchFamily="49" charset="0"/>
+                    <a:cs typeface="Consolas" panose="020B0609020204030204" pitchFamily="49" charset="0"/>
+                  </a:rPr>
+                  <a:t>();</a:t>
+                </a:r>
+              </a:p>
+              <a:p>
+                <a:pPr marL="0" indent="0">
+                  <a:buNone/>
+                </a:pPr>
+                <a:endParaRPr lang="en-IE" sz="800" dirty="0">
+                  <a:latin typeface="Consolas" panose="020B0609020204030204" pitchFamily="49" charset="0"/>
+                  <a:cs typeface="Consolas" panose="020B0609020204030204" pitchFamily="49" charset="0"/>
+                </a:endParaRPr>
+              </a:p>
+              <a:p>
+                <a:pPr marL="0" indent="0">
+                  <a:buNone/>
+                </a:pPr>
+                <a:r>
+                  <a:rPr lang="en-IE" sz="800" dirty="0">
+                    <a:latin typeface="Consolas" panose="020B0609020204030204" pitchFamily="49" charset="0"/>
+                    <a:cs typeface="Consolas" panose="020B0609020204030204" pitchFamily="49" charset="0"/>
+                  </a:rPr>
+                  <a:t>Duck = </a:t>
+                </a:r>
+                <a:r>
+                  <a:rPr lang="en-IE" sz="800" dirty="0" err="1">
+                    <a:latin typeface="Consolas" panose="020B0609020204030204" pitchFamily="49" charset="0"/>
+                    <a:cs typeface="Consolas" panose="020B0609020204030204" pitchFamily="49" charset="0"/>
+                  </a:rPr>
+                  <a:t>df.createDuck</a:t>
+                </a:r>
+                <a:r>
+                  <a:rPr lang="en-IE" sz="800" dirty="0">
+                    <a:latin typeface="Consolas" panose="020B0609020204030204" pitchFamily="49" charset="0"/>
+                    <a:cs typeface="Consolas" panose="020B0609020204030204" pitchFamily="49" charset="0"/>
+                  </a:rPr>
+                  <a:t>();</a:t>
+                </a:r>
+              </a:p>
+              <a:p>
+                <a:endParaRPr lang="en-IE" sz="800" dirty="0"/>
+              </a:p>
+              <a:p>
+                <a:endParaRPr lang="en-IE" sz="800" dirty="0"/>
+              </a:p>
+            </p:txBody>
+          </p:sp>
+        </p:grpSp>
+        <p:sp>
+          <p:nvSpPr>
+            <p:cNvPr id="11" name="TextBox 10"/>
+            <p:cNvSpPr txBox="1"/>
+            <p:nvPr/>
+          </p:nvSpPr>
+          <p:spPr>
+            <a:xfrm>
+              <a:off x="5186939" y="1277816"/>
+              <a:ext cx="1308100" cy="331616"/>
+            </a:xfrm>
+            <a:prstGeom prst="rect">
+              <a:avLst/>
+            </a:prstGeom>
+            <a:noFill/>
+          </p:spPr>
+          <p:txBody>
+            <a:bodyPr wrap="square" rtlCol="0">
+              <a:spAutoFit/>
+            </a:bodyPr>
+            <a:lstStyle/>
+            <a:p>
+              <a:r>
+                <a:rPr lang="en-IE" sz="1200" b="1" dirty="0" err="1" smtClean="0">
+                  <a:solidFill>
+                    <a:srgbClr val="00B050"/>
+                  </a:solidFill>
+                </a:rPr>
+                <a:t>DuckShop</a:t>
+              </a:r>
+              <a:r>
+                <a:rPr lang="en-IE" sz="1200" b="1" dirty="0" smtClean="0">
+                  <a:solidFill>
+                    <a:srgbClr val="00B050"/>
+                  </a:solidFill>
+                </a:rPr>
+                <a:t> Class</a:t>
+              </a:r>
+              <a:endParaRPr lang="en-IE" sz="1200" b="1" dirty="0">
+                <a:solidFill>
+                  <a:srgbClr val="00B050"/>
+                </a:solidFill>
+              </a:endParaRPr>
+            </a:p>
+          </p:txBody>
+        </p:sp>
+      </p:grpSp>
+      <p:cxnSp>
+        <p:nvCxnSpPr>
+          <p:cNvPr id="24" name="Straight Arrow Connector 23"/>
+          <p:cNvCxnSpPr>
+            <a:stCxn id="12" idx="2"/>
+          </p:cNvCxnSpPr>
+          <p:nvPr/>
+        </p:nvCxnSpPr>
+        <p:spPr>
+          <a:xfrm flipH="1">
+            <a:off x="8064501" y="2305574"/>
+            <a:ext cx="118256" cy="1098026"/>
+          </a:xfrm>
+          <a:prstGeom prst="straightConnector1">
+            <a:avLst/>
+          </a:prstGeom>
+          <a:ln w="47625">
+            <a:solidFill>
+              <a:schemeClr val="tx1"/>
+            </a:solidFill>
+            <a:tailEnd type="arrow"/>
+          </a:ln>
+        </p:spPr>
+        <p:style>
+          <a:lnRef idx="2">
+            <a:schemeClr val="accent1"/>
+          </a:lnRef>
+          <a:fillRef idx="0">
+            <a:schemeClr val="accent1"/>
+          </a:fillRef>
+          <a:effectRef idx="1">
+            <a:schemeClr val="accent1"/>
+          </a:effectRef>
+          <a:fontRef idx="minor">
+            <a:schemeClr val="tx1"/>
+          </a:fontRef>
+        </p:style>
+      </p:cxnSp>
     </p:spTree>
     <p:extLst>
       <p:ext uri="{BB962C8B-B14F-4D97-AF65-F5344CB8AC3E}">
@@ -7173,11 +7331,7 @@
           <a:p>
             <a:r>
               <a:rPr lang="en-IE" sz="1900" dirty="0" smtClean="0"/>
-              <a:t>The main point separating the Simple Factory from the Factory Method Pattern (discussing that next!) is that the Simple Factory is a concrete class, </a:t>
-            </a:r>
-            <a:r>
-              <a:rPr lang="en-IE" sz="1900" dirty="0" smtClean="0"/>
-              <a:t>and is not intended to be </a:t>
+              <a:t>The main point separating the Simple Factory from the Factory Method Pattern (discussing that next!) is that the Simple Factory is a concrete class, and is not intended to be </a:t>
             </a:r>
             <a:r>
               <a:rPr lang="en-IE" sz="1900" dirty="0" err="1" smtClean="0"/>
@@ -7187,7 +7341,6 @@
               <a:rPr lang="en-IE" sz="1900" dirty="0" smtClean="0"/>
               <a:t>.   </a:t>
             </a:r>
-            <a:endParaRPr lang="en-IE" sz="1900" dirty="0" smtClean="0"/>
           </a:p>
           <a:p>
             <a:endParaRPr lang="en-IE" sz="1900" dirty="0"/>
@@ -7203,15 +7356,7 @@
             </a:r>
             <a:r>
               <a:rPr lang="en-IE" sz="1900" dirty="0" smtClean="0"/>
-              <a:t>() declaration.  </a:t>
-            </a:r>
-            <a:r>
-              <a:rPr lang="en-IE" sz="1900" dirty="0" smtClean="0"/>
-              <a:t>A factory subclass implements the interface, and the decision making is implemented in the sub </a:t>
-            </a:r>
-            <a:r>
-              <a:rPr lang="en-IE" sz="1900" dirty="0" smtClean="0"/>
-              <a:t>classes </a:t>
+              <a:t>() declaration.  A factory subclass implements the interface, and the decision making is implemented in the sub classes </a:t>
             </a:r>
             <a:r>
               <a:rPr lang="en-IE" sz="1900" dirty="0" err="1" smtClean="0"/>
@@ -7221,7 +7366,6 @@
               <a:rPr lang="en-IE" sz="1900" dirty="0" smtClean="0"/>
               <a:t>().</a:t>
             </a:r>
-            <a:endParaRPr lang="en-IE" sz="1900" dirty="0" smtClean="0"/>
           </a:p>
           <a:p>
             <a:endParaRPr lang="en-IE" sz="1900" dirty="0"/>

</xml_diff>

<commit_message>
Further updates to the Abstract Factory Pattern
</commit_message>
<xml_diff>
--- a/Other Files/Factories.pptx
+++ b/Other Files/Factories.pptx
@@ -5,25 +5,30 @@
     <p:sldMasterId id="2147483648" r:id="rId1"/>
   </p:sldMasterIdLst>
   <p:notesMasterIdLst>
-    <p:notesMasterId r:id="rId15"/>
+    <p:notesMasterId r:id="rId20"/>
   </p:notesMasterIdLst>
   <p:handoutMasterIdLst>
-    <p:handoutMasterId r:id="rId16"/>
+    <p:handoutMasterId r:id="rId21"/>
   </p:handoutMasterIdLst>
   <p:sldIdLst>
     <p:sldId id="263" r:id="rId2"/>
     <p:sldId id="363" r:id="rId3"/>
     <p:sldId id="370" r:id="rId4"/>
     <p:sldId id="365" r:id="rId5"/>
-    <p:sldId id="366" r:id="rId6"/>
-    <p:sldId id="367" r:id="rId7"/>
-    <p:sldId id="368" r:id="rId8"/>
-    <p:sldId id="369" r:id="rId9"/>
-    <p:sldId id="371" r:id="rId10"/>
-    <p:sldId id="372" r:id="rId11"/>
-    <p:sldId id="373" r:id="rId12"/>
-    <p:sldId id="374" r:id="rId13"/>
-    <p:sldId id="262" r:id="rId14"/>
+    <p:sldId id="376" r:id="rId6"/>
+    <p:sldId id="366" r:id="rId7"/>
+    <p:sldId id="367" r:id="rId8"/>
+    <p:sldId id="368" r:id="rId9"/>
+    <p:sldId id="369" r:id="rId10"/>
+    <p:sldId id="371" r:id="rId11"/>
+    <p:sldId id="372" r:id="rId12"/>
+    <p:sldId id="373" r:id="rId13"/>
+    <p:sldId id="374" r:id="rId14"/>
+    <p:sldId id="375" r:id="rId15"/>
+    <p:sldId id="379" r:id="rId16"/>
+    <p:sldId id="377" r:id="rId17"/>
+    <p:sldId id="378" r:id="rId18"/>
+    <p:sldId id="262" r:id="rId19"/>
   </p:sldIdLst>
   <p:sldSz cx="9144000" cy="6858000" type="screen4x3"/>
   <p:notesSz cx="6858000" cy="9144000"/>
@@ -254,7 +259,7 @@
               <a:pPr>
                 <a:defRPr/>
               </a:pPr>
-              <a:t>23/09/2014</a:t>
+              <a:t>24/09/2014</a:t>
             </a:fld>
             <a:endParaRPr lang="en-US"/>
           </a:p>
@@ -457,7 +462,7 @@
               <a:pPr>
                 <a:defRPr/>
               </a:pPr>
-              <a:t>23/09/2014</a:t>
+              <a:t>24/09/2014</a:t>
             </a:fld>
             <a:endParaRPr lang="en-US"/>
           </a:p>
@@ -1869,7 +1874,7 @@
             <a:fld id="{5430FA34-CEAD-4CAB-BC8B-561C252A95F7}" type="datetimeFigureOut">
               <a:rPr lang="en-IE" altLang="en-US"/>
               <a:pPr/>
-              <a:t>23/09/2014</a:t>
+              <a:t>24/09/2014</a:t>
             </a:fld>
             <a:endParaRPr lang="en-IE" altLang="en-US"/>
           </a:p>
@@ -2638,110 +2643,98 @@
           <a:p>
             <a:r>
               <a:rPr lang="en-IE" dirty="0" smtClean="0"/>
-              <a:t>The Factory Method Pattern</a:t>
-            </a:r>
-            <a:endParaRPr lang="en-IE" dirty="0"/>
+              <a:t>The </a:t>
+            </a:r>
+            <a:r>
+              <a:rPr lang="en-IE" dirty="0"/>
+              <a:t>Simple Factory (Not a Pattern)</a:t>
+            </a:r>
           </a:p>
         </p:txBody>
       </p:sp>
-      <p:pic>
-        <p:nvPicPr>
-          <p:cNvPr id="2050" name="Picture 2"/>
-          <p:cNvPicPr>
-            <a:picLocks noGrp="1" noChangeAspect="1" noChangeArrowheads="1"/>
-          </p:cNvPicPr>
+      <p:sp>
+        <p:nvSpPr>
+          <p:cNvPr id="3" name="Content Placeholder 2"/>
+          <p:cNvSpPr>
+            <a:spLocks noGrp="1"/>
+          </p:cNvSpPr>
           <p:nvPr>
             <p:ph sz="quarter" idx="10"/>
           </p:nvPr>
-        </p:nvPicPr>
-        <p:blipFill>
-          <a:blip r:embed="rId2">
-            <a:extLst>
-              <a:ext uri="{28A0092B-C50C-407E-A947-70E740481C1C}">
-                <a14:useLocalDpi xmlns:a14="http://schemas.microsoft.com/office/drawing/2010/main" val="0"/>
-              </a:ext>
-            </a:extLst>
-          </a:blip>
-          <a:srcRect/>
-          <a:stretch>
-            <a:fillRect/>
-          </a:stretch>
-        </p:blipFill>
-        <p:spPr bwMode="auto">
-          <a:xfrm>
-            <a:off x="1536700" y="2095538"/>
-            <a:ext cx="6043612" cy="3670262"/>
-          </a:xfrm>
-          <a:prstGeom prst="rect">
-            <a:avLst/>
-          </a:prstGeom>
-          <a:noFill/>
-          <a:ln>
-            <a:noFill/>
-          </a:ln>
-          <a:extLst>
-            <a:ext uri="{909E8E84-426E-40DD-AFC4-6F175D3DCCD1}">
-              <a14:hiddenFill xmlns:a14="http://schemas.microsoft.com/office/drawing/2010/main">
-                <a:solidFill>
-                  <a:schemeClr val="accent1"/>
-                </a:solidFill>
-              </a14:hiddenFill>
-            </a:ext>
-            <a:ext uri="{91240B29-F687-4F45-9708-019B960494DF}">
-              <a14:hiddenLine xmlns:a14="http://schemas.microsoft.com/office/drawing/2010/main" w="9525">
-                <a:solidFill>
-                  <a:schemeClr val="tx1"/>
-                </a:solidFill>
-                <a:miter lim="800000"/>
-                <a:headEnd/>
-                <a:tailEnd/>
-              </a14:hiddenLine>
-            </a:ext>
-          </a:extLst>
-        </p:spPr>
-      </p:pic>
-      <p:sp>
-        <p:nvSpPr>
-          <p:cNvPr id="4" name="TextBox 3"/>
-          <p:cNvSpPr txBox="1"/>
-          <p:nvPr/>
         </p:nvSpPr>
         <p:spPr>
           <a:xfrm>
-            <a:off x="406400" y="838200"/>
-            <a:ext cx="8001000" cy="1015663"/>
+            <a:off x="130175" y="868232"/>
+            <a:ext cx="8861425" cy="5049967"/>
           </a:xfrm>
-          <a:prstGeom prst="rect">
-            <a:avLst/>
-          </a:prstGeom>
-          <a:noFill/>
         </p:spPr>
         <p:txBody>
-          <a:bodyPr wrap="square" rtlCol="0">
-            <a:spAutoFit/>
-          </a:bodyPr>
+          <a:bodyPr/>
           <a:lstStyle/>
           <a:p>
             <a:r>
-              <a:rPr lang="en-IE" sz="2000" b="1" dirty="0" smtClean="0"/>
-              <a:t>The Factory Method Pattern</a:t>
-            </a:r>
-            <a:r>
-              <a:rPr lang="en-IE" sz="1800" dirty="0" smtClean="0"/>
-              <a:t> </a:t>
-            </a:r>
-            <a:r>
-              <a:rPr lang="en-IE" sz="2000" dirty="0" smtClean="0"/>
-              <a:t>defines an interface for creating an object, but lets subclasses decide which class to instantiate.  Factory method lets a class defer instantiation to subclasses.</a:t>
-            </a:r>
-            <a:endParaRPr lang="en-IE" sz="2000" dirty="0"/>
+              <a:rPr lang="en-IE" sz="1900" dirty="0" smtClean="0"/>
+              <a:t>The simple factory is not considered to be a pattern, rather it is thought to be more of an programming idiom.</a:t>
+            </a:r>
+          </a:p>
+          <a:p>
+            <a:endParaRPr lang="en-IE" sz="1900" dirty="0"/>
+          </a:p>
+          <a:p>
+            <a:r>
+              <a:rPr lang="en-IE" sz="1900" dirty="0" smtClean="0"/>
+              <a:t>The main point separating the Simple Factory from the Factory Method Pattern (discussing that next!) is that the Simple Factory is a concrete class, and is not intended to be </a:t>
+            </a:r>
+            <a:r>
+              <a:rPr lang="en-IE" sz="1900" dirty="0" err="1" smtClean="0"/>
+              <a:t>subclassed</a:t>
+            </a:r>
+            <a:r>
+              <a:rPr lang="en-IE" sz="1900" dirty="0" smtClean="0"/>
+              <a:t>.   </a:t>
+            </a:r>
+          </a:p>
+          <a:p>
+            <a:endParaRPr lang="en-IE" sz="1900" dirty="0"/>
+          </a:p>
+          <a:p>
+            <a:r>
+              <a:rPr lang="en-IE" sz="1900" dirty="0" smtClean="0"/>
+              <a:t>In the Factory Method Pattern, a factory interface is declared with a </a:t>
+            </a:r>
+            <a:r>
+              <a:rPr lang="en-IE" sz="1900" dirty="0" err="1" smtClean="0"/>
+              <a:t>createMethod</a:t>
+            </a:r>
+            <a:r>
+              <a:rPr lang="en-IE" sz="1900" dirty="0" smtClean="0"/>
+              <a:t>() declaration.  A factory subclass implements the interface, and the decision making is implemented in the sub classes </a:t>
+            </a:r>
+            <a:r>
+              <a:rPr lang="en-IE" sz="1900" dirty="0" err="1" smtClean="0"/>
+              <a:t>createMethod</a:t>
+            </a:r>
+            <a:r>
+              <a:rPr lang="en-IE" sz="1900" dirty="0" smtClean="0"/>
+              <a:t>().</a:t>
+            </a:r>
+          </a:p>
+          <a:p>
+            <a:endParaRPr lang="en-IE" sz="1900" dirty="0"/>
+          </a:p>
+          <a:p>
+            <a:r>
+              <a:rPr lang="en-IE" sz="1900" dirty="0" smtClean="0"/>
+              <a:t>The Factory Method Pattern is therefore a framework, and allows different subclasses to create different groups of objects.  So while the Simple Factory appears very similar to the Factory Method Pattern, it does not have this flexibility.  Transitioning from the Simple Factory to the Factory Method should be relatively easy.</a:t>
+            </a:r>
+            <a:endParaRPr lang="en-IE" sz="1900" dirty="0"/>
           </a:p>
         </p:txBody>
       </p:sp>
     </p:spTree>
     <p:extLst>
       <p:ext uri="{BB962C8B-B14F-4D97-AF65-F5344CB8AC3E}">
-        <p14:creationId xmlns:p14="http://schemas.microsoft.com/office/powerpoint/2010/main" val="3650086985"/>
+        <p14:creationId xmlns:p14="http://schemas.microsoft.com/office/powerpoint/2010/main" val="2662116496"/>
       </p:ext>
     </p:extLst>
   </p:cSld>
@@ -2805,41 +2798,104 @@
           </a:p>
         </p:txBody>
       </p:sp>
-      <p:sp>
-        <p:nvSpPr>
-          <p:cNvPr id="3" name="Content Placeholder 2"/>
-          <p:cNvSpPr>
-            <a:spLocks noGrp="1"/>
-          </p:cNvSpPr>
+      <p:pic>
+        <p:nvPicPr>
+          <p:cNvPr id="2050" name="Picture 2"/>
+          <p:cNvPicPr>
+            <a:picLocks noGrp="1" noChangeAspect="1" noChangeArrowheads="1"/>
+          </p:cNvPicPr>
           <p:nvPr>
             <p:ph sz="quarter" idx="10"/>
           </p:nvPr>
+        </p:nvPicPr>
+        <p:blipFill>
+          <a:blip r:embed="rId2">
+            <a:extLst>
+              <a:ext uri="{28A0092B-C50C-407E-A947-70E740481C1C}">
+                <a14:useLocalDpi xmlns:a14="http://schemas.microsoft.com/office/drawing/2010/main" val="0"/>
+              </a:ext>
+            </a:extLst>
+          </a:blip>
+          <a:srcRect/>
+          <a:stretch>
+            <a:fillRect/>
+          </a:stretch>
+        </p:blipFill>
+        <p:spPr bwMode="auto">
+          <a:xfrm>
+            <a:off x="1536700" y="2095538"/>
+            <a:ext cx="6043612" cy="3670262"/>
+          </a:xfrm>
+          <a:prstGeom prst="rect">
+            <a:avLst/>
+          </a:prstGeom>
+          <a:noFill/>
+          <a:ln>
+            <a:noFill/>
+          </a:ln>
+          <a:extLst>
+            <a:ext uri="{909E8E84-426E-40DD-AFC4-6F175D3DCCD1}">
+              <a14:hiddenFill xmlns:a14="http://schemas.microsoft.com/office/drawing/2010/main">
+                <a:solidFill>
+                  <a:schemeClr val="accent1"/>
+                </a:solidFill>
+              </a14:hiddenFill>
+            </a:ext>
+            <a:ext uri="{91240B29-F687-4F45-9708-019B960494DF}">
+              <a14:hiddenLine xmlns:a14="http://schemas.microsoft.com/office/drawing/2010/main" w="9525">
+                <a:solidFill>
+                  <a:schemeClr val="tx1"/>
+                </a:solidFill>
+                <a:miter lim="800000"/>
+                <a:headEnd/>
+                <a:tailEnd/>
+              </a14:hiddenLine>
+            </a:ext>
+          </a:extLst>
+        </p:spPr>
+      </p:pic>
+      <p:sp>
+        <p:nvSpPr>
+          <p:cNvPr id="4" name="TextBox 3"/>
+          <p:cNvSpPr txBox="1"/>
+          <p:nvPr/>
         </p:nvSpPr>
         <p:spPr>
           <a:xfrm>
-            <a:off x="457200" y="796672"/>
-            <a:ext cx="8293100" cy="5032627"/>
+            <a:off x="406400" y="838200"/>
+            <a:ext cx="8001000" cy="1015663"/>
           </a:xfrm>
+          <a:prstGeom prst="rect">
+            <a:avLst/>
+          </a:prstGeom>
+          <a:noFill/>
         </p:spPr>
         <p:txBody>
-          <a:bodyPr anchor="ctr" anchorCtr="0"/>
+          <a:bodyPr wrap="square" rtlCol="0">
+            <a:spAutoFit/>
+          </a:bodyPr>
           <a:lstStyle/>
           <a:p>
-            <a:pPr marL="0" indent="0" algn="ctr">
-              <a:buNone/>
-            </a:pPr>
-            <a:r>
-              <a:rPr lang="en-IE" sz="9600" i="1" dirty="0" smtClean="0"/>
-              <a:t>Demo</a:t>
-            </a:r>
-            <a:endParaRPr lang="en-IE" i="1" dirty="0"/>
+            <a:r>
+              <a:rPr lang="en-IE" sz="2000" b="1" dirty="0" smtClean="0"/>
+              <a:t>The Factory Method Pattern</a:t>
+            </a:r>
+            <a:r>
+              <a:rPr lang="en-IE" sz="1800" dirty="0" smtClean="0"/>
+              <a:t> </a:t>
+            </a:r>
+            <a:r>
+              <a:rPr lang="en-IE" sz="2000" dirty="0" smtClean="0"/>
+              <a:t>defines an interface for creating an object, but lets subclasses decide which class to instantiate.  Factory method lets a class defer instantiation to subclasses.</a:t>
+            </a:r>
+            <a:endParaRPr lang="en-IE" sz="2000" dirty="0"/>
           </a:p>
         </p:txBody>
       </p:sp>
     </p:spTree>
     <p:extLst>
       <p:ext uri="{BB962C8B-B14F-4D97-AF65-F5344CB8AC3E}">
-        <p14:creationId xmlns:p14="http://schemas.microsoft.com/office/powerpoint/2010/main" val="735327836"/>
+        <p14:creationId xmlns:p14="http://schemas.microsoft.com/office/powerpoint/2010/main" val="3650086985"/>
       </p:ext>
     </p:extLst>
   </p:cSld>
@@ -2897,6 +2953,104 @@
           <a:p>
             <a:r>
               <a:rPr lang="en-IE" dirty="0" smtClean="0"/>
+              <a:t>The Factory Method Pattern</a:t>
+            </a:r>
+            <a:endParaRPr lang="en-IE" dirty="0"/>
+          </a:p>
+        </p:txBody>
+      </p:sp>
+      <p:sp>
+        <p:nvSpPr>
+          <p:cNvPr id="3" name="Content Placeholder 2"/>
+          <p:cNvSpPr>
+            <a:spLocks noGrp="1"/>
+          </p:cNvSpPr>
+          <p:nvPr>
+            <p:ph sz="quarter" idx="10"/>
+          </p:nvPr>
+        </p:nvSpPr>
+        <p:spPr>
+          <a:xfrm>
+            <a:off x="457200" y="796672"/>
+            <a:ext cx="8293100" cy="5032627"/>
+          </a:xfrm>
+        </p:spPr>
+        <p:txBody>
+          <a:bodyPr anchor="ctr" anchorCtr="0"/>
+          <a:lstStyle/>
+          <a:p>
+            <a:pPr marL="0" indent="0" algn="ctr">
+              <a:buNone/>
+            </a:pPr>
+            <a:r>
+              <a:rPr lang="en-IE" sz="9600" i="1" dirty="0" smtClean="0"/>
+              <a:t>Demo</a:t>
+            </a:r>
+            <a:endParaRPr lang="en-IE" i="1" dirty="0"/>
+          </a:p>
+        </p:txBody>
+      </p:sp>
+    </p:spTree>
+    <p:extLst>
+      <p:ext uri="{BB962C8B-B14F-4D97-AF65-F5344CB8AC3E}">
+        <p14:creationId xmlns:p14="http://schemas.microsoft.com/office/powerpoint/2010/main" val="735327836"/>
+      </p:ext>
+    </p:extLst>
+  </p:cSld>
+  <p:clrMapOvr>
+    <a:masterClrMapping/>
+  </p:clrMapOvr>
+  <p:timing>
+    <p:tnLst>
+      <p:par>
+        <p:cTn id="1" dur="indefinite" restart="never" nodeType="tmRoot"/>
+      </p:par>
+    </p:tnLst>
+  </p:timing>
+</p:sld>
+</file>
+
+<file path=ppt/slides/slide13.xml><?xml version="1.0" encoding="utf-8"?>
+<p:sld xmlns:a="http://schemas.openxmlformats.org/drawingml/2006/main" xmlns:r="http://schemas.openxmlformats.org/officeDocument/2006/relationships" xmlns:p="http://schemas.openxmlformats.org/presentationml/2006/main">
+  <p:cSld>
+    <p:spTree>
+      <p:nvGrpSpPr>
+        <p:cNvPr id="1" name=""/>
+        <p:cNvGrpSpPr/>
+        <p:nvPr/>
+      </p:nvGrpSpPr>
+      <p:grpSpPr>
+        <a:xfrm>
+          <a:off x="0" y="0"/>
+          <a:ext cx="0" cy="0"/>
+          <a:chOff x="0" y="0"/>
+          <a:chExt cx="0" cy="0"/>
+        </a:xfrm>
+      </p:grpSpPr>
+      <p:sp>
+        <p:nvSpPr>
+          <p:cNvPr id="2" name="Title 1"/>
+          <p:cNvSpPr>
+            <a:spLocks noGrp="1"/>
+          </p:cNvSpPr>
+          <p:nvPr>
+            <p:ph type="title"/>
+          </p:nvPr>
+        </p:nvSpPr>
+        <p:spPr>
+          <a:xfrm>
+            <a:off x="0" y="53961"/>
+            <a:ext cx="9144000" cy="613427"/>
+          </a:xfrm>
+        </p:spPr>
+        <p:txBody>
+          <a:bodyPr>
+            <a:normAutofit/>
+          </a:bodyPr>
+          <a:lstStyle/>
+          <a:p>
+            <a:r>
+              <a:rPr lang="en-IE" dirty="0" smtClean="0"/>
               <a:t>The Abstract Factory Pattern</a:t>
             </a:r>
             <a:endParaRPr lang="en-IE" dirty="0"/>
@@ -2927,21 +3081,36 @@
               <a:buFont typeface="Arial" panose="020B0604020202020204" pitchFamily="34" charset="0"/>
               <a:buChar char="•"/>
             </a:pPr>
+            <a:endParaRPr lang="en-IE" dirty="0" smtClean="0"/>
+          </a:p>
+          <a:p>
+            <a:pPr>
+              <a:buFont typeface="Arial" panose="020B0604020202020204" pitchFamily="34" charset="0"/>
+              <a:buChar char="•"/>
+            </a:pPr>
             <a:r>
               <a:rPr lang="en-IE" dirty="0" smtClean="0"/>
-              <a:t>Used if you </a:t>
+              <a:t>Used </a:t>
             </a:r>
             <a:r>
               <a:rPr lang="en-IE" dirty="0" smtClean="0"/>
-              <a:t>need to create objects using specific families </a:t>
+              <a:t>if you need to create </a:t>
             </a:r>
             <a:r>
               <a:rPr lang="en-IE" dirty="0" smtClean="0"/>
-              <a:t>of </a:t>
+              <a:t>a </a:t>
+            </a:r>
+            <a:r>
+              <a:rPr lang="en-IE" b="1" dirty="0" smtClean="0"/>
+              <a:t>specific grouping </a:t>
+            </a:r>
+            <a:r>
+              <a:rPr lang="en-IE" b="1" dirty="0" smtClean="0"/>
+              <a:t>of products</a:t>
             </a:r>
             <a:r>
               <a:rPr lang="en-IE" dirty="0" smtClean="0"/>
-              <a:t>products.</a:t>
+              <a:t>.</a:t>
             </a:r>
           </a:p>
           <a:p>
@@ -2958,7 +3127,11 @@
             </a:r>
             <a:r>
               <a:rPr lang="en-IE" dirty="0" smtClean="0"/>
-              <a:t>, create a pizza using a specific set of ingredients.</a:t>
+              <a:t>, create a pizza using a specific set of </a:t>
+            </a:r>
+            <a:r>
+              <a:rPr lang="en-IE" dirty="0" smtClean="0"/>
+              <a:t>ingredients for a region.</a:t>
             </a:r>
             <a:endParaRPr lang="en-IE" dirty="0" smtClean="0"/>
           </a:p>
@@ -2975,7 +3148,11 @@
             </a:pPr>
             <a:r>
               <a:rPr lang="en-IE" dirty="0" smtClean="0"/>
-              <a:t>Ensures that clients create products that belong together</a:t>
+              <a:t>Ensures that clients </a:t>
+            </a:r>
+            <a:r>
+              <a:rPr lang="en-IE" b="1" dirty="0" smtClean="0"/>
+              <a:t>create products that belong together</a:t>
             </a:r>
             <a:r>
               <a:rPr lang="en-IE" dirty="0" smtClean="0"/>
@@ -2996,7 +3173,11 @@
             </a:r>
             <a:r>
               <a:rPr lang="en-IE" dirty="0" smtClean="0"/>
-              <a:t>, an ingredient factory will produce a specific set of ingredient.</a:t>
+              <a:t>, an ingredient factory will produce a specific set of </a:t>
+            </a:r>
+            <a:r>
+              <a:rPr lang="en-IE" dirty="0" smtClean="0"/>
+              <a:t>ingredient for that region.</a:t>
             </a:r>
           </a:p>
           <a:p>
@@ -3006,9 +3187,55 @@
             <a:endParaRPr lang="en-IE" dirty="0"/>
           </a:p>
           <a:p>
+            <a:pPr>
+              <a:buFont typeface="Arial" panose="020B0604020202020204" pitchFamily="34" charset="0"/>
+              <a:buChar char="•"/>
+            </a:pPr>
+            <a:r>
+              <a:rPr lang="en-IE" dirty="0" smtClean="0"/>
+              <a:t>This allows us to implement a variety of factories that produce products meant for different contexts, such as </a:t>
+            </a:r>
+            <a:r>
+              <a:rPr lang="en-IE" b="1" dirty="0" smtClean="0"/>
+              <a:t>different regions, different operating systems</a:t>
+            </a:r>
+            <a:r>
+              <a:rPr lang="en-IE" dirty="0" smtClean="0"/>
+              <a:t>, or </a:t>
+            </a:r>
+            <a:r>
+              <a:rPr lang="en-IE" b="1" dirty="0" smtClean="0"/>
+              <a:t>different GUI</a:t>
+            </a:r>
+            <a:r>
+              <a:rPr lang="en-IE" dirty="0" smtClean="0"/>
+              <a:t>.</a:t>
+            </a:r>
+            <a:endParaRPr lang="en-IE" dirty="0" smtClean="0"/>
+          </a:p>
+          <a:p>
             <a:pPr marL="0" indent="0">
               <a:buNone/>
             </a:pPr>
+            <a:endParaRPr lang="en-IE" dirty="0"/>
+          </a:p>
+          <a:p>
+            <a:pPr>
+              <a:buFont typeface="Arial" panose="020B0604020202020204" pitchFamily="34" charset="0"/>
+              <a:buChar char="•"/>
+            </a:pPr>
+            <a:r>
+              <a:rPr lang="en-IE" dirty="0" smtClean="0"/>
+              <a:t>Since the instantiation code is decoupled from the client class through the use of interfaces, we can </a:t>
+            </a:r>
+            <a:r>
+              <a:rPr lang="en-IE" b="1" dirty="0" smtClean="0"/>
+              <a:t>substitute different factories to get different behaviours</a:t>
+            </a:r>
+            <a:r>
+              <a:rPr lang="en-IE" dirty="0" smtClean="0"/>
+              <a:t>.</a:t>
+            </a:r>
             <a:endParaRPr lang="en-IE" dirty="0"/>
           </a:p>
         </p:txBody>
@@ -3033,7 +3260,1517 @@
 </p:sld>
 </file>
 
-<file path=ppt/slides/slide13.xml><?xml version="1.0" encoding="utf-8"?>
+<file path=ppt/slides/slide14.xml><?xml version="1.0" encoding="utf-8"?>
+<p:sld xmlns:a="http://schemas.openxmlformats.org/drawingml/2006/main" xmlns:r="http://schemas.openxmlformats.org/officeDocument/2006/relationships" xmlns:p="http://schemas.openxmlformats.org/presentationml/2006/main">
+  <p:cSld>
+    <p:spTree>
+      <p:nvGrpSpPr>
+        <p:cNvPr id="1" name=""/>
+        <p:cNvGrpSpPr/>
+        <p:nvPr/>
+      </p:nvGrpSpPr>
+      <p:grpSpPr>
+        <a:xfrm>
+          <a:off x="0" y="0"/>
+          <a:ext cx="0" cy="0"/>
+          <a:chOff x="0" y="0"/>
+          <a:chExt cx="0" cy="0"/>
+        </a:xfrm>
+      </p:grpSpPr>
+      <p:sp>
+        <p:nvSpPr>
+          <p:cNvPr id="2" name="Title 1"/>
+          <p:cNvSpPr>
+            <a:spLocks noGrp="1"/>
+          </p:cNvSpPr>
+          <p:nvPr>
+            <p:ph type="title"/>
+          </p:nvPr>
+        </p:nvSpPr>
+        <p:spPr>
+          <a:xfrm>
+            <a:off x="0" y="53961"/>
+            <a:ext cx="9144000" cy="613427"/>
+          </a:xfrm>
+        </p:spPr>
+        <p:txBody>
+          <a:bodyPr>
+            <a:normAutofit/>
+          </a:bodyPr>
+          <a:lstStyle/>
+          <a:p>
+            <a:r>
+              <a:rPr lang="en-IE" dirty="0" smtClean="0"/>
+              <a:t>The Abstract Factory Pattern</a:t>
+            </a:r>
+            <a:endParaRPr lang="en-IE" dirty="0"/>
+          </a:p>
+        </p:txBody>
+      </p:sp>
+      <p:pic>
+        <p:nvPicPr>
+          <p:cNvPr id="1026" name="Picture 2"/>
+          <p:cNvPicPr>
+            <a:picLocks noGrp="1" noChangeAspect="1" noChangeArrowheads="1"/>
+          </p:cNvPicPr>
+          <p:nvPr>
+            <p:ph sz="quarter" idx="10"/>
+          </p:nvPr>
+        </p:nvPicPr>
+        <p:blipFill>
+          <a:blip r:embed="rId2">
+            <a:extLst>
+              <a:ext uri="{28A0092B-C50C-407E-A947-70E740481C1C}">
+                <a14:useLocalDpi xmlns:a14="http://schemas.microsoft.com/office/drawing/2010/main" val="0"/>
+              </a:ext>
+            </a:extLst>
+          </a:blip>
+          <a:srcRect/>
+          <a:stretch>
+            <a:fillRect/>
+          </a:stretch>
+        </p:blipFill>
+        <p:spPr bwMode="auto">
+          <a:xfrm>
+            <a:off x="1374706" y="796925"/>
+            <a:ext cx="6418960" cy="5032375"/>
+          </a:xfrm>
+          <a:prstGeom prst="rect">
+            <a:avLst/>
+          </a:prstGeom>
+          <a:noFill/>
+          <a:ln>
+            <a:noFill/>
+          </a:ln>
+          <a:extLst>
+            <a:ext uri="{909E8E84-426E-40DD-AFC4-6F175D3DCCD1}">
+              <a14:hiddenFill xmlns:a14="http://schemas.microsoft.com/office/drawing/2010/main">
+                <a:solidFill>
+                  <a:schemeClr val="accent1"/>
+                </a:solidFill>
+              </a14:hiddenFill>
+            </a:ext>
+            <a:ext uri="{91240B29-F687-4F45-9708-019B960494DF}">
+              <a14:hiddenLine xmlns:a14="http://schemas.microsoft.com/office/drawing/2010/main" w="9525">
+                <a:solidFill>
+                  <a:schemeClr val="tx1"/>
+                </a:solidFill>
+                <a:miter lim="800000"/>
+                <a:headEnd/>
+                <a:tailEnd/>
+              </a14:hiddenLine>
+            </a:ext>
+          </a:extLst>
+        </p:spPr>
+      </p:pic>
+      <p:sp>
+        <p:nvSpPr>
+          <p:cNvPr id="5" name="TextBox 4"/>
+          <p:cNvSpPr txBox="1"/>
+          <p:nvPr/>
+        </p:nvSpPr>
+        <p:spPr>
+          <a:xfrm>
+            <a:off x="130175" y="683567"/>
+            <a:ext cx="2807307" cy="369332"/>
+          </a:xfrm>
+          <a:prstGeom prst="rect">
+            <a:avLst/>
+          </a:prstGeom>
+          <a:noFill/>
+        </p:spPr>
+        <p:txBody>
+          <a:bodyPr wrap="none" rtlCol="0">
+            <a:spAutoFit/>
+          </a:bodyPr>
+          <a:lstStyle/>
+          <a:p>
+            <a:r>
+              <a:rPr lang="en-IE" sz="1800" b="1" dirty="0" smtClean="0"/>
+              <a:t>Head First : Design Patterns</a:t>
+            </a:r>
+            <a:endParaRPr lang="en-IE" sz="1800" b="1" dirty="0"/>
+          </a:p>
+        </p:txBody>
+      </p:sp>
+    </p:spTree>
+    <p:extLst>
+      <p:ext uri="{BB962C8B-B14F-4D97-AF65-F5344CB8AC3E}">
+        <p14:creationId xmlns:p14="http://schemas.microsoft.com/office/powerpoint/2010/main" val="3333790635"/>
+      </p:ext>
+    </p:extLst>
+  </p:cSld>
+  <p:clrMapOvr>
+    <a:masterClrMapping/>
+  </p:clrMapOvr>
+  <p:timing>
+    <p:tnLst>
+      <p:par>
+        <p:cTn id="1" dur="indefinite" restart="never" nodeType="tmRoot"/>
+      </p:par>
+    </p:tnLst>
+  </p:timing>
+</p:sld>
+</file>
+
+<file path=ppt/slides/slide15.xml><?xml version="1.0" encoding="utf-8"?>
+<p:sld xmlns:a="http://schemas.openxmlformats.org/drawingml/2006/main" xmlns:r="http://schemas.openxmlformats.org/officeDocument/2006/relationships" xmlns:p="http://schemas.openxmlformats.org/presentationml/2006/main">
+  <p:cSld>
+    <p:spTree>
+      <p:nvGrpSpPr>
+        <p:cNvPr id="1" name=""/>
+        <p:cNvGrpSpPr/>
+        <p:nvPr/>
+      </p:nvGrpSpPr>
+      <p:grpSpPr>
+        <a:xfrm>
+          <a:off x="0" y="0"/>
+          <a:ext cx="0" cy="0"/>
+          <a:chOff x="0" y="0"/>
+          <a:chExt cx="0" cy="0"/>
+        </a:xfrm>
+      </p:grpSpPr>
+      <p:pic>
+        <p:nvPicPr>
+          <p:cNvPr id="3074" name="Picture 2"/>
+          <p:cNvPicPr>
+            <a:picLocks noGrp="1" noChangeAspect="1" noChangeArrowheads="1"/>
+          </p:cNvPicPr>
+          <p:nvPr>
+            <p:ph sz="quarter" idx="10"/>
+          </p:nvPr>
+        </p:nvPicPr>
+        <p:blipFill>
+          <a:blip r:embed="rId2">
+            <a:extLst>
+              <a:ext uri="{28A0092B-C50C-407E-A947-70E740481C1C}">
+                <a14:useLocalDpi xmlns:a14="http://schemas.microsoft.com/office/drawing/2010/main" val="0"/>
+              </a:ext>
+            </a:extLst>
+          </a:blip>
+          <a:srcRect/>
+          <a:stretch>
+            <a:fillRect/>
+          </a:stretch>
+        </p:blipFill>
+        <p:spPr bwMode="auto">
+          <a:xfrm>
+            <a:off x="2196055" y="79375"/>
+            <a:ext cx="5174964" cy="5807075"/>
+          </a:xfrm>
+          <a:prstGeom prst="rect">
+            <a:avLst/>
+          </a:prstGeom>
+          <a:noFill/>
+          <a:ln>
+            <a:noFill/>
+          </a:ln>
+          <a:extLst>
+            <a:ext uri="{909E8E84-426E-40DD-AFC4-6F175D3DCCD1}">
+              <a14:hiddenFill xmlns:a14="http://schemas.microsoft.com/office/drawing/2010/main">
+                <a:solidFill>
+                  <a:schemeClr val="accent1"/>
+                </a:solidFill>
+              </a14:hiddenFill>
+            </a:ext>
+            <a:ext uri="{91240B29-F687-4F45-9708-019B960494DF}">
+              <a14:hiddenLine xmlns:a14="http://schemas.microsoft.com/office/drawing/2010/main" w="9525">
+                <a:solidFill>
+                  <a:schemeClr val="tx1"/>
+                </a:solidFill>
+                <a:miter lim="800000"/>
+                <a:headEnd/>
+                <a:tailEnd/>
+              </a14:hiddenLine>
+            </a:ext>
+          </a:extLst>
+        </p:spPr>
+      </p:pic>
+      <p:sp>
+        <p:nvSpPr>
+          <p:cNvPr id="5" name="TextBox 4"/>
+          <p:cNvSpPr txBox="1"/>
+          <p:nvPr/>
+        </p:nvSpPr>
+        <p:spPr>
+          <a:xfrm>
+            <a:off x="130175" y="683567"/>
+            <a:ext cx="2807307" cy="369332"/>
+          </a:xfrm>
+          <a:prstGeom prst="rect">
+            <a:avLst/>
+          </a:prstGeom>
+          <a:noFill/>
+        </p:spPr>
+        <p:txBody>
+          <a:bodyPr wrap="none" rtlCol="0">
+            <a:spAutoFit/>
+          </a:bodyPr>
+          <a:lstStyle/>
+          <a:p>
+            <a:r>
+              <a:rPr lang="en-IE" sz="1800" b="1" dirty="0" smtClean="0"/>
+              <a:t>Head First : Design Patterns</a:t>
+            </a:r>
+            <a:endParaRPr lang="en-IE" sz="1800" b="1" dirty="0"/>
+          </a:p>
+        </p:txBody>
+      </p:sp>
+      <p:sp>
+        <p:nvSpPr>
+          <p:cNvPr id="2" name="Title 1"/>
+          <p:cNvSpPr>
+            <a:spLocks noGrp="1"/>
+          </p:cNvSpPr>
+          <p:nvPr>
+            <p:ph type="title"/>
+          </p:nvPr>
+        </p:nvSpPr>
+        <p:spPr>
+          <a:xfrm>
+            <a:off x="0" y="53961"/>
+            <a:ext cx="9144000" cy="613427"/>
+          </a:xfrm>
+        </p:spPr>
+        <p:txBody>
+          <a:bodyPr>
+            <a:normAutofit/>
+          </a:bodyPr>
+          <a:lstStyle/>
+          <a:p>
+            <a:r>
+              <a:rPr lang="en-IE" dirty="0" smtClean="0"/>
+              <a:t>The Abstract Factory Pattern</a:t>
+            </a:r>
+            <a:endParaRPr lang="en-IE" dirty="0"/>
+          </a:p>
+        </p:txBody>
+      </p:sp>
+    </p:spTree>
+    <p:extLst>
+      <p:ext uri="{BB962C8B-B14F-4D97-AF65-F5344CB8AC3E}">
+        <p14:creationId xmlns:p14="http://schemas.microsoft.com/office/powerpoint/2010/main" val="3402767709"/>
+      </p:ext>
+    </p:extLst>
+  </p:cSld>
+  <p:clrMapOvr>
+    <a:masterClrMapping/>
+  </p:clrMapOvr>
+  <p:timing>
+    <p:tnLst>
+      <p:par>
+        <p:cTn id="1" dur="indefinite" restart="never" nodeType="tmRoot"/>
+      </p:par>
+    </p:tnLst>
+  </p:timing>
+</p:sld>
+</file>
+
+<file path=ppt/slides/slide16.xml><?xml version="1.0" encoding="utf-8"?>
+<p:sld xmlns:a="http://schemas.openxmlformats.org/drawingml/2006/main" xmlns:r="http://schemas.openxmlformats.org/officeDocument/2006/relationships" xmlns:p="http://schemas.openxmlformats.org/presentationml/2006/main">
+  <p:cSld>
+    <p:spTree>
+      <p:nvGrpSpPr>
+        <p:cNvPr id="1" name=""/>
+        <p:cNvGrpSpPr/>
+        <p:nvPr/>
+      </p:nvGrpSpPr>
+      <p:grpSpPr>
+        <a:xfrm>
+          <a:off x="0" y="0"/>
+          <a:ext cx="0" cy="0"/>
+          <a:chOff x="0" y="0"/>
+          <a:chExt cx="0" cy="0"/>
+        </a:xfrm>
+      </p:grpSpPr>
+      <p:sp>
+        <p:nvSpPr>
+          <p:cNvPr id="2" name="Title 1"/>
+          <p:cNvSpPr>
+            <a:spLocks noGrp="1"/>
+          </p:cNvSpPr>
+          <p:nvPr>
+            <p:ph type="title"/>
+          </p:nvPr>
+        </p:nvSpPr>
+        <p:spPr>
+          <a:xfrm>
+            <a:off x="0" y="53961"/>
+            <a:ext cx="9144000" cy="613427"/>
+          </a:xfrm>
+        </p:spPr>
+        <p:txBody>
+          <a:bodyPr>
+            <a:normAutofit/>
+          </a:bodyPr>
+          <a:lstStyle/>
+          <a:p>
+            <a:r>
+              <a:rPr lang="en-IE" dirty="0" smtClean="0"/>
+              <a:t>The Abstract Factory Pattern</a:t>
+            </a:r>
+            <a:endParaRPr lang="en-IE" dirty="0"/>
+          </a:p>
+        </p:txBody>
+      </p:sp>
+      <p:sp>
+        <p:nvSpPr>
+          <p:cNvPr id="3" name="Content Placeholder 2"/>
+          <p:cNvSpPr>
+            <a:spLocks noGrp="1"/>
+          </p:cNvSpPr>
+          <p:nvPr>
+            <p:ph sz="quarter" idx="10"/>
+          </p:nvPr>
+        </p:nvSpPr>
+        <p:spPr>
+          <a:xfrm>
+            <a:off x="152400" y="800100"/>
+            <a:ext cx="8661400" cy="3136900"/>
+          </a:xfrm>
+          <a:ln w="22225">
+            <a:solidFill>
+              <a:schemeClr val="accent2"/>
+            </a:solidFill>
+          </a:ln>
+        </p:spPr>
+        <p:txBody>
+          <a:bodyPr/>
+          <a:lstStyle/>
+          <a:p>
+            <a:pPr marL="0" indent="0">
+              <a:buNone/>
+            </a:pPr>
+            <a:r>
+              <a:rPr lang="en-IE" sz="1400" dirty="0" smtClean="0">
+                <a:solidFill>
+                  <a:schemeClr val="tx1">
+                    <a:lumMod val="95000"/>
+                    <a:lumOff val="5000"/>
+                  </a:schemeClr>
+                </a:solidFill>
+                <a:latin typeface="Courier New" panose="02070309020205020404" pitchFamily="49" charset="0"/>
+                <a:cs typeface="Courier New" panose="02070309020205020404" pitchFamily="49" charset="0"/>
+              </a:rPr>
+              <a:t>Pizza</a:t>
+            </a:r>
+            <a:r>
+              <a:rPr lang="en-IE" sz="1400" dirty="0">
+                <a:solidFill>
+                  <a:schemeClr val="tx1">
+                    <a:lumMod val="95000"/>
+                    <a:lumOff val="5000"/>
+                  </a:schemeClr>
+                </a:solidFill>
+                <a:latin typeface="Courier New" panose="02070309020205020404" pitchFamily="49" charset="0"/>
+                <a:cs typeface="Courier New" panose="02070309020205020404" pitchFamily="49" charset="0"/>
+              </a:rPr>
+              <a:t>* </a:t>
+            </a:r>
+            <a:r>
+              <a:rPr lang="en-IE" sz="1400" dirty="0" err="1">
+                <a:solidFill>
+                  <a:schemeClr val="tx1">
+                    <a:lumMod val="95000"/>
+                    <a:lumOff val="5000"/>
+                  </a:schemeClr>
+                </a:solidFill>
+                <a:latin typeface="Courier New" panose="02070309020205020404" pitchFamily="49" charset="0"/>
+                <a:cs typeface="Courier New" panose="02070309020205020404" pitchFamily="49" charset="0"/>
+              </a:rPr>
+              <a:t>ChicagoPizzaStore</a:t>
+            </a:r>
+            <a:r>
+              <a:rPr lang="en-IE" sz="1400" dirty="0">
+                <a:solidFill>
+                  <a:schemeClr val="tx1">
+                    <a:lumMod val="95000"/>
+                    <a:lumOff val="5000"/>
+                  </a:schemeClr>
+                </a:solidFill>
+                <a:latin typeface="Courier New" panose="02070309020205020404" pitchFamily="49" charset="0"/>
+                <a:cs typeface="Courier New" panose="02070309020205020404" pitchFamily="49" charset="0"/>
+              </a:rPr>
+              <a:t>::</a:t>
+            </a:r>
+            <a:r>
+              <a:rPr lang="en-IE" sz="1400" dirty="0" err="1">
+                <a:solidFill>
+                  <a:schemeClr val="tx1">
+                    <a:lumMod val="95000"/>
+                    <a:lumOff val="5000"/>
+                  </a:schemeClr>
+                </a:solidFill>
+                <a:latin typeface="Courier New" panose="02070309020205020404" pitchFamily="49" charset="0"/>
+                <a:cs typeface="Courier New" panose="02070309020205020404" pitchFamily="49" charset="0"/>
+              </a:rPr>
+              <a:t>createPizza</a:t>
+            </a:r>
+            <a:r>
+              <a:rPr lang="en-IE" sz="1400" dirty="0">
+                <a:solidFill>
+                  <a:schemeClr val="tx1">
+                    <a:lumMod val="95000"/>
+                    <a:lumOff val="5000"/>
+                  </a:schemeClr>
+                </a:solidFill>
+                <a:latin typeface="Courier New" panose="02070309020205020404" pitchFamily="49" charset="0"/>
+                <a:cs typeface="Courier New" panose="02070309020205020404" pitchFamily="49" charset="0"/>
+              </a:rPr>
+              <a:t>(</a:t>
+            </a:r>
+            <a:r>
+              <a:rPr lang="en-IE" sz="1400" dirty="0" err="1">
+                <a:solidFill>
+                  <a:schemeClr val="tx1">
+                    <a:lumMod val="95000"/>
+                    <a:lumOff val="5000"/>
+                  </a:schemeClr>
+                </a:solidFill>
+                <a:latin typeface="Courier New" panose="02070309020205020404" pitchFamily="49" charset="0"/>
+                <a:cs typeface="Courier New" panose="02070309020205020404" pitchFamily="49" charset="0"/>
+              </a:rPr>
+              <a:t>std</a:t>
+            </a:r>
+            <a:r>
+              <a:rPr lang="en-IE" sz="1400" dirty="0">
+                <a:solidFill>
+                  <a:schemeClr val="tx1">
+                    <a:lumMod val="95000"/>
+                    <a:lumOff val="5000"/>
+                  </a:schemeClr>
+                </a:solidFill>
+                <a:latin typeface="Courier New" panose="02070309020205020404" pitchFamily="49" charset="0"/>
+                <a:cs typeface="Courier New" panose="02070309020205020404" pitchFamily="49" charset="0"/>
+              </a:rPr>
+              <a:t>::string </a:t>
+            </a:r>
+            <a:r>
+              <a:rPr lang="en-IE" sz="1400" dirty="0" err="1">
+                <a:solidFill>
+                  <a:schemeClr val="tx1">
+                    <a:lumMod val="95000"/>
+                    <a:lumOff val="5000"/>
+                  </a:schemeClr>
+                </a:solidFill>
+                <a:latin typeface="Courier New" panose="02070309020205020404" pitchFamily="49" charset="0"/>
+                <a:cs typeface="Courier New" panose="02070309020205020404" pitchFamily="49" charset="0"/>
+              </a:rPr>
+              <a:t>arg_pizzaType</a:t>
+            </a:r>
+            <a:r>
+              <a:rPr lang="en-IE" sz="1400" dirty="0">
+                <a:solidFill>
+                  <a:schemeClr val="tx1">
+                    <a:lumMod val="95000"/>
+                    <a:lumOff val="5000"/>
+                  </a:schemeClr>
+                </a:solidFill>
+                <a:latin typeface="Courier New" panose="02070309020205020404" pitchFamily="49" charset="0"/>
+                <a:cs typeface="Courier New" panose="02070309020205020404" pitchFamily="49" charset="0"/>
+              </a:rPr>
+              <a:t>)</a:t>
+            </a:r>
+          </a:p>
+          <a:p>
+            <a:pPr marL="0" indent="0">
+              <a:buNone/>
+            </a:pPr>
+            <a:r>
+              <a:rPr lang="en-IE" sz="1400" dirty="0">
+                <a:solidFill>
+                  <a:schemeClr val="tx1">
+                    <a:lumMod val="95000"/>
+                    <a:lumOff val="5000"/>
+                  </a:schemeClr>
+                </a:solidFill>
+                <a:latin typeface="Courier New" panose="02070309020205020404" pitchFamily="49" charset="0"/>
+                <a:cs typeface="Courier New" panose="02070309020205020404" pitchFamily="49" charset="0"/>
+              </a:rPr>
+              <a:t>{</a:t>
+            </a:r>
+          </a:p>
+          <a:p>
+            <a:pPr marL="0" indent="0">
+              <a:buNone/>
+            </a:pPr>
+            <a:r>
+              <a:rPr lang="en-IE" sz="1400" dirty="0" smtClean="0">
+                <a:solidFill>
+                  <a:schemeClr val="tx1">
+                    <a:lumMod val="95000"/>
+                    <a:lumOff val="5000"/>
+                  </a:schemeClr>
+                </a:solidFill>
+                <a:latin typeface="Courier New" panose="02070309020205020404" pitchFamily="49" charset="0"/>
+                <a:cs typeface="Courier New" panose="02070309020205020404" pitchFamily="49" charset="0"/>
+              </a:rPr>
+              <a:t>	if </a:t>
+            </a:r>
+            <a:r>
+              <a:rPr lang="en-IE" sz="1400" dirty="0">
+                <a:solidFill>
+                  <a:schemeClr val="tx1">
+                    <a:lumMod val="95000"/>
+                    <a:lumOff val="5000"/>
+                  </a:schemeClr>
+                </a:solidFill>
+                <a:latin typeface="Courier New" panose="02070309020205020404" pitchFamily="49" charset="0"/>
+                <a:cs typeface="Courier New" panose="02070309020205020404" pitchFamily="49" charset="0"/>
+              </a:rPr>
+              <a:t>(</a:t>
+            </a:r>
+            <a:r>
+              <a:rPr lang="en-IE" sz="1400" dirty="0" err="1">
+                <a:solidFill>
+                  <a:schemeClr val="tx1">
+                    <a:lumMod val="95000"/>
+                    <a:lumOff val="5000"/>
+                  </a:schemeClr>
+                </a:solidFill>
+                <a:latin typeface="Courier New" panose="02070309020205020404" pitchFamily="49" charset="0"/>
+                <a:cs typeface="Courier New" panose="02070309020205020404" pitchFamily="49" charset="0"/>
+              </a:rPr>
+              <a:t>arg_pizzaType</a:t>
+            </a:r>
+            <a:r>
+              <a:rPr lang="en-IE" sz="1400" dirty="0">
+                <a:solidFill>
+                  <a:schemeClr val="tx1">
+                    <a:lumMod val="95000"/>
+                    <a:lumOff val="5000"/>
+                  </a:schemeClr>
+                </a:solidFill>
+                <a:latin typeface="Courier New" panose="02070309020205020404" pitchFamily="49" charset="0"/>
+                <a:cs typeface="Courier New" panose="02070309020205020404" pitchFamily="49" charset="0"/>
+              </a:rPr>
+              <a:t> == "cheese")</a:t>
+            </a:r>
+          </a:p>
+          <a:p>
+            <a:pPr marL="0" indent="0">
+              <a:buNone/>
+            </a:pPr>
+            <a:r>
+              <a:rPr lang="en-IE" sz="1400" dirty="0" smtClean="0">
+                <a:solidFill>
+                  <a:schemeClr val="tx1">
+                    <a:lumMod val="95000"/>
+                    <a:lumOff val="5000"/>
+                  </a:schemeClr>
+                </a:solidFill>
+                <a:latin typeface="Courier New" panose="02070309020205020404" pitchFamily="49" charset="0"/>
+                <a:cs typeface="Courier New" panose="02070309020205020404" pitchFamily="49" charset="0"/>
+              </a:rPr>
+              <a:t>	{</a:t>
+            </a:r>
+            <a:endParaRPr lang="en-IE" sz="1400" dirty="0">
+              <a:solidFill>
+                <a:schemeClr val="tx1">
+                  <a:lumMod val="95000"/>
+                  <a:lumOff val="5000"/>
+                </a:schemeClr>
+              </a:solidFill>
+              <a:latin typeface="Courier New" panose="02070309020205020404" pitchFamily="49" charset="0"/>
+              <a:cs typeface="Courier New" panose="02070309020205020404" pitchFamily="49" charset="0"/>
+            </a:endParaRPr>
+          </a:p>
+          <a:p>
+            <a:pPr marL="0" indent="0">
+              <a:buNone/>
+            </a:pPr>
+            <a:r>
+              <a:rPr lang="en-IE" sz="1400" dirty="0" smtClean="0">
+                <a:solidFill>
+                  <a:schemeClr val="tx1">
+                    <a:lumMod val="95000"/>
+                    <a:lumOff val="5000"/>
+                  </a:schemeClr>
+                </a:solidFill>
+                <a:latin typeface="Courier New" panose="02070309020205020404" pitchFamily="49" charset="0"/>
+                <a:cs typeface="Courier New" panose="02070309020205020404" pitchFamily="49" charset="0"/>
+              </a:rPr>
+              <a:t>		this-</a:t>
+            </a:r>
+            <a:r>
+              <a:rPr lang="en-IE" sz="1400" dirty="0">
+                <a:solidFill>
+                  <a:schemeClr val="tx1">
+                    <a:lumMod val="95000"/>
+                    <a:lumOff val="5000"/>
+                  </a:schemeClr>
+                </a:solidFill>
+                <a:latin typeface="Courier New" panose="02070309020205020404" pitchFamily="49" charset="0"/>
+                <a:cs typeface="Courier New" panose="02070309020205020404" pitchFamily="49" charset="0"/>
+              </a:rPr>
+              <a:t>&gt;pizza = new </a:t>
+            </a:r>
+            <a:r>
+              <a:rPr lang="en-IE" sz="1400" dirty="0" err="1">
+                <a:solidFill>
+                  <a:schemeClr val="tx1">
+                    <a:lumMod val="95000"/>
+                    <a:lumOff val="5000"/>
+                  </a:schemeClr>
+                </a:solidFill>
+                <a:latin typeface="Courier New" panose="02070309020205020404" pitchFamily="49" charset="0"/>
+                <a:cs typeface="Courier New" panose="02070309020205020404" pitchFamily="49" charset="0"/>
+              </a:rPr>
+              <a:t>ChicagoStyleCheesePizza</a:t>
+            </a:r>
+            <a:r>
+              <a:rPr lang="en-IE" sz="1400" dirty="0">
+                <a:solidFill>
+                  <a:schemeClr val="tx1">
+                    <a:lumMod val="95000"/>
+                    <a:lumOff val="5000"/>
+                  </a:schemeClr>
+                </a:solidFill>
+                <a:latin typeface="Courier New" panose="02070309020205020404" pitchFamily="49" charset="0"/>
+                <a:cs typeface="Courier New" panose="02070309020205020404" pitchFamily="49" charset="0"/>
+              </a:rPr>
+              <a:t>(</a:t>
+            </a:r>
+            <a:r>
+              <a:rPr lang="en-IE" sz="1400" b="1" dirty="0">
+                <a:solidFill>
+                  <a:srgbClr val="C00000"/>
+                </a:solidFill>
+                <a:latin typeface="Courier New" panose="02070309020205020404" pitchFamily="49" charset="0"/>
+                <a:cs typeface="Courier New" panose="02070309020205020404" pitchFamily="49" charset="0"/>
+              </a:rPr>
+              <a:t>new </a:t>
+            </a:r>
+            <a:r>
+              <a:rPr lang="en-IE" sz="1400" b="1" dirty="0" smtClean="0">
+                <a:solidFill>
+                  <a:srgbClr val="C00000"/>
+                </a:solidFill>
+                <a:latin typeface="Courier New" panose="02070309020205020404" pitchFamily="49" charset="0"/>
+                <a:cs typeface="Courier New" panose="02070309020205020404" pitchFamily="49" charset="0"/>
+              </a:rPr>
+              <a:t>					</a:t>
+            </a:r>
+            <a:r>
+              <a:rPr lang="en-IE" sz="1400" b="1" dirty="0" err="1" smtClean="0">
+                <a:solidFill>
+                  <a:srgbClr val="C00000"/>
+                </a:solidFill>
+                <a:latin typeface="Courier New" panose="02070309020205020404" pitchFamily="49" charset="0"/>
+                <a:cs typeface="Courier New" panose="02070309020205020404" pitchFamily="49" charset="0"/>
+              </a:rPr>
+              <a:t>ChicagoPizzaIngredientFactory</a:t>
+            </a:r>
+            <a:r>
+              <a:rPr lang="en-IE" sz="1400" b="1" dirty="0">
+                <a:solidFill>
+                  <a:srgbClr val="C00000"/>
+                </a:solidFill>
+                <a:latin typeface="Courier New" panose="02070309020205020404" pitchFamily="49" charset="0"/>
+                <a:cs typeface="Courier New" panose="02070309020205020404" pitchFamily="49" charset="0"/>
+              </a:rPr>
+              <a:t>()</a:t>
+            </a:r>
+            <a:r>
+              <a:rPr lang="en-IE" sz="1400" dirty="0">
+                <a:solidFill>
+                  <a:schemeClr val="tx1">
+                    <a:lumMod val="95000"/>
+                    <a:lumOff val="5000"/>
+                  </a:schemeClr>
+                </a:solidFill>
+                <a:latin typeface="Courier New" panose="02070309020205020404" pitchFamily="49" charset="0"/>
+                <a:cs typeface="Courier New" panose="02070309020205020404" pitchFamily="49" charset="0"/>
+              </a:rPr>
+              <a:t>);</a:t>
+            </a:r>
+          </a:p>
+          <a:p>
+            <a:pPr marL="0" indent="0">
+              <a:buNone/>
+            </a:pPr>
+            <a:r>
+              <a:rPr lang="en-IE" sz="1400" dirty="0" smtClean="0">
+                <a:solidFill>
+                  <a:schemeClr val="tx1">
+                    <a:lumMod val="95000"/>
+                    <a:lumOff val="5000"/>
+                  </a:schemeClr>
+                </a:solidFill>
+                <a:latin typeface="Courier New" panose="02070309020205020404" pitchFamily="49" charset="0"/>
+                <a:cs typeface="Courier New" panose="02070309020205020404" pitchFamily="49" charset="0"/>
+              </a:rPr>
+              <a:t>	}</a:t>
+            </a:r>
+            <a:endParaRPr lang="en-IE" sz="1400" dirty="0">
+              <a:solidFill>
+                <a:schemeClr val="tx1">
+                  <a:lumMod val="95000"/>
+                  <a:lumOff val="5000"/>
+                </a:schemeClr>
+              </a:solidFill>
+              <a:latin typeface="Courier New" panose="02070309020205020404" pitchFamily="49" charset="0"/>
+              <a:cs typeface="Courier New" panose="02070309020205020404" pitchFamily="49" charset="0"/>
+            </a:endParaRPr>
+          </a:p>
+          <a:p>
+            <a:pPr marL="0" indent="0">
+              <a:buNone/>
+            </a:pPr>
+            <a:r>
+              <a:rPr lang="en-IE" sz="1400" dirty="0" smtClean="0">
+                <a:solidFill>
+                  <a:schemeClr val="tx1">
+                    <a:lumMod val="95000"/>
+                    <a:lumOff val="5000"/>
+                  </a:schemeClr>
+                </a:solidFill>
+                <a:latin typeface="Courier New" panose="02070309020205020404" pitchFamily="49" charset="0"/>
+                <a:cs typeface="Courier New" panose="02070309020205020404" pitchFamily="49" charset="0"/>
+              </a:rPr>
+              <a:t>	else </a:t>
+            </a:r>
+            <a:r>
+              <a:rPr lang="en-IE" sz="1400" dirty="0">
+                <a:solidFill>
+                  <a:schemeClr val="tx1">
+                    <a:lumMod val="95000"/>
+                    <a:lumOff val="5000"/>
+                  </a:schemeClr>
+                </a:solidFill>
+                <a:latin typeface="Courier New" panose="02070309020205020404" pitchFamily="49" charset="0"/>
+                <a:cs typeface="Courier New" panose="02070309020205020404" pitchFamily="49" charset="0"/>
+              </a:rPr>
+              <a:t>if (</a:t>
+            </a:r>
+            <a:r>
+              <a:rPr lang="en-IE" sz="1400" dirty="0" err="1">
+                <a:solidFill>
+                  <a:schemeClr val="tx1">
+                    <a:lumMod val="95000"/>
+                    <a:lumOff val="5000"/>
+                  </a:schemeClr>
+                </a:solidFill>
+                <a:latin typeface="Courier New" panose="02070309020205020404" pitchFamily="49" charset="0"/>
+                <a:cs typeface="Courier New" panose="02070309020205020404" pitchFamily="49" charset="0"/>
+              </a:rPr>
+              <a:t>arg_pizzaType</a:t>
+            </a:r>
+            <a:r>
+              <a:rPr lang="en-IE" sz="1400" dirty="0">
+                <a:solidFill>
+                  <a:schemeClr val="tx1">
+                    <a:lumMod val="95000"/>
+                    <a:lumOff val="5000"/>
+                  </a:schemeClr>
+                </a:solidFill>
+                <a:latin typeface="Courier New" panose="02070309020205020404" pitchFamily="49" charset="0"/>
+                <a:cs typeface="Courier New" panose="02070309020205020404" pitchFamily="49" charset="0"/>
+              </a:rPr>
+              <a:t> == "pepperoni</a:t>
+            </a:r>
+            <a:r>
+              <a:rPr lang="en-IE" sz="1400" dirty="0" smtClean="0">
+                <a:solidFill>
+                  <a:schemeClr val="tx1">
+                    <a:lumMod val="95000"/>
+                    <a:lumOff val="5000"/>
+                  </a:schemeClr>
+                </a:solidFill>
+                <a:latin typeface="Courier New" panose="02070309020205020404" pitchFamily="49" charset="0"/>
+                <a:cs typeface="Courier New" panose="02070309020205020404" pitchFamily="49" charset="0"/>
+              </a:rPr>
+              <a:t>")</a:t>
+            </a:r>
+          </a:p>
+          <a:p>
+            <a:pPr marL="0" indent="0">
+              <a:buNone/>
+            </a:pPr>
+            <a:r>
+              <a:rPr lang="en-IE" sz="1400" dirty="0" smtClean="0">
+                <a:solidFill>
+                  <a:srgbClr val="C00000"/>
+                </a:solidFill>
+                <a:latin typeface="Courier New" panose="02070309020205020404" pitchFamily="49" charset="0"/>
+                <a:cs typeface="Courier New" panose="02070309020205020404" pitchFamily="49" charset="0"/>
+              </a:rPr>
+              <a:t>	...</a:t>
+            </a:r>
+          </a:p>
+          <a:p>
+            <a:pPr marL="0" indent="0">
+              <a:buNone/>
+            </a:pPr>
+            <a:endParaRPr lang="en-IE" sz="1400" dirty="0">
+              <a:solidFill>
+                <a:srgbClr val="C00000"/>
+              </a:solidFill>
+              <a:latin typeface="Courier New" panose="02070309020205020404" pitchFamily="49" charset="0"/>
+              <a:cs typeface="Courier New" panose="02070309020205020404" pitchFamily="49" charset="0"/>
+            </a:endParaRPr>
+          </a:p>
+          <a:p>
+            <a:pPr marL="0" indent="0">
+              <a:buNone/>
+            </a:pPr>
+            <a:r>
+              <a:rPr lang="en-IE" sz="1400" dirty="0" smtClean="0">
+                <a:solidFill>
+                  <a:schemeClr val="tx1">
+                    <a:lumMod val="95000"/>
+                    <a:lumOff val="5000"/>
+                  </a:schemeClr>
+                </a:solidFill>
+                <a:latin typeface="Courier New" panose="02070309020205020404" pitchFamily="49" charset="0"/>
+                <a:cs typeface="Courier New" panose="02070309020205020404" pitchFamily="49" charset="0"/>
+              </a:rPr>
+              <a:t>	return </a:t>
+            </a:r>
+            <a:r>
+              <a:rPr lang="en-IE" sz="1400" dirty="0">
+                <a:solidFill>
+                  <a:schemeClr val="tx1">
+                    <a:lumMod val="95000"/>
+                    <a:lumOff val="5000"/>
+                  </a:schemeClr>
+                </a:solidFill>
+                <a:latin typeface="Courier New" panose="02070309020205020404" pitchFamily="49" charset="0"/>
+                <a:cs typeface="Courier New" panose="02070309020205020404" pitchFamily="49" charset="0"/>
+              </a:rPr>
+              <a:t>pizza;</a:t>
+            </a:r>
+          </a:p>
+          <a:p>
+            <a:pPr marL="0" indent="0">
+              <a:buNone/>
+            </a:pPr>
+            <a:r>
+              <a:rPr lang="en-IE" sz="1400" dirty="0">
+                <a:solidFill>
+                  <a:schemeClr val="tx1">
+                    <a:lumMod val="95000"/>
+                    <a:lumOff val="5000"/>
+                  </a:schemeClr>
+                </a:solidFill>
+                <a:latin typeface="Courier New" panose="02070309020205020404" pitchFamily="49" charset="0"/>
+                <a:cs typeface="Courier New" panose="02070309020205020404" pitchFamily="49" charset="0"/>
+              </a:rPr>
+              <a:t>}</a:t>
+            </a:r>
+            <a:endParaRPr lang="en-IE" sz="3600" dirty="0">
+              <a:solidFill>
+                <a:schemeClr val="tx1">
+                  <a:lumMod val="95000"/>
+                  <a:lumOff val="5000"/>
+                </a:schemeClr>
+              </a:solidFill>
+              <a:latin typeface="Courier New" panose="02070309020205020404" pitchFamily="49" charset="0"/>
+              <a:cs typeface="Courier New" panose="02070309020205020404" pitchFamily="49" charset="0"/>
+            </a:endParaRPr>
+          </a:p>
+        </p:txBody>
+      </p:sp>
+      <p:sp>
+        <p:nvSpPr>
+          <p:cNvPr id="4" name="TextBox 3"/>
+          <p:cNvSpPr txBox="1"/>
+          <p:nvPr/>
+        </p:nvSpPr>
+        <p:spPr>
+          <a:xfrm>
+            <a:off x="152400" y="4241800"/>
+            <a:ext cx="8661400" cy="1600438"/>
+          </a:xfrm>
+          <a:prstGeom prst="rect">
+            <a:avLst/>
+          </a:prstGeom>
+          <a:noFill/>
+          <a:ln w="22225">
+            <a:solidFill>
+              <a:srgbClr val="00B050"/>
+            </a:solidFill>
+          </a:ln>
+        </p:spPr>
+        <p:txBody>
+          <a:bodyPr wrap="square" rtlCol="0">
+            <a:spAutoFit/>
+          </a:bodyPr>
+          <a:lstStyle/>
+          <a:p>
+            <a:r>
+              <a:rPr lang="en-IE" sz="1400" dirty="0">
+                <a:latin typeface="Courier New" panose="02070309020205020404" pitchFamily="49" charset="0"/>
+                <a:cs typeface="Courier New" panose="02070309020205020404" pitchFamily="49" charset="0"/>
+              </a:rPr>
+              <a:t>virtual void </a:t>
+            </a:r>
+            <a:r>
+              <a:rPr lang="en-IE" sz="1400" dirty="0" err="1">
+                <a:latin typeface="Courier New" panose="02070309020205020404" pitchFamily="49" charset="0"/>
+                <a:cs typeface="Courier New" panose="02070309020205020404" pitchFamily="49" charset="0"/>
+              </a:rPr>
+              <a:t>setupIngredients</a:t>
+            </a:r>
+            <a:r>
+              <a:rPr lang="en-IE" sz="1400" dirty="0">
+                <a:latin typeface="Courier New" panose="02070309020205020404" pitchFamily="49" charset="0"/>
+                <a:cs typeface="Courier New" panose="02070309020205020404" pitchFamily="49" charset="0"/>
+              </a:rPr>
+              <a:t>(</a:t>
+            </a:r>
+            <a:r>
+              <a:rPr lang="en-IE" sz="1400" dirty="0" err="1">
+                <a:latin typeface="Courier New" panose="02070309020205020404" pitchFamily="49" charset="0"/>
+                <a:cs typeface="Courier New" panose="02070309020205020404" pitchFamily="49" charset="0"/>
+              </a:rPr>
+              <a:t>PizzaIngredientFactory</a:t>
+            </a:r>
+            <a:r>
+              <a:rPr lang="en-IE" sz="1400" dirty="0">
+                <a:latin typeface="Courier New" panose="02070309020205020404" pitchFamily="49" charset="0"/>
+                <a:cs typeface="Courier New" panose="02070309020205020404" pitchFamily="49" charset="0"/>
+              </a:rPr>
+              <a:t> *</a:t>
+            </a:r>
+            <a:r>
+              <a:rPr lang="en-IE" sz="1400" dirty="0" err="1">
+                <a:latin typeface="Courier New" panose="02070309020205020404" pitchFamily="49" charset="0"/>
+                <a:cs typeface="Courier New" panose="02070309020205020404" pitchFamily="49" charset="0"/>
+              </a:rPr>
+              <a:t>arg_ingredientFactory</a:t>
+            </a:r>
+            <a:r>
+              <a:rPr lang="en-IE" sz="1400" dirty="0">
+                <a:latin typeface="Courier New" panose="02070309020205020404" pitchFamily="49" charset="0"/>
+                <a:cs typeface="Courier New" panose="02070309020205020404" pitchFamily="49" charset="0"/>
+              </a:rPr>
+              <a:t>)</a:t>
+            </a:r>
+          </a:p>
+          <a:p>
+            <a:r>
+              <a:rPr lang="en-IE" sz="1400" dirty="0">
+                <a:latin typeface="Courier New" panose="02070309020205020404" pitchFamily="49" charset="0"/>
+                <a:cs typeface="Courier New" panose="02070309020205020404" pitchFamily="49" charset="0"/>
+              </a:rPr>
+              <a:t>{</a:t>
+            </a:r>
+          </a:p>
+          <a:p>
+            <a:r>
+              <a:rPr lang="en-IE" sz="1400" dirty="0" smtClean="0">
+                <a:solidFill>
+                  <a:srgbClr val="0070C0"/>
+                </a:solidFill>
+                <a:latin typeface="Courier New" panose="02070309020205020404" pitchFamily="49" charset="0"/>
+                <a:cs typeface="Courier New" panose="02070309020205020404" pitchFamily="49" charset="0"/>
+              </a:rPr>
+              <a:t>	this-</a:t>
+            </a:r>
+            <a:r>
+              <a:rPr lang="en-IE" sz="1400" dirty="0">
+                <a:solidFill>
+                  <a:srgbClr val="0070C0"/>
+                </a:solidFill>
+                <a:latin typeface="Courier New" panose="02070309020205020404" pitchFamily="49" charset="0"/>
+                <a:cs typeface="Courier New" panose="02070309020205020404" pitchFamily="49" charset="0"/>
+              </a:rPr>
+              <a:t>&gt;dough = </a:t>
+            </a:r>
+            <a:r>
+              <a:rPr lang="en-IE" sz="1400" dirty="0" err="1">
+                <a:solidFill>
+                  <a:srgbClr val="0070C0"/>
+                </a:solidFill>
+                <a:latin typeface="Courier New" panose="02070309020205020404" pitchFamily="49" charset="0"/>
+                <a:cs typeface="Courier New" panose="02070309020205020404" pitchFamily="49" charset="0"/>
+              </a:rPr>
+              <a:t>arg_ingredientFactory</a:t>
+            </a:r>
+            <a:r>
+              <a:rPr lang="en-IE" sz="1400" dirty="0">
+                <a:solidFill>
+                  <a:srgbClr val="0070C0"/>
+                </a:solidFill>
+                <a:latin typeface="Courier New" panose="02070309020205020404" pitchFamily="49" charset="0"/>
+                <a:cs typeface="Courier New" panose="02070309020205020404" pitchFamily="49" charset="0"/>
+              </a:rPr>
+              <a:t>-&gt;</a:t>
+            </a:r>
+            <a:r>
+              <a:rPr lang="en-IE" sz="1400" dirty="0" err="1">
+                <a:solidFill>
+                  <a:srgbClr val="0070C0"/>
+                </a:solidFill>
+                <a:latin typeface="Courier New" panose="02070309020205020404" pitchFamily="49" charset="0"/>
+                <a:cs typeface="Courier New" panose="02070309020205020404" pitchFamily="49" charset="0"/>
+              </a:rPr>
+              <a:t>createDough</a:t>
+            </a:r>
+            <a:r>
+              <a:rPr lang="en-IE" sz="1400" dirty="0">
+                <a:solidFill>
+                  <a:srgbClr val="0070C0"/>
+                </a:solidFill>
+                <a:latin typeface="Courier New" panose="02070309020205020404" pitchFamily="49" charset="0"/>
+                <a:cs typeface="Courier New" panose="02070309020205020404" pitchFamily="49" charset="0"/>
+              </a:rPr>
+              <a:t>();</a:t>
+            </a:r>
+          </a:p>
+          <a:p>
+            <a:r>
+              <a:rPr lang="en-IE" sz="1400" dirty="0" smtClean="0">
+                <a:solidFill>
+                  <a:srgbClr val="0070C0"/>
+                </a:solidFill>
+                <a:latin typeface="Courier New" panose="02070309020205020404" pitchFamily="49" charset="0"/>
+                <a:cs typeface="Courier New" panose="02070309020205020404" pitchFamily="49" charset="0"/>
+              </a:rPr>
+              <a:t>	this-</a:t>
+            </a:r>
+            <a:r>
+              <a:rPr lang="en-IE" sz="1400" dirty="0">
+                <a:solidFill>
+                  <a:srgbClr val="0070C0"/>
+                </a:solidFill>
+                <a:latin typeface="Courier New" panose="02070309020205020404" pitchFamily="49" charset="0"/>
+                <a:cs typeface="Courier New" panose="02070309020205020404" pitchFamily="49" charset="0"/>
+              </a:rPr>
+              <a:t>&gt;sauce = </a:t>
+            </a:r>
+            <a:r>
+              <a:rPr lang="en-IE" sz="1400" dirty="0" err="1">
+                <a:solidFill>
+                  <a:srgbClr val="0070C0"/>
+                </a:solidFill>
+                <a:latin typeface="Courier New" panose="02070309020205020404" pitchFamily="49" charset="0"/>
+                <a:cs typeface="Courier New" panose="02070309020205020404" pitchFamily="49" charset="0"/>
+              </a:rPr>
+              <a:t>arg_ingredientFactory</a:t>
+            </a:r>
+            <a:r>
+              <a:rPr lang="en-IE" sz="1400" dirty="0">
+                <a:solidFill>
+                  <a:srgbClr val="0070C0"/>
+                </a:solidFill>
+                <a:latin typeface="Courier New" panose="02070309020205020404" pitchFamily="49" charset="0"/>
+                <a:cs typeface="Courier New" panose="02070309020205020404" pitchFamily="49" charset="0"/>
+              </a:rPr>
+              <a:t>-&gt;</a:t>
+            </a:r>
+            <a:r>
+              <a:rPr lang="en-IE" sz="1400" dirty="0" err="1">
+                <a:solidFill>
+                  <a:srgbClr val="0070C0"/>
+                </a:solidFill>
+                <a:latin typeface="Courier New" panose="02070309020205020404" pitchFamily="49" charset="0"/>
+                <a:cs typeface="Courier New" panose="02070309020205020404" pitchFamily="49" charset="0"/>
+              </a:rPr>
+              <a:t>createSauce</a:t>
+            </a:r>
+            <a:r>
+              <a:rPr lang="en-IE" sz="1400" dirty="0">
+                <a:solidFill>
+                  <a:srgbClr val="0070C0"/>
+                </a:solidFill>
+                <a:latin typeface="Courier New" panose="02070309020205020404" pitchFamily="49" charset="0"/>
+                <a:cs typeface="Courier New" panose="02070309020205020404" pitchFamily="49" charset="0"/>
+              </a:rPr>
+              <a:t>();</a:t>
+            </a:r>
+          </a:p>
+          <a:p>
+            <a:r>
+              <a:rPr lang="en-IE" sz="1400" dirty="0" smtClean="0">
+                <a:solidFill>
+                  <a:srgbClr val="0070C0"/>
+                </a:solidFill>
+                <a:latin typeface="Courier New" panose="02070309020205020404" pitchFamily="49" charset="0"/>
+                <a:cs typeface="Courier New" panose="02070309020205020404" pitchFamily="49" charset="0"/>
+              </a:rPr>
+              <a:t>	this-</a:t>
+            </a:r>
+            <a:r>
+              <a:rPr lang="en-IE" sz="1400" dirty="0">
+                <a:solidFill>
+                  <a:srgbClr val="0070C0"/>
+                </a:solidFill>
+                <a:latin typeface="Courier New" panose="02070309020205020404" pitchFamily="49" charset="0"/>
+                <a:cs typeface="Courier New" panose="02070309020205020404" pitchFamily="49" charset="0"/>
+              </a:rPr>
+              <a:t>&gt;cheese = </a:t>
+            </a:r>
+            <a:r>
+              <a:rPr lang="en-IE" sz="1400" dirty="0" err="1">
+                <a:solidFill>
+                  <a:srgbClr val="0070C0"/>
+                </a:solidFill>
+                <a:latin typeface="Courier New" panose="02070309020205020404" pitchFamily="49" charset="0"/>
+                <a:cs typeface="Courier New" panose="02070309020205020404" pitchFamily="49" charset="0"/>
+              </a:rPr>
+              <a:t>arg_ingredientFactory</a:t>
+            </a:r>
+            <a:r>
+              <a:rPr lang="en-IE" sz="1400" dirty="0">
+                <a:solidFill>
+                  <a:srgbClr val="0070C0"/>
+                </a:solidFill>
+                <a:latin typeface="Courier New" panose="02070309020205020404" pitchFamily="49" charset="0"/>
+                <a:cs typeface="Courier New" panose="02070309020205020404" pitchFamily="49" charset="0"/>
+              </a:rPr>
+              <a:t>-&gt;</a:t>
+            </a:r>
+            <a:r>
+              <a:rPr lang="en-IE" sz="1400" dirty="0" err="1">
+                <a:solidFill>
+                  <a:srgbClr val="0070C0"/>
+                </a:solidFill>
+                <a:latin typeface="Courier New" panose="02070309020205020404" pitchFamily="49" charset="0"/>
+                <a:cs typeface="Courier New" panose="02070309020205020404" pitchFamily="49" charset="0"/>
+              </a:rPr>
+              <a:t>createCheese</a:t>
+            </a:r>
+            <a:r>
+              <a:rPr lang="en-IE" sz="1400" dirty="0">
+                <a:solidFill>
+                  <a:srgbClr val="0070C0"/>
+                </a:solidFill>
+                <a:latin typeface="Courier New" panose="02070309020205020404" pitchFamily="49" charset="0"/>
+                <a:cs typeface="Courier New" panose="02070309020205020404" pitchFamily="49" charset="0"/>
+              </a:rPr>
+              <a:t>();</a:t>
+            </a:r>
+          </a:p>
+          <a:p>
+            <a:r>
+              <a:rPr lang="en-IE" sz="1400" dirty="0" smtClean="0">
+                <a:solidFill>
+                  <a:srgbClr val="0070C0"/>
+                </a:solidFill>
+                <a:latin typeface="Courier New" panose="02070309020205020404" pitchFamily="49" charset="0"/>
+                <a:cs typeface="Courier New" panose="02070309020205020404" pitchFamily="49" charset="0"/>
+              </a:rPr>
+              <a:t>	this-</a:t>
+            </a:r>
+            <a:r>
+              <a:rPr lang="en-IE" sz="1400" dirty="0">
+                <a:solidFill>
+                  <a:srgbClr val="0070C0"/>
+                </a:solidFill>
+                <a:latin typeface="Courier New" panose="02070309020205020404" pitchFamily="49" charset="0"/>
+                <a:cs typeface="Courier New" panose="02070309020205020404" pitchFamily="49" charset="0"/>
+              </a:rPr>
+              <a:t>&gt;veggies = </a:t>
+            </a:r>
+            <a:r>
+              <a:rPr lang="en-IE" sz="1400" dirty="0" err="1">
+                <a:solidFill>
+                  <a:srgbClr val="0070C0"/>
+                </a:solidFill>
+                <a:latin typeface="Courier New" panose="02070309020205020404" pitchFamily="49" charset="0"/>
+                <a:cs typeface="Courier New" panose="02070309020205020404" pitchFamily="49" charset="0"/>
+              </a:rPr>
+              <a:t>arg_ingredientFactory</a:t>
+            </a:r>
+            <a:r>
+              <a:rPr lang="en-IE" sz="1400" dirty="0">
+                <a:solidFill>
+                  <a:srgbClr val="0070C0"/>
+                </a:solidFill>
+                <a:latin typeface="Courier New" panose="02070309020205020404" pitchFamily="49" charset="0"/>
+                <a:cs typeface="Courier New" panose="02070309020205020404" pitchFamily="49" charset="0"/>
+              </a:rPr>
+              <a:t>-&gt;</a:t>
+            </a:r>
+            <a:r>
+              <a:rPr lang="en-IE" sz="1400" dirty="0" err="1">
+                <a:solidFill>
+                  <a:srgbClr val="0070C0"/>
+                </a:solidFill>
+                <a:latin typeface="Courier New" panose="02070309020205020404" pitchFamily="49" charset="0"/>
+                <a:cs typeface="Courier New" panose="02070309020205020404" pitchFamily="49" charset="0"/>
+              </a:rPr>
+              <a:t>createVeggies</a:t>
+            </a:r>
+            <a:r>
+              <a:rPr lang="en-IE" sz="1400" dirty="0">
+                <a:solidFill>
+                  <a:srgbClr val="0070C0"/>
+                </a:solidFill>
+                <a:latin typeface="Courier New" panose="02070309020205020404" pitchFamily="49" charset="0"/>
+                <a:cs typeface="Courier New" panose="02070309020205020404" pitchFamily="49" charset="0"/>
+              </a:rPr>
+              <a:t>();</a:t>
+            </a:r>
+          </a:p>
+          <a:p>
+            <a:r>
+              <a:rPr lang="en-IE" sz="1400" dirty="0">
+                <a:latin typeface="Courier New" panose="02070309020205020404" pitchFamily="49" charset="0"/>
+                <a:cs typeface="Courier New" panose="02070309020205020404" pitchFamily="49" charset="0"/>
+              </a:rPr>
+              <a:t>}</a:t>
+            </a:r>
+            <a:endParaRPr lang="en-IE" dirty="0">
+              <a:latin typeface="Courier New" panose="02070309020205020404" pitchFamily="49" charset="0"/>
+              <a:cs typeface="Courier New" panose="02070309020205020404" pitchFamily="49" charset="0"/>
+            </a:endParaRPr>
+          </a:p>
+        </p:txBody>
+      </p:sp>
+    </p:spTree>
+    <p:extLst>
+      <p:ext uri="{BB962C8B-B14F-4D97-AF65-F5344CB8AC3E}">
+        <p14:creationId xmlns:p14="http://schemas.microsoft.com/office/powerpoint/2010/main" val="3542858917"/>
+      </p:ext>
+    </p:extLst>
+  </p:cSld>
+  <p:clrMapOvr>
+    <a:masterClrMapping/>
+  </p:clrMapOvr>
+  <p:timing>
+    <p:tnLst>
+      <p:par>
+        <p:cTn id="1" dur="indefinite" restart="never" nodeType="tmRoot"/>
+      </p:par>
+    </p:tnLst>
+  </p:timing>
+</p:sld>
+</file>
+
+<file path=ppt/slides/slide17.xml><?xml version="1.0" encoding="utf-8"?>
+<p:sld xmlns:a="http://schemas.openxmlformats.org/drawingml/2006/main" xmlns:r="http://schemas.openxmlformats.org/officeDocument/2006/relationships" xmlns:p="http://schemas.openxmlformats.org/presentationml/2006/main">
+  <p:cSld>
+    <p:spTree>
+      <p:nvGrpSpPr>
+        <p:cNvPr id="1" name=""/>
+        <p:cNvGrpSpPr/>
+        <p:nvPr/>
+      </p:nvGrpSpPr>
+      <p:grpSpPr>
+        <a:xfrm>
+          <a:off x="0" y="0"/>
+          <a:ext cx="0" cy="0"/>
+          <a:chOff x="0" y="0"/>
+          <a:chExt cx="0" cy="0"/>
+        </a:xfrm>
+      </p:grpSpPr>
+      <p:sp>
+        <p:nvSpPr>
+          <p:cNvPr id="2" name="Title 1"/>
+          <p:cNvSpPr>
+            <a:spLocks noGrp="1"/>
+          </p:cNvSpPr>
+          <p:nvPr>
+            <p:ph type="title"/>
+          </p:nvPr>
+        </p:nvSpPr>
+        <p:spPr>
+          <a:xfrm>
+            <a:off x="0" y="53961"/>
+            <a:ext cx="9144000" cy="613427"/>
+          </a:xfrm>
+        </p:spPr>
+        <p:txBody>
+          <a:bodyPr>
+            <a:normAutofit/>
+          </a:bodyPr>
+          <a:lstStyle/>
+          <a:p>
+            <a:r>
+              <a:rPr lang="en-IE" dirty="0" smtClean="0"/>
+              <a:t>References</a:t>
+            </a:r>
+            <a:endParaRPr lang="en-IE" dirty="0"/>
+          </a:p>
+        </p:txBody>
+      </p:sp>
+      <p:sp>
+        <p:nvSpPr>
+          <p:cNvPr id="5" name="Content Placeholder 4"/>
+          <p:cNvSpPr>
+            <a:spLocks noGrp="1"/>
+          </p:cNvSpPr>
+          <p:nvPr>
+            <p:ph sz="quarter" idx="10"/>
+          </p:nvPr>
+        </p:nvSpPr>
+        <p:spPr>
+          <a:xfrm>
+            <a:off x="139700" y="1231900"/>
+            <a:ext cx="8864600" cy="4045379"/>
+          </a:xfrm>
+        </p:spPr>
+        <p:txBody>
+          <a:bodyPr/>
+          <a:lstStyle/>
+          <a:p>
+            <a:r>
+              <a:rPr lang="en-IE" dirty="0" smtClean="0">
+                <a:solidFill>
+                  <a:schemeClr val="tx1"/>
+                </a:solidFill>
+              </a:rPr>
+              <a:t>Download Visual Studio 2013 Desktop </a:t>
+            </a:r>
+            <a:r>
+              <a:rPr lang="en-IE" dirty="0" smtClean="0">
+                <a:solidFill>
+                  <a:srgbClr val="0070C0"/>
+                </a:solidFill>
+                <a:hlinkClick r:id="rId2"/>
+              </a:rPr>
+              <a:t>here</a:t>
+            </a:r>
+            <a:endParaRPr lang="en-IE" dirty="0" smtClean="0">
+              <a:solidFill>
+                <a:srgbClr val="0070C0"/>
+              </a:solidFill>
+            </a:endParaRPr>
+          </a:p>
+          <a:p>
+            <a:endParaRPr lang="en-IE" dirty="0">
+              <a:solidFill>
+                <a:srgbClr val="0070C0"/>
+              </a:solidFill>
+            </a:endParaRPr>
+          </a:p>
+          <a:p>
+            <a:endParaRPr lang="en-IE" dirty="0" smtClean="0">
+              <a:solidFill>
+                <a:schemeClr val="bg1">
+                  <a:lumMod val="50000"/>
+                </a:schemeClr>
+              </a:solidFill>
+            </a:endParaRPr>
+          </a:p>
+          <a:p>
+            <a:r>
+              <a:rPr lang="en-IE" dirty="0" smtClean="0">
+                <a:solidFill>
+                  <a:schemeClr val="tx1"/>
+                </a:solidFill>
+              </a:rPr>
+              <a:t>Clone this Git repo to get the source code shown here…</a:t>
+            </a:r>
+          </a:p>
+          <a:p>
+            <a:pPr marL="0" indent="0">
+              <a:buNone/>
+            </a:pPr>
+            <a:r>
+              <a:rPr lang="en-IE" sz="2400" dirty="0" smtClean="0">
+                <a:solidFill>
+                  <a:schemeClr val="bg1">
+                    <a:lumMod val="50000"/>
+                  </a:schemeClr>
+                </a:solidFill>
+              </a:rPr>
+              <a:t>	</a:t>
+            </a:r>
+            <a:r>
+              <a:rPr lang="en-IE" sz="1400" dirty="0" smtClean="0">
+                <a:solidFill>
+                  <a:schemeClr val="bg1">
+                    <a:lumMod val="50000"/>
+                  </a:schemeClr>
+                </a:solidFill>
+                <a:latin typeface="Courier New" panose="02070309020205020404" pitchFamily="49" charset="0"/>
+                <a:cs typeface="Courier New" panose="02070309020205020404" pitchFamily="49" charset="0"/>
+              </a:rPr>
+              <a:t>$  </a:t>
+            </a:r>
+            <a:r>
+              <a:rPr lang="en-IE" sz="1400" dirty="0">
+                <a:solidFill>
+                  <a:schemeClr val="bg1">
+                    <a:lumMod val="50000"/>
+                  </a:schemeClr>
+                </a:solidFill>
+                <a:latin typeface="Courier New" panose="02070309020205020404" pitchFamily="49" charset="0"/>
+                <a:cs typeface="Courier New" panose="02070309020205020404" pitchFamily="49" charset="0"/>
+              </a:rPr>
+              <a:t>git clone https://davenolan1@code.google.com/p/design-patterns-for-cpp/</a:t>
+            </a:r>
+            <a:endParaRPr lang="en-IE" sz="1400" dirty="0" smtClean="0">
+              <a:solidFill>
+                <a:schemeClr val="bg1">
+                  <a:lumMod val="50000"/>
+                </a:schemeClr>
+              </a:solidFill>
+              <a:latin typeface="Courier New" panose="02070309020205020404" pitchFamily="49" charset="0"/>
+              <a:cs typeface="Courier New" panose="02070309020205020404" pitchFamily="49" charset="0"/>
+            </a:endParaRPr>
+          </a:p>
+          <a:p>
+            <a:pPr marL="0" indent="0">
+              <a:buNone/>
+            </a:pPr>
+            <a:endParaRPr lang="en-IE" dirty="0" smtClean="0">
+              <a:solidFill>
+                <a:schemeClr val="bg1">
+                  <a:lumMod val="50000"/>
+                </a:schemeClr>
+              </a:solidFill>
+            </a:endParaRPr>
+          </a:p>
+          <a:p>
+            <a:r>
+              <a:rPr lang="en-IE" dirty="0" smtClean="0">
+                <a:solidFill>
+                  <a:schemeClr val="tx1"/>
+                </a:solidFill>
+              </a:rPr>
+              <a:t>Freeman, E. and Freeman, E. (2004) Head First Design Patterns.  O’Reilly Media. </a:t>
+            </a:r>
+          </a:p>
+          <a:p>
+            <a:pPr marL="0" indent="0">
+              <a:buNone/>
+            </a:pPr>
+            <a:r>
+              <a:rPr lang="en-IE" dirty="0" smtClean="0">
+                <a:solidFill>
+                  <a:schemeClr val="bg1">
+                    <a:lumMod val="50000"/>
+                  </a:schemeClr>
+                </a:solidFill>
+              </a:rPr>
+              <a:t>	(Several copies available in Aspire)</a:t>
+            </a:r>
+            <a:endParaRPr lang="en-IE" dirty="0">
+              <a:solidFill>
+                <a:schemeClr val="bg1">
+                  <a:lumMod val="50000"/>
+                </a:schemeClr>
+              </a:solidFill>
+            </a:endParaRPr>
+          </a:p>
+        </p:txBody>
+      </p:sp>
+    </p:spTree>
+    <p:extLst>
+      <p:ext uri="{BB962C8B-B14F-4D97-AF65-F5344CB8AC3E}">
+        <p14:creationId xmlns:p14="http://schemas.microsoft.com/office/powerpoint/2010/main" val="2799812923"/>
+      </p:ext>
+    </p:extLst>
+  </p:cSld>
+  <p:clrMapOvr>
+    <a:masterClrMapping/>
+  </p:clrMapOvr>
+  <p:timing>
+    <p:tnLst>
+      <p:par>
+        <p:cTn id="1" dur="indefinite" restart="never" nodeType="tmRoot"/>
+      </p:par>
+    </p:tnLst>
+  </p:timing>
+</p:sld>
+</file>
+
+<file path=ppt/slides/slide18.xml><?xml version="1.0" encoding="utf-8"?>
 <p:sld xmlns:a="http://schemas.openxmlformats.org/drawingml/2006/main" xmlns:r="http://schemas.openxmlformats.org/officeDocument/2006/relationships" xmlns:p="http://schemas.openxmlformats.org/presentationml/2006/main">
   <p:cSld>
     <p:spTree>
@@ -3299,11 +5036,7 @@
             </a:pPr>
             <a:r>
               <a:rPr lang="en-IE" sz="2000" b="1" dirty="0" smtClean="0"/>
-              <a:t>Why </a:t>
-            </a:r>
-            <a:r>
-              <a:rPr lang="en-IE" sz="2000" b="1" dirty="0" smtClean="0"/>
-              <a:t>Would You Use a Factory?</a:t>
+              <a:t>Why Would You Use a Factory?</a:t>
             </a:r>
             <a:endParaRPr lang="en-IE" sz="2000" b="1" dirty="0"/>
           </a:p>
@@ -3346,7 +5079,15 @@
             </a:r>
             <a:r>
               <a:rPr lang="en-IE" sz="2000" dirty="0"/>
-              <a:t>, creating a one to many relationship.  This centralises the code</a:t>
+              <a:t>, creating a one to many relationship.  This centralises </a:t>
+            </a:r>
+            <a:r>
+              <a:rPr lang="en-IE" sz="2000" dirty="0" smtClean="0"/>
+              <a:t>the object creation </a:t>
+            </a:r>
+            <a:r>
+              <a:rPr lang="en-IE" sz="2000" dirty="0"/>
+              <a:t>code</a:t>
             </a:r>
             <a:r>
               <a:rPr lang="en-IE" sz="2000" dirty="0" smtClean="0"/>
@@ -3495,140 +5236,9 @@
             <a:endParaRPr lang="en-IE" sz="2000" dirty="0" smtClean="0"/>
           </a:p>
           <a:p>
-            <a:endParaRPr lang="en-IE" sz="2000" dirty="0" smtClean="0"/>
-          </a:p>
-          <a:p>
-            <a:r>
-              <a:rPr lang="en-IE" sz="2000" dirty="0" smtClean="0"/>
-              <a:t>Factories are classes that have a method of the form,</a:t>
-            </a:r>
-          </a:p>
-          <a:p>
-            <a:pPr marL="0" indent="0" algn="ctr">
-              <a:buNone/>
-            </a:pPr>
-            <a:r>
-              <a:rPr lang="en-IE" sz="2000" dirty="0" err="1" smtClean="0">
-                <a:solidFill>
-                  <a:srgbClr val="00B050"/>
-                </a:solidFill>
-                <a:latin typeface="Consolas" panose="020B0609020204030204" pitchFamily="49" charset="0"/>
-                <a:cs typeface="Consolas" panose="020B0609020204030204" pitchFamily="49" charset="0"/>
-              </a:rPr>
-              <a:t>InterfaceType</a:t>
-            </a:r>
-            <a:r>
-              <a:rPr lang="en-IE" sz="2000" dirty="0" smtClean="0">
-                <a:solidFill>
-                  <a:srgbClr val="00B050"/>
-                </a:solidFill>
-                <a:latin typeface="Consolas" panose="020B0609020204030204" pitchFamily="49" charset="0"/>
-                <a:cs typeface="Consolas" panose="020B0609020204030204" pitchFamily="49" charset="0"/>
-              </a:rPr>
-              <a:t> *&lt;name&gt;  </a:t>
-            </a:r>
-            <a:r>
-              <a:rPr lang="en-IE" sz="2000" b="1" dirty="0" err="1" smtClean="0">
-                <a:solidFill>
-                  <a:schemeClr val="accent6">
-                    <a:lumMod val="50000"/>
-                  </a:schemeClr>
-                </a:solidFill>
-                <a:latin typeface="Consolas" panose="020B0609020204030204" pitchFamily="49" charset="0"/>
-                <a:cs typeface="Consolas" panose="020B0609020204030204" pitchFamily="49" charset="0"/>
-              </a:rPr>
-              <a:t>createObject</a:t>
-            </a:r>
-            <a:r>
-              <a:rPr lang="en-IE" sz="2000" b="1" dirty="0" smtClean="0">
-                <a:solidFill>
-                  <a:schemeClr val="accent6">
-                    <a:lumMod val="50000"/>
-                  </a:schemeClr>
-                </a:solidFill>
-                <a:latin typeface="Consolas" panose="020B0609020204030204" pitchFamily="49" charset="0"/>
-                <a:cs typeface="Consolas" panose="020B0609020204030204" pitchFamily="49" charset="0"/>
-              </a:rPr>
-              <a:t>(</a:t>
-            </a:r>
-            <a:r>
-              <a:rPr lang="en-IE" sz="2000" b="1" dirty="0" err="1" smtClean="0">
-                <a:solidFill>
-                  <a:schemeClr val="accent1">
-                    <a:lumMod val="75000"/>
-                  </a:schemeClr>
-                </a:solidFill>
-                <a:latin typeface="Consolas" panose="020B0609020204030204" pitchFamily="49" charset="0"/>
-                <a:cs typeface="Consolas" panose="020B0609020204030204" pitchFamily="49" charset="0"/>
-              </a:rPr>
-              <a:t>arg</a:t>
-            </a:r>
-            <a:r>
-              <a:rPr lang="en-IE" sz="2000" b="1" dirty="0" smtClean="0">
-                <a:solidFill>
-                  <a:schemeClr val="accent6">
-                    <a:lumMod val="50000"/>
-                  </a:schemeClr>
-                </a:solidFill>
-                <a:latin typeface="Consolas" panose="020B0609020204030204" pitchFamily="49" charset="0"/>
-                <a:cs typeface="Consolas" panose="020B0609020204030204" pitchFamily="49" charset="0"/>
-              </a:rPr>
-              <a:t>)</a:t>
-            </a:r>
-            <a:r>
-              <a:rPr lang="en-IE" sz="2000" dirty="0" smtClean="0">
-                <a:latin typeface="Consolas" panose="020B0609020204030204" pitchFamily="49" charset="0"/>
-                <a:cs typeface="Consolas" panose="020B0609020204030204" pitchFamily="49" charset="0"/>
-              </a:rPr>
-              <a:t> </a:t>
-            </a:r>
-          </a:p>
-          <a:p>
             <a:pPr marL="0" indent="0">
               <a:buNone/>
             </a:pPr>
-            <a:r>
-              <a:rPr lang="en-IE" sz="2000" dirty="0" smtClean="0"/>
-              <a:t>	The </a:t>
-            </a:r>
-            <a:r>
-              <a:rPr lang="en-IE" sz="2000" b="1" dirty="0" err="1" smtClean="0">
-                <a:solidFill>
-                  <a:schemeClr val="accent1">
-                    <a:lumMod val="75000"/>
-                  </a:schemeClr>
-                </a:solidFill>
-              </a:rPr>
-              <a:t>arg</a:t>
-            </a:r>
-            <a:r>
-              <a:rPr lang="en-IE" sz="2000" dirty="0" smtClean="0">
-                <a:solidFill>
-                  <a:schemeClr val="accent1">
-                    <a:lumMod val="75000"/>
-                  </a:schemeClr>
-                </a:solidFill>
-              </a:rPr>
-              <a:t> </a:t>
-            </a:r>
-            <a:r>
-              <a:rPr lang="en-IE" sz="2000" dirty="0" smtClean="0"/>
-              <a:t>is used to define which particular object we would like created.</a:t>
-            </a:r>
-          </a:p>
-          <a:p>
-            <a:pPr marL="0" indent="0">
-              <a:buNone/>
-            </a:pPr>
-            <a:endParaRPr lang="en-IE" sz="2000" dirty="0" smtClean="0"/>
-          </a:p>
-          <a:p>
-            <a:r>
-              <a:rPr lang="en-IE" sz="2000" dirty="0" smtClean="0"/>
-              <a:t>Factories rely heavily on polymorphism.</a:t>
-            </a:r>
-          </a:p>
-          <a:p>
             <a:endParaRPr lang="en-IE" sz="2000" dirty="0"/>
           </a:p>
           <a:p>
@@ -3638,7 +5248,7 @@
       </p:sp>
       <p:pic>
         <p:nvPicPr>
-          <p:cNvPr id="1026" name="Picture 2"/>
+          <p:cNvPr id="2050" name="Picture 2"/>
           <p:cNvPicPr>
             <a:picLocks noChangeAspect="1" noChangeArrowheads="1"/>
           </p:cNvPicPr>
@@ -3659,8 +5269,8 @@
         </p:blipFill>
         <p:spPr bwMode="auto">
           <a:xfrm>
-            <a:off x="1687198" y="908688"/>
-            <a:ext cx="5606304" cy="2660012"/>
+            <a:off x="101600" y="959488"/>
+            <a:ext cx="8991600" cy="4620642"/>
           </a:xfrm>
           <a:prstGeom prst="rect">
             <a:avLst/>
@@ -3692,56 +5302,14 @@
       </p:pic>
       <p:sp>
         <p:nvSpPr>
-          <p:cNvPr id="6" name="Arc 5"/>
-          <p:cNvSpPr/>
-          <p:nvPr/>
-        </p:nvSpPr>
-        <p:spPr>
-          <a:xfrm rot="9094080">
-            <a:off x="596901" y="609113"/>
-            <a:ext cx="1371600" cy="1524000"/>
-          </a:xfrm>
-          <a:prstGeom prst="arc">
-            <a:avLst/>
-          </a:prstGeom>
-          <a:ln w="38100">
-            <a:headEnd type="triangle" w="lg" len="lg"/>
-            <a:tailEnd type="none"/>
-          </a:ln>
-        </p:spPr>
-        <p:style>
-          <a:lnRef idx="2">
-            <a:schemeClr val="accent1"/>
-          </a:lnRef>
-          <a:fillRef idx="0">
-            <a:schemeClr val="accent1"/>
-          </a:fillRef>
-          <a:effectRef idx="1">
-            <a:schemeClr val="accent1"/>
-          </a:effectRef>
-          <a:fontRef idx="minor">
-            <a:schemeClr val="tx1"/>
-          </a:fontRef>
-        </p:style>
-        <p:txBody>
-          <a:bodyPr rtlCol="0" anchor="ctr"/>
-          <a:lstStyle/>
-          <a:p>
-            <a:pPr algn="ctr"/>
-            <a:endParaRPr lang="en-IE"/>
-          </a:p>
-        </p:txBody>
-      </p:sp>
-      <p:sp>
-        <p:nvSpPr>
-          <p:cNvPr id="7" name="TextBox 6"/>
+          <p:cNvPr id="15" name="TextBox 14"/>
           <p:cNvSpPr txBox="1"/>
           <p:nvPr/>
         </p:nvSpPr>
         <p:spPr>
           <a:xfrm>
-            <a:off x="86998" y="880903"/>
-            <a:ext cx="1398902" cy="830997"/>
+            <a:off x="130175" y="683567"/>
+            <a:ext cx="2807307" cy="369332"/>
           </a:xfrm>
           <a:prstGeom prst="rect">
             <a:avLst/>
@@ -3749,458 +5317,16 @@
           <a:noFill/>
         </p:spPr>
         <p:txBody>
-          <a:bodyPr wrap="square" rtlCol="0">
+          <a:bodyPr wrap="none" rtlCol="0">
             <a:spAutoFit/>
           </a:bodyPr>
           <a:lstStyle/>
           <a:p>
             <a:r>
-              <a:rPr lang="en-IE" sz="1200" dirty="0" smtClean="0">
-                <a:solidFill>
-                  <a:srgbClr val="C00000"/>
-                </a:solidFill>
-              </a:rPr>
-              <a:t>Factory Interface.</a:t>
-            </a:r>
-          </a:p>
-          <a:p>
-            <a:r>
-              <a:rPr lang="en-IE" sz="1200" dirty="0" smtClean="0">
-                <a:solidFill>
-                  <a:srgbClr val="C00000"/>
-                </a:solidFill>
-              </a:rPr>
-              <a:t>Must override the abstract ‘</a:t>
-            </a:r>
-            <a:r>
-              <a:rPr lang="en-IE" sz="1200" dirty="0" err="1" smtClean="0">
-                <a:solidFill>
-                  <a:srgbClr val="C00000"/>
-                </a:solidFill>
-              </a:rPr>
-              <a:t>factoryMethod</a:t>
-            </a:r>
-            <a:r>
-              <a:rPr lang="en-IE" sz="1200" dirty="0" smtClean="0">
-                <a:solidFill>
-                  <a:srgbClr val="C00000"/>
-                </a:solidFill>
-              </a:rPr>
-              <a:t>()’.</a:t>
-            </a:r>
-            <a:endParaRPr lang="en-IE" sz="1050" dirty="0">
-              <a:solidFill>
-                <a:srgbClr val="C00000"/>
-              </a:solidFill>
-            </a:endParaRPr>
-          </a:p>
-        </p:txBody>
-      </p:sp>
-      <p:sp>
-        <p:nvSpPr>
-          <p:cNvPr id="9" name="Arc 8"/>
-          <p:cNvSpPr/>
-          <p:nvPr/>
-        </p:nvSpPr>
-        <p:spPr>
-          <a:xfrm rot="8147899">
-            <a:off x="272608" y="1795414"/>
-            <a:ext cx="1371600" cy="1925037"/>
-          </a:xfrm>
-          <a:prstGeom prst="arc">
-            <a:avLst>
-              <a:gd name="adj1" fmla="val 16200000"/>
-              <a:gd name="adj2" fmla="val 20980655"/>
-            </a:avLst>
-          </a:prstGeom>
-          <a:ln w="38100">
-            <a:headEnd type="triangle" w="lg" len="lg"/>
-            <a:tailEnd type="none"/>
-          </a:ln>
-        </p:spPr>
-        <p:style>
-          <a:lnRef idx="2">
-            <a:schemeClr val="accent1"/>
-          </a:lnRef>
-          <a:fillRef idx="0">
-            <a:schemeClr val="accent1"/>
-          </a:fillRef>
-          <a:effectRef idx="1">
-            <a:schemeClr val="accent1"/>
-          </a:effectRef>
-          <a:fontRef idx="minor">
-            <a:schemeClr val="tx1"/>
-          </a:fontRef>
-        </p:style>
-        <p:txBody>
-          <a:bodyPr rtlCol="0" anchor="ctr"/>
-          <a:lstStyle/>
-          <a:p>
-            <a:pPr algn="ctr"/>
-            <a:endParaRPr lang="en-IE"/>
-          </a:p>
-        </p:txBody>
-      </p:sp>
-      <p:sp>
-        <p:nvSpPr>
-          <p:cNvPr id="10" name="TextBox 9"/>
-          <p:cNvSpPr txBox="1"/>
-          <p:nvPr/>
-        </p:nvSpPr>
-        <p:spPr>
-          <a:xfrm>
-            <a:off x="86999" y="2150903"/>
-            <a:ext cx="1398902" cy="1200329"/>
-          </a:xfrm>
-          <a:prstGeom prst="rect">
-            <a:avLst/>
-          </a:prstGeom>
-          <a:noFill/>
-        </p:spPr>
-        <p:txBody>
-          <a:bodyPr wrap="square" rtlCol="0">
-            <a:spAutoFit/>
-          </a:bodyPr>
-          <a:lstStyle/>
-          <a:p>
-            <a:r>
-              <a:rPr lang="en-IE" sz="1200" dirty="0" smtClean="0">
-                <a:solidFill>
-                  <a:srgbClr val="C00000"/>
-                </a:solidFill>
-              </a:rPr>
-              <a:t>Factory Concrete Class.  The </a:t>
-            </a:r>
-            <a:r>
-              <a:rPr lang="en-IE" sz="1200" dirty="0" err="1" smtClean="0">
-                <a:solidFill>
-                  <a:srgbClr val="C00000"/>
-                </a:solidFill>
-              </a:rPr>
-              <a:t>factoryMethod</a:t>
-            </a:r>
-            <a:r>
-              <a:rPr lang="en-IE" sz="1200" dirty="0" smtClean="0">
-                <a:solidFill>
-                  <a:srgbClr val="C00000"/>
-                </a:solidFill>
-              </a:rPr>
-              <a:t>() implementation is left to the sub class.</a:t>
-            </a:r>
-            <a:endParaRPr lang="en-IE" sz="1050" dirty="0">
-              <a:solidFill>
-                <a:srgbClr val="C00000"/>
-              </a:solidFill>
-            </a:endParaRPr>
-          </a:p>
-        </p:txBody>
-      </p:sp>
-      <p:sp>
-        <p:nvSpPr>
-          <p:cNvPr id="11" name="Arc 10"/>
-          <p:cNvSpPr/>
-          <p:nvPr/>
-        </p:nvSpPr>
-        <p:spPr>
-          <a:xfrm rot="9444379">
-            <a:off x="7327824" y="1083175"/>
-            <a:ext cx="1469505" cy="762000"/>
-          </a:xfrm>
-          <a:custGeom>
-            <a:avLst/>
-            <a:gdLst>
-              <a:gd name="connsiteX0" fmla="*/ 685800 w 1371600"/>
-              <a:gd name="connsiteY0" fmla="*/ 0 h 1524000"/>
-              <a:gd name="connsiteX1" fmla="*/ 1371600 w 1371600"/>
-              <a:gd name="connsiteY1" fmla="*/ 762000 h 1524000"/>
-              <a:gd name="connsiteX2" fmla="*/ 685800 w 1371600"/>
-              <a:gd name="connsiteY2" fmla="*/ 762000 h 1524000"/>
-              <a:gd name="connsiteX3" fmla="*/ 685800 w 1371600"/>
-              <a:gd name="connsiteY3" fmla="*/ 0 h 1524000"/>
-              <a:gd name="connsiteX0" fmla="*/ 685800 w 1371600"/>
-              <a:gd name="connsiteY0" fmla="*/ 0 h 1524000"/>
-              <a:gd name="connsiteX1" fmla="*/ 1371600 w 1371600"/>
-              <a:gd name="connsiteY1" fmla="*/ 762000 h 1524000"/>
-              <a:gd name="connsiteX0" fmla="*/ 0 w 1545378"/>
-              <a:gd name="connsiteY0" fmla="*/ 0 h 762000"/>
-              <a:gd name="connsiteX1" fmla="*/ 685800 w 1545378"/>
-              <a:gd name="connsiteY1" fmla="*/ 762000 h 762000"/>
-              <a:gd name="connsiteX2" fmla="*/ 0 w 1545378"/>
-              <a:gd name="connsiteY2" fmla="*/ 762000 h 762000"/>
-              <a:gd name="connsiteX3" fmla="*/ 0 w 1545378"/>
-              <a:gd name="connsiteY3" fmla="*/ 0 h 762000"/>
-              <a:gd name="connsiteX0" fmla="*/ 1469505 w 1545378"/>
-              <a:gd name="connsiteY0" fmla="*/ 593432 h 762000"/>
-              <a:gd name="connsiteX1" fmla="*/ 685800 w 1545378"/>
-              <a:gd name="connsiteY1" fmla="*/ 762000 h 762000"/>
-              <a:gd name="connsiteX0" fmla="*/ 0 w 1469505"/>
-              <a:gd name="connsiteY0" fmla="*/ 0 h 762000"/>
-              <a:gd name="connsiteX1" fmla="*/ 685800 w 1469505"/>
-              <a:gd name="connsiteY1" fmla="*/ 762000 h 762000"/>
-              <a:gd name="connsiteX2" fmla="*/ 0 w 1469505"/>
-              <a:gd name="connsiteY2" fmla="*/ 762000 h 762000"/>
-              <a:gd name="connsiteX3" fmla="*/ 0 w 1469505"/>
-              <a:gd name="connsiteY3" fmla="*/ 0 h 762000"/>
-              <a:gd name="connsiteX0" fmla="*/ 1469505 w 1469505"/>
-              <a:gd name="connsiteY0" fmla="*/ 593432 h 762000"/>
-              <a:gd name="connsiteX1" fmla="*/ 685800 w 1469505"/>
-              <a:gd name="connsiteY1" fmla="*/ 762000 h 762000"/>
-            </a:gdLst>
-            <a:ahLst/>
-            <a:cxnLst>
-              <a:cxn ang="0">
-                <a:pos x="connsiteX0" y="connsiteY0"/>
-              </a:cxn>
-              <a:cxn ang="0">
-                <a:pos x="connsiteX1" y="connsiteY1"/>
-              </a:cxn>
-            </a:cxnLst>
-            <a:rect l="l" t="t" r="r" b="b"/>
-            <a:pathLst>
-              <a:path w="1469505" h="762000" stroke="0" extrusionOk="0">
-                <a:moveTo>
-                  <a:pt x="0" y="0"/>
-                </a:moveTo>
-                <a:cubicBezTo>
-                  <a:pt x="378757" y="0"/>
-                  <a:pt x="685800" y="341159"/>
-                  <a:pt x="685800" y="762000"/>
-                </a:cubicBezTo>
-                <a:lnTo>
-                  <a:pt x="0" y="762000"/>
-                </a:lnTo>
-                <a:lnTo>
-                  <a:pt x="0" y="0"/>
-                </a:lnTo>
-                <a:close/>
-              </a:path>
-              <a:path w="1469505" h="762000" fill="none">
-                <a:moveTo>
-                  <a:pt x="1469505" y="593432"/>
-                </a:moveTo>
-                <a:cubicBezTo>
-                  <a:pt x="1267517" y="279005"/>
-                  <a:pt x="685800" y="341159"/>
-                  <a:pt x="685800" y="762000"/>
-                </a:cubicBezTo>
-              </a:path>
-            </a:pathLst>
-          </a:custGeom>
-          <a:ln w="38100">
-            <a:headEnd type="triangle" w="lg" len="lg"/>
-            <a:tailEnd type="none"/>
-          </a:ln>
-        </p:spPr>
-        <p:style>
-          <a:lnRef idx="2">
-            <a:schemeClr val="accent1"/>
-          </a:lnRef>
-          <a:fillRef idx="0">
-            <a:schemeClr val="accent1"/>
-          </a:fillRef>
-          <a:effectRef idx="1">
-            <a:schemeClr val="accent1"/>
-          </a:effectRef>
-          <a:fontRef idx="minor">
-            <a:schemeClr val="tx1"/>
-          </a:fontRef>
-        </p:style>
-        <p:txBody>
-          <a:bodyPr rtlCol="0" anchor="ctr"/>
-          <a:lstStyle/>
-          <a:p>
-            <a:pPr algn="ctr"/>
-            <a:endParaRPr lang="en-IE"/>
-          </a:p>
-        </p:txBody>
-      </p:sp>
-      <p:sp>
-        <p:nvSpPr>
-          <p:cNvPr id="12" name="TextBox 11"/>
-          <p:cNvSpPr txBox="1"/>
-          <p:nvPr/>
-        </p:nvSpPr>
-        <p:spPr>
-          <a:xfrm>
-            <a:off x="7331602" y="822493"/>
-            <a:ext cx="1398902" cy="276999"/>
-          </a:xfrm>
-          <a:prstGeom prst="rect">
-            <a:avLst/>
-          </a:prstGeom>
-          <a:noFill/>
-        </p:spPr>
-        <p:txBody>
-          <a:bodyPr wrap="square" rtlCol="0">
-            <a:spAutoFit/>
-          </a:bodyPr>
-          <a:lstStyle/>
-          <a:p>
-            <a:r>
-              <a:rPr lang="en-IE" sz="1200" dirty="0" smtClean="0">
-                <a:solidFill>
-                  <a:srgbClr val="C00000"/>
-                </a:solidFill>
-              </a:rPr>
-              <a:t>Product Interface</a:t>
-            </a:r>
-            <a:endParaRPr lang="en-IE" sz="1050" dirty="0">
-              <a:solidFill>
-                <a:srgbClr val="C00000"/>
-              </a:solidFill>
-            </a:endParaRPr>
-          </a:p>
-        </p:txBody>
-      </p:sp>
-      <p:sp>
-        <p:nvSpPr>
-          <p:cNvPr id="13" name="Arc 10"/>
-          <p:cNvSpPr/>
-          <p:nvPr/>
-        </p:nvSpPr>
-        <p:spPr>
-          <a:xfrm rot="9444379">
-            <a:off x="7421590" y="2790368"/>
-            <a:ext cx="1469505" cy="762000"/>
-          </a:xfrm>
-          <a:custGeom>
-            <a:avLst/>
-            <a:gdLst>
-              <a:gd name="connsiteX0" fmla="*/ 685800 w 1371600"/>
-              <a:gd name="connsiteY0" fmla="*/ 0 h 1524000"/>
-              <a:gd name="connsiteX1" fmla="*/ 1371600 w 1371600"/>
-              <a:gd name="connsiteY1" fmla="*/ 762000 h 1524000"/>
-              <a:gd name="connsiteX2" fmla="*/ 685800 w 1371600"/>
-              <a:gd name="connsiteY2" fmla="*/ 762000 h 1524000"/>
-              <a:gd name="connsiteX3" fmla="*/ 685800 w 1371600"/>
-              <a:gd name="connsiteY3" fmla="*/ 0 h 1524000"/>
-              <a:gd name="connsiteX0" fmla="*/ 685800 w 1371600"/>
-              <a:gd name="connsiteY0" fmla="*/ 0 h 1524000"/>
-              <a:gd name="connsiteX1" fmla="*/ 1371600 w 1371600"/>
-              <a:gd name="connsiteY1" fmla="*/ 762000 h 1524000"/>
-              <a:gd name="connsiteX0" fmla="*/ 0 w 1545378"/>
-              <a:gd name="connsiteY0" fmla="*/ 0 h 762000"/>
-              <a:gd name="connsiteX1" fmla="*/ 685800 w 1545378"/>
-              <a:gd name="connsiteY1" fmla="*/ 762000 h 762000"/>
-              <a:gd name="connsiteX2" fmla="*/ 0 w 1545378"/>
-              <a:gd name="connsiteY2" fmla="*/ 762000 h 762000"/>
-              <a:gd name="connsiteX3" fmla="*/ 0 w 1545378"/>
-              <a:gd name="connsiteY3" fmla="*/ 0 h 762000"/>
-              <a:gd name="connsiteX0" fmla="*/ 1469505 w 1545378"/>
-              <a:gd name="connsiteY0" fmla="*/ 593432 h 762000"/>
-              <a:gd name="connsiteX1" fmla="*/ 685800 w 1545378"/>
-              <a:gd name="connsiteY1" fmla="*/ 762000 h 762000"/>
-              <a:gd name="connsiteX0" fmla="*/ 0 w 1469505"/>
-              <a:gd name="connsiteY0" fmla="*/ 0 h 762000"/>
-              <a:gd name="connsiteX1" fmla="*/ 685800 w 1469505"/>
-              <a:gd name="connsiteY1" fmla="*/ 762000 h 762000"/>
-              <a:gd name="connsiteX2" fmla="*/ 0 w 1469505"/>
-              <a:gd name="connsiteY2" fmla="*/ 762000 h 762000"/>
-              <a:gd name="connsiteX3" fmla="*/ 0 w 1469505"/>
-              <a:gd name="connsiteY3" fmla="*/ 0 h 762000"/>
-              <a:gd name="connsiteX0" fmla="*/ 1469505 w 1469505"/>
-              <a:gd name="connsiteY0" fmla="*/ 593432 h 762000"/>
-              <a:gd name="connsiteX1" fmla="*/ 685800 w 1469505"/>
-              <a:gd name="connsiteY1" fmla="*/ 762000 h 762000"/>
-            </a:gdLst>
-            <a:ahLst/>
-            <a:cxnLst>
-              <a:cxn ang="0">
-                <a:pos x="connsiteX0" y="connsiteY0"/>
-              </a:cxn>
-              <a:cxn ang="0">
-                <a:pos x="connsiteX1" y="connsiteY1"/>
-              </a:cxn>
-            </a:cxnLst>
-            <a:rect l="l" t="t" r="r" b="b"/>
-            <a:pathLst>
-              <a:path w="1469505" h="762000" stroke="0" extrusionOk="0">
-                <a:moveTo>
-                  <a:pt x="0" y="0"/>
-                </a:moveTo>
-                <a:cubicBezTo>
-                  <a:pt x="378757" y="0"/>
-                  <a:pt x="685800" y="341159"/>
-                  <a:pt x="685800" y="762000"/>
-                </a:cubicBezTo>
-                <a:lnTo>
-                  <a:pt x="0" y="762000"/>
-                </a:lnTo>
-                <a:lnTo>
-                  <a:pt x="0" y="0"/>
-                </a:lnTo>
-                <a:close/>
-              </a:path>
-              <a:path w="1469505" h="762000" fill="none">
-                <a:moveTo>
-                  <a:pt x="1469505" y="593432"/>
-                </a:moveTo>
-                <a:cubicBezTo>
-                  <a:pt x="1267517" y="279005"/>
-                  <a:pt x="685800" y="341159"/>
-                  <a:pt x="685800" y="762000"/>
-                </a:cubicBezTo>
-              </a:path>
-            </a:pathLst>
-          </a:custGeom>
-          <a:ln w="38100">
-            <a:headEnd type="triangle" w="lg" len="lg"/>
-            <a:tailEnd type="none"/>
-          </a:ln>
-        </p:spPr>
-        <p:style>
-          <a:lnRef idx="2">
-            <a:schemeClr val="accent1"/>
-          </a:lnRef>
-          <a:fillRef idx="0">
-            <a:schemeClr val="accent1"/>
-          </a:fillRef>
-          <a:effectRef idx="1">
-            <a:schemeClr val="accent1"/>
-          </a:effectRef>
-          <a:fontRef idx="minor">
-            <a:schemeClr val="tx1"/>
-          </a:fontRef>
-        </p:style>
-        <p:txBody>
-          <a:bodyPr rtlCol="0" anchor="ctr"/>
-          <a:lstStyle/>
-          <a:p>
-            <a:pPr algn="ctr"/>
-            <a:endParaRPr lang="en-IE"/>
-          </a:p>
-        </p:txBody>
-      </p:sp>
-      <p:sp>
-        <p:nvSpPr>
-          <p:cNvPr id="14" name="TextBox 13"/>
-          <p:cNvSpPr txBox="1"/>
-          <p:nvPr/>
-        </p:nvSpPr>
-        <p:spPr>
-          <a:xfrm>
-            <a:off x="7425368" y="2529686"/>
-            <a:ext cx="1398902" cy="461665"/>
-          </a:xfrm>
-          <a:prstGeom prst="rect">
-            <a:avLst/>
-          </a:prstGeom>
-          <a:noFill/>
-        </p:spPr>
-        <p:txBody>
-          <a:bodyPr wrap="square" rtlCol="0">
-            <a:spAutoFit/>
-          </a:bodyPr>
-          <a:lstStyle/>
-          <a:p>
-            <a:r>
-              <a:rPr lang="en-IE" sz="1200" dirty="0" smtClean="0">
-                <a:solidFill>
-                  <a:srgbClr val="C00000"/>
-                </a:solidFill>
-              </a:rPr>
-              <a:t>Product Concrete Class</a:t>
-            </a:r>
+              <a:rPr lang="en-IE" sz="1800" b="1" dirty="0" smtClean="0"/>
+              <a:t>Head First : Design Patterns</a:t>
+            </a:r>
+            <a:endParaRPr lang="en-IE" sz="1800" b="1" dirty="0"/>
           </a:p>
         </p:txBody>
       </p:sp>
@@ -4225,6 +5351,279 @@
 </file>
 
 <file path=ppt/slides/slide5.xml><?xml version="1.0" encoding="utf-8"?>
+<p:sld xmlns:a="http://schemas.openxmlformats.org/drawingml/2006/main" xmlns:r="http://schemas.openxmlformats.org/officeDocument/2006/relationships" xmlns:p="http://schemas.openxmlformats.org/presentationml/2006/main">
+  <p:cSld>
+    <p:spTree>
+      <p:nvGrpSpPr>
+        <p:cNvPr id="1" name=""/>
+        <p:cNvGrpSpPr/>
+        <p:nvPr/>
+      </p:nvGrpSpPr>
+      <p:grpSpPr>
+        <a:xfrm>
+          <a:off x="0" y="0"/>
+          <a:ext cx="0" cy="0"/>
+          <a:chOff x="0" y="0"/>
+          <a:chExt cx="0" cy="0"/>
+        </a:xfrm>
+      </p:grpSpPr>
+      <p:sp>
+        <p:nvSpPr>
+          <p:cNvPr id="2" name="Title 1"/>
+          <p:cNvSpPr>
+            <a:spLocks noGrp="1"/>
+          </p:cNvSpPr>
+          <p:nvPr>
+            <p:ph type="title"/>
+          </p:nvPr>
+        </p:nvSpPr>
+        <p:spPr>
+          <a:xfrm>
+            <a:off x="0" y="53961"/>
+            <a:ext cx="9144000" cy="613427"/>
+          </a:xfrm>
+        </p:spPr>
+        <p:txBody>
+          <a:bodyPr>
+            <a:normAutofit/>
+          </a:bodyPr>
+          <a:lstStyle/>
+          <a:p>
+            <a:r>
+              <a:rPr lang="en-IE" dirty="0" smtClean="0"/>
+              <a:t>02. What </a:t>
+            </a:r>
+            <a:r>
+              <a:rPr lang="en-IE" dirty="0"/>
+              <a:t>Are Factories</a:t>
+            </a:r>
+            <a:r>
+              <a:rPr lang="en-IE" dirty="0" smtClean="0"/>
+              <a:t>?</a:t>
+            </a:r>
+            <a:endParaRPr lang="en-IE" dirty="0"/>
+          </a:p>
+        </p:txBody>
+      </p:sp>
+      <p:sp>
+        <p:nvSpPr>
+          <p:cNvPr id="3" name="Content Placeholder 2"/>
+          <p:cNvSpPr>
+            <a:spLocks noGrp="1"/>
+          </p:cNvSpPr>
+          <p:nvPr>
+            <p:ph sz="quarter" idx="10"/>
+          </p:nvPr>
+        </p:nvSpPr>
+        <p:spPr>
+          <a:xfrm>
+            <a:off x="431800" y="889000"/>
+            <a:ext cx="8255000" cy="5054599"/>
+          </a:xfrm>
+        </p:spPr>
+        <p:txBody>
+          <a:bodyPr/>
+          <a:lstStyle/>
+          <a:p>
+            <a:endParaRPr lang="en-IE" sz="2000" dirty="0" smtClean="0"/>
+          </a:p>
+          <a:p>
+            <a:endParaRPr lang="en-IE" sz="2000" dirty="0" smtClean="0"/>
+          </a:p>
+          <a:p>
+            <a:r>
+              <a:rPr lang="en-IE" sz="2000" dirty="0" smtClean="0"/>
+              <a:t>Factories </a:t>
+            </a:r>
+            <a:r>
+              <a:rPr lang="en-IE" sz="2000" dirty="0" smtClean="0"/>
+              <a:t>are classes that have a method of the form</a:t>
+            </a:r>
+            <a:r>
+              <a:rPr lang="en-IE" sz="2000" dirty="0" smtClean="0"/>
+              <a:t>,</a:t>
+            </a:r>
+          </a:p>
+          <a:p>
+            <a:endParaRPr lang="en-IE" sz="2000" dirty="0" smtClean="0"/>
+          </a:p>
+          <a:p>
+            <a:pPr marL="0" indent="0" algn="ctr">
+              <a:buNone/>
+            </a:pPr>
+            <a:r>
+              <a:rPr lang="en-IE" sz="2000" dirty="0" err="1" smtClean="0">
+                <a:solidFill>
+                  <a:srgbClr val="00B050"/>
+                </a:solidFill>
+                <a:latin typeface="Consolas" panose="020B0609020204030204" pitchFamily="49" charset="0"/>
+                <a:cs typeface="Consolas" panose="020B0609020204030204" pitchFamily="49" charset="0"/>
+              </a:rPr>
+              <a:t>InterfaceType</a:t>
+            </a:r>
+            <a:r>
+              <a:rPr lang="en-IE" sz="2000" dirty="0" smtClean="0">
+                <a:solidFill>
+                  <a:srgbClr val="00B050"/>
+                </a:solidFill>
+                <a:latin typeface="Consolas" panose="020B0609020204030204" pitchFamily="49" charset="0"/>
+                <a:cs typeface="Consolas" panose="020B0609020204030204" pitchFamily="49" charset="0"/>
+              </a:rPr>
+              <a:t> *&lt;name&gt;  </a:t>
+            </a:r>
+            <a:r>
+              <a:rPr lang="en-IE" sz="2000" b="1" dirty="0" err="1" smtClean="0">
+                <a:solidFill>
+                  <a:schemeClr val="accent6">
+                    <a:lumMod val="50000"/>
+                  </a:schemeClr>
+                </a:solidFill>
+                <a:latin typeface="Consolas" panose="020B0609020204030204" pitchFamily="49" charset="0"/>
+                <a:cs typeface="Consolas" panose="020B0609020204030204" pitchFamily="49" charset="0"/>
+              </a:rPr>
+              <a:t>createObject</a:t>
+            </a:r>
+            <a:r>
+              <a:rPr lang="en-IE" sz="2000" b="1" dirty="0" smtClean="0">
+                <a:solidFill>
+                  <a:schemeClr val="accent6">
+                    <a:lumMod val="50000"/>
+                  </a:schemeClr>
+                </a:solidFill>
+                <a:latin typeface="Consolas" panose="020B0609020204030204" pitchFamily="49" charset="0"/>
+                <a:cs typeface="Consolas" panose="020B0609020204030204" pitchFamily="49" charset="0"/>
+              </a:rPr>
+              <a:t>(</a:t>
+            </a:r>
+            <a:r>
+              <a:rPr lang="en-IE" sz="2000" b="1" dirty="0" err="1" smtClean="0">
+                <a:solidFill>
+                  <a:schemeClr val="accent1">
+                    <a:lumMod val="75000"/>
+                  </a:schemeClr>
+                </a:solidFill>
+                <a:latin typeface="Consolas" panose="020B0609020204030204" pitchFamily="49" charset="0"/>
+                <a:cs typeface="Consolas" panose="020B0609020204030204" pitchFamily="49" charset="0"/>
+              </a:rPr>
+              <a:t>arg</a:t>
+            </a:r>
+            <a:r>
+              <a:rPr lang="en-IE" sz="2000" b="1" dirty="0" smtClean="0">
+                <a:solidFill>
+                  <a:schemeClr val="accent6">
+                    <a:lumMod val="50000"/>
+                  </a:schemeClr>
+                </a:solidFill>
+                <a:latin typeface="Consolas" panose="020B0609020204030204" pitchFamily="49" charset="0"/>
+                <a:cs typeface="Consolas" panose="020B0609020204030204" pitchFamily="49" charset="0"/>
+              </a:rPr>
+              <a:t>)</a:t>
+            </a:r>
+            <a:r>
+              <a:rPr lang="en-IE" sz="2000" dirty="0" smtClean="0">
+                <a:latin typeface="Consolas" panose="020B0609020204030204" pitchFamily="49" charset="0"/>
+                <a:cs typeface="Consolas" panose="020B0609020204030204" pitchFamily="49" charset="0"/>
+              </a:rPr>
+              <a:t> </a:t>
+            </a:r>
+            <a:endParaRPr lang="en-IE" sz="2000" dirty="0" smtClean="0">
+              <a:latin typeface="Consolas" panose="020B0609020204030204" pitchFamily="49" charset="0"/>
+              <a:cs typeface="Consolas" panose="020B0609020204030204" pitchFamily="49" charset="0"/>
+            </a:endParaRPr>
+          </a:p>
+          <a:p>
+            <a:pPr marL="0" indent="0" algn="ctr">
+              <a:buNone/>
+            </a:pPr>
+            <a:endParaRPr lang="en-IE" sz="2000" dirty="0" smtClean="0">
+              <a:latin typeface="Consolas" panose="020B0609020204030204" pitchFamily="49" charset="0"/>
+              <a:cs typeface="Consolas" panose="020B0609020204030204" pitchFamily="49" charset="0"/>
+            </a:endParaRPr>
+          </a:p>
+          <a:p>
+            <a:pPr marL="0" indent="0">
+              <a:buNone/>
+            </a:pPr>
+            <a:r>
+              <a:rPr lang="en-IE" sz="2000" dirty="0" smtClean="0"/>
+              <a:t>	The </a:t>
+            </a:r>
+            <a:r>
+              <a:rPr lang="en-IE" sz="2000" b="1" dirty="0" err="1" smtClean="0">
+                <a:solidFill>
+                  <a:schemeClr val="accent1">
+                    <a:lumMod val="75000"/>
+                  </a:schemeClr>
+                </a:solidFill>
+              </a:rPr>
+              <a:t>arg</a:t>
+            </a:r>
+            <a:r>
+              <a:rPr lang="en-IE" sz="2000" dirty="0" smtClean="0">
+                <a:solidFill>
+                  <a:schemeClr val="accent1">
+                    <a:lumMod val="75000"/>
+                  </a:schemeClr>
+                </a:solidFill>
+              </a:rPr>
+              <a:t> </a:t>
+            </a:r>
+            <a:r>
+              <a:rPr lang="en-IE" sz="2000" dirty="0" smtClean="0"/>
+              <a:t>is used to define which particular object we would like created.</a:t>
+            </a:r>
+          </a:p>
+          <a:p>
+            <a:pPr marL="0" indent="0">
+              <a:buNone/>
+            </a:pPr>
+            <a:endParaRPr lang="en-IE" sz="2000" dirty="0" smtClean="0"/>
+          </a:p>
+          <a:p>
+            <a:pPr marL="0" indent="0">
+              <a:buNone/>
+            </a:pPr>
+            <a:endParaRPr lang="en-IE" sz="2000" dirty="0"/>
+          </a:p>
+          <a:p>
+            <a:r>
+              <a:rPr lang="en-IE" sz="2000" dirty="0" smtClean="0"/>
+              <a:t>Factories </a:t>
+            </a:r>
+            <a:r>
+              <a:rPr lang="en-IE" sz="2000" dirty="0" smtClean="0"/>
+              <a:t>rely heavily on polymorphism.</a:t>
+            </a:r>
+          </a:p>
+          <a:p>
+            <a:endParaRPr lang="en-IE" sz="2000" dirty="0"/>
+          </a:p>
+          <a:p>
+            <a:endParaRPr lang="en-IE" sz="2000" dirty="0"/>
+          </a:p>
+        </p:txBody>
+      </p:sp>
+    </p:spTree>
+    <p:extLst>
+      <p:ext uri="{BB962C8B-B14F-4D97-AF65-F5344CB8AC3E}">
+        <p14:creationId xmlns:p14="http://schemas.microsoft.com/office/powerpoint/2010/main" val="3756643803"/>
+      </p:ext>
+    </p:extLst>
+  </p:cSld>
+  <p:clrMapOvr>
+    <a:masterClrMapping/>
+  </p:clrMapOvr>
+  <p:timing>
+    <p:tnLst>
+      <p:par>
+        <p:cTn id="1" dur="indefinite" restart="never" nodeType="tmRoot"/>
+      </p:par>
+    </p:tnLst>
+  </p:timing>
+</p:sld>
+</file>
+
+<file path=ppt/slides/slide6.xml><?xml version="1.0" encoding="utf-8"?>
 <p:sld xmlns:a="http://schemas.openxmlformats.org/drawingml/2006/main" xmlns:r="http://schemas.openxmlformats.org/officeDocument/2006/relationships" xmlns:p="http://schemas.openxmlformats.org/presentationml/2006/main">
   <p:cSld>
     <p:spTree>
@@ -5375,7 +6774,7 @@
 </p:sld>
 </file>
 
-<file path=ppt/slides/slide6.xml><?xml version="1.0" encoding="utf-8"?>
+<file path=ppt/slides/slide7.xml><?xml version="1.0" encoding="utf-8"?>
 <p:sld xmlns:a="http://schemas.openxmlformats.org/drawingml/2006/main" xmlns:r="http://schemas.openxmlformats.org/officeDocument/2006/relationships" xmlns:p="http://schemas.openxmlformats.org/presentationml/2006/main">
   <p:cSld>
     <p:spTree>
@@ -6647,9 +8046,9 @@
         <p:grpSpPr>
           <a:xfrm rot="567057">
             <a:off x="7704182" y="478741"/>
-            <a:ext cx="1259173" cy="1839316"/>
+            <a:ext cx="1259174" cy="1839316"/>
             <a:chOff x="5168900" y="1277816"/>
-            <a:chExt cx="1346201" cy="2201984"/>
+            <a:chExt cx="1346202" cy="2201984"/>
           </a:xfrm>
         </p:grpSpPr>
         <p:grpSp>
@@ -6661,9 +8060,9 @@
           <p:grpSpPr>
             <a:xfrm>
               <a:off x="5168900" y="1701800"/>
-              <a:ext cx="1346201" cy="1778000"/>
+              <a:ext cx="1346202" cy="1778000"/>
               <a:chOff x="5168900" y="1701800"/>
-              <a:chExt cx="1346201" cy="1778000"/>
+              <a:chExt cx="1346202" cy="1778000"/>
             </a:xfrm>
           </p:grpSpPr>
           <p:sp>
@@ -6725,8 +8124,8 @@
             </p:nvSpPr>
             <p:spPr>
               <a:xfrm>
-                <a:off x="5207001" y="2064586"/>
-                <a:ext cx="1308100" cy="1289619"/>
+                <a:off x="5207002" y="1990894"/>
+                <a:ext cx="1308100" cy="1437005"/>
               </a:xfrm>
               <a:prstGeom prst="rect">
                 <a:avLst/>
@@ -6837,12 +8236,16 @@
                   <a:t>df.createDuck</a:t>
                 </a:r>
                 <a:r>
-                  <a:rPr lang="en-IE" sz="800" dirty="0">
+                  <a:rPr lang="en-IE" sz="800" dirty="0" smtClean="0">
                     <a:latin typeface="Consolas" panose="020B0609020204030204" pitchFamily="49" charset="0"/>
                     <a:cs typeface="Consolas" panose="020B0609020204030204" pitchFamily="49" charset="0"/>
                   </a:rPr>
-                  <a:t>();</a:t>
+                  <a:t>(“hunting”);</a:t>
                 </a:r>
+                <a:endParaRPr lang="en-IE" sz="800" dirty="0">
+                  <a:latin typeface="Consolas" panose="020B0609020204030204" pitchFamily="49" charset="0"/>
+                  <a:cs typeface="Consolas" panose="020B0609020204030204" pitchFamily="49" charset="0"/>
+                </a:endParaRPr>
               </a:p>
               <a:p>
                 <a:endParaRPr lang="en-IE" sz="800" dirty="0"/>
@@ -6958,142 +8361,6 @@
 </p:sld>
 </file>
 
-<file path=ppt/slides/slide7.xml><?xml version="1.0" encoding="utf-8"?>
-<p:sld xmlns:a="http://schemas.openxmlformats.org/drawingml/2006/main" xmlns:r="http://schemas.openxmlformats.org/officeDocument/2006/relationships" xmlns:p="http://schemas.openxmlformats.org/presentationml/2006/main">
-  <p:cSld>
-    <p:spTree>
-      <p:nvGrpSpPr>
-        <p:cNvPr id="1" name=""/>
-        <p:cNvGrpSpPr/>
-        <p:nvPr/>
-      </p:nvGrpSpPr>
-      <p:grpSpPr>
-        <a:xfrm>
-          <a:off x="0" y="0"/>
-          <a:ext cx="0" cy="0"/>
-          <a:chOff x="0" y="0"/>
-          <a:chExt cx="0" cy="0"/>
-        </a:xfrm>
-      </p:grpSpPr>
-      <p:sp>
-        <p:nvSpPr>
-          <p:cNvPr id="2" name="Title 1"/>
-          <p:cNvSpPr>
-            <a:spLocks noGrp="1"/>
-          </p:cNvSpPr>
-          <p:nvPr>
-            <p:ph type="title"/>
-          </p:nvPr>
-        </p:nvSpPr>
-        <p:spPr>
-          <a:xfrm>
-            <a:off x="0" y="53961"/>
-            <a:ext cx="9144000" cy="613427"/>
-          </a:xfrm>
-        </p:spPr>
-        <p:txBody>
-          <a:bodyPr>
-            <a:normAutofit/>
-          </a:bodyPr>
-          <a:lstStyle/>
-          <a:p>
-            <a:r>
-              <a:rPr lang="en-IE" dirty="0" smtClean="0"/>
-              <a:t>05. What </a:t>
-            </a:r>
-            <a:r>
-              <a:rPr lang="en-IE" dirty="0"/>
-              <a:t>Are Factories</a:t>
-            </a:r>
-            <a:r>
-              <a:rPr lang="en-IE" dirty="0" smtClean="0"/>
-              <a:t>?</a:t>
-            </a:r>
-            <a:endParaRPr lang="en-IE" dirty="0"/>
-          </a:p>
-        </p:txBody>
-      </p:sp>
-      <p:sp>
-        <p:nvSpPr>
-          <p:cNvPr id="3" name="Content Placeholder 2"/>
-          <p:cNvSpPr>
-            <a:spLocks noGrp="1"/>
-          </p:cNvSpPr>
-          <p:nvPr>
-            <p:ph sz="quarter" idx="10"/>
-          </p:nvPr>
-        </p:nvSpPr>
-        <p:spPr>
-          <a:xfrm>
-            <a:off x="431800" y="889000"/>
-            <a:ext cx="8255000" cy="5054599"/>
-          </a:xfrm>
-        </p:spPr>
-        <p:txBody>
-          <a:bodyPr/>
-          <a:lstStyle/>
-          <a:p>
-            <a:pPr marL="0" indent="0">
-              <a:buNone/>
-            </a:pPr>
-            <a:r>
-              <a:rPr lang="en-IE" sz="2000" b="1" dirty="0" smtClean="0"/>
-              <a:t>What’s the Advantage of Putting this Code into a Factory Class…</a:t>
-            </a:r>
-          </a:p>
-          <a:p>
-            <a:pPr marL="0" indent="0">
-              <a:buNone/>
-            </a:pPr>
-            <a:endParaRPr lang="en-IE" sz="2000" b="1" dirty="0" smtClean="0"/>
-          </a:p>
-          <a:p>
-            <a:r>
-              <a:rPr lang="en-IE" sz="2000" dirty="0" smtClean="0"/>
-              <a:t>Supports multiple clients that require object instantiation.</a:t>
-            </a:r>
-          </a:p>
-          <a:p>
-            <a:endParaRPr lang="en-IE" sz="2000" dirty="0" smtClean="0"/>
-          </a:p>
-          <a:p>
-            <a:r>
-              <a:rPr lang="en-IE" sz="2000" dirty="0" smtClean="0"/>
-              <a:t>By encapsulating this code in a single class will mean there is only one place to make modifications in the future.</a:t>
-            </a:r>
-          </a:p>
-          <a:p>
-            <a:endParaRPr lang="en-IE" sz="2000" dirty="0"/>
-          </a:p>
-          <a:p>
-            <a:r>
-              <a:rPr lang="en-IE" sz="2000" dirty="0" smtClean="0"/>
-              <a:t>We can sub class our Factory Class to make other factories that will inherit all the behaviour of the parent class, with the benefit of being able to modified that behaviour.  This is an important feature of the Factory Patterns.</a:t>
-            </a:r>
-            <a:endParaRPr lang="en-IE" sz="2000" dirty="0"/>
-          </a:p>
-        </p:txBody>
-      </p:sp>
-    </p:spTree>
-    <p:extLst>
-      <p:ext uri="{BB962C8B-B14F-4D97-AF65-F5344CB8AC3E}">
-        <p14:creationId xmlns:p14="http://schemas.microsoft.com/office/powerpoint/2010/main" val="4032532923"/>
-      </p:ext>
-    </p:extLst>
-  </p:cSld>
-  <p:clrMapOvr>
-    <a:masterClrMapping/>
-  </p:clrMapOvr>
-  <p:timing>
-    <p:tnLst>
-      <p:par>
-        <p:cTn id="1" dur="indefinite" restart="never" nodeType="tmRoot"/>
-      </p:par>
-    </p:tnLst>
-  </p:timing>
-</p:sld>
-</file>
-
 <file path=ppt/slides/slide8.xml><?xml version="1.0" encoding="utf-8"?>
 <p:sld xmlns:a="http://schemas.openxmlformats.org/drawingml/2006/main" xmlns:r="http://schemas.openxmlformats.org/officeDocument/2006/relationships" xmlns:p="http://schemas.openxmlformats.org/presentationml/2006/main">
   <p:cSld>
@@ -7135,105 +8402,98 @@
           <a:p>
             <a:r>
               <a:rPr lang="en-IE" dirty="0" smtClean="0"/>
-              <a:t>The </a:t>
+              <a:t>05. What </a:t>
             </a:r>
             <a:r>
               <a:rPr lang="en-IE" dirty="0"/>
-              <a:t>Simple Factory (Not a Pattern)</a:t>
-            </a:r>
+              <a:t>Are Factories</a:t>
+            </a:r>
+            <a:r>
+              <a:rPr lang="en-IE" dirty="0" smtClean="0"/>
+              <a:t>?</a:t>
+            </a:r>
+            <a:endParaRPr lang="en-IE" dirty="0"/>
           </a:p>
         </p:txBody>
       </p:sp>
-      <p:pic>
-        <p:nvPicPr>
-          <p:cNvPr id="1026" name="Picture 2" title="Head First Design Patterns"/>
-          <p:cNvPicPr>
-            <a:picLocks noGrp="1" noChangeAspect="1" noChangeArrowheads="1"/>
-          </p:cNvPicPr>
+      <p:sp>
+        <p:nvSpPr>
+          <p:cNvPr id="3" name="Content Placeholder 2"/>
+          <p:cNvSpPr>
+            <a:spLocks noGrp="1"/>
+          </p:cNvSpPr>
           <p:nvPr>
             <p:ph sz="quarter" idx="10"/>
           </p:nvPr>
-        </p:nvPicPr>
-        <p:blipFill>
-          <a:blip r:embed="rId2">
-            <a:extLst>
-              <a:ext uri="{28A0092B-C50C-407E-A947-70E740481C1C}">
-                <a14:useLocalDpi xmlns:a14="http://schemas.microsoft.com/office/drawing/2010/main" val="0"/>
-              </a:ext>
-            </a:extLst>
-          </a:blip>
-          <a:srcRect/>
-          <a:stretch>
-            <a:fillRect/>
-          </a:stretch>
-        </p:blipFill>
-        <p:spPr bwMode="auto">
-          <a:xfrm>
-            <a:off x="815975" y="1044575"/>
-            <a:ext cx="7486650" cy="4743450"/>
-          </a:xfrm>
-          <a:prstGeom prst="rect">
-            <a:avLst/>
-          </a:prstGeom>
-          <a:noFill/>
-          <a:ln>
-            <a:noFill/>
-          </a:ln>
-          <a:extLst>
-            <a:ext uri="{909E8E84-426E-40DD-AFC4-6F175D3DCCD1}">
-              <a14:hiddenFill xmlns:a14="http://schemas.microsoft.com/office/drawing/2010/main">
-                <a:solidFill>
-                  <a:schemeClr val="accent1"/>
-                </a:solidFill>
-              </a14:hiddenFill>
-            </a:ext>
-            <a:ext uri="{91240B29-F687-4F45-9708-019B960494DF}">
-              <a14:hiddenLine xmlns:a14="http://schemas.microsoft.com/office/drawing/2010/main" w="9525">
-                <a:solidFill>
-                  <a:schemeClr val="tx1"/>
-                </a:solidFill>
-                <a:miter lim="800000"/>
-                <a:headEnd/>
-                <a:tailEnd/>
-              </a14:hiddenLine>
-            </a:ext>
-          </a:extLst>
-        </p:spPr>
-      </p:pic>
-      <p:sp>
-        <p:nvSpPr>
-          <p:cNvPr id="4" name="TextBox 3"/>
-          <p:cNvSpPr txBox="1"/>
-          <p:nvPr/>
         </p:nvSpPr>
         <p:spPr>
           <a:xfrm>
-            <a:off x="130175" y="683567"/>
-            <a:ext cx="2807307" cy="369332"/>
+            <a:off x="431800" y="889000"/>
+            <a:ext cx="8255000" cy="5054599"/>
           </a:xfrm>
-          <a:prstGeom prst="rect">
-            <a:avLst/>
-          </a:prstGeom>
-          <a:noFill/>
         </p:spPr>
         <p:txBody>
-          <a:bodyPr wrap="none" rtlCol="0">
-            <a:spAutoFit/>
-          </a:bodyPr>
+          <a:bodyPr/>
           <a:lstStyle/>
           <a:p>
-            <a:r>
-              <a:rPr lang="en-IE" sz="1800" b="1" dirty="0" smtClean="0"/>
-              <a:t>Head First : Design Patterns</a:t>
-            </a:r>
-            <a:endParaRPr lang="en-IE" sz="1800" b="1" dirty="0"/>
+            <a:pPr marL="0" indent="0">
+              <a:buNone/>
+            </a:pPr>
+            <a:r>
+              <a:rPr lang="en-IE" sz="2000" b="1" dirty="0" smtClean="0"/>
+              <a:t>What’s the Advantage of Putting this Code into a Factory Class…</a:t>
+            </a:r>
+          </a:p>
+          <a:p>
+            <a:pPr marL="0" indent="0">
+              <a:buNone/>
+            </a:pPr>
+            <a:endParaRPr lang="en-IE" sz="2000" b="1" dirty="0" smtClean="0"/>
+          </a:p>
+          <a:p>
+            <a:r>
+              <a:rPr lang="en-IE" sz="2000" dirty="0" smtClean="0"/>
+              <a:t>Supports multiple </a:t>
+            </a:r>
+            <a:r>
+              <a:rPr lang="en-IE" sz="2000" dirty="0" smtClean="0"/>
+              <a:t>clients.</a:t>
+            </a:r>
+            <a:endParaRPr lang="en-IE" sz="2000" dirty="0" smtClean="0"/>
+          </a:p>
+          <a:p>
+            <a:endParaRPr lang="en-IE" sz="2000" dirty="0" smtClean="0"/>
+          </a:p>
+          <a:p>
+            <a:r>
+              <a:rPr lang="en-IE" sz="2000" dirty="0" smtClean="0"/>
+              <a:t>By encapsulating this code in a single class will mean there is only one place to make modifications in the future.</a:t>
+            </a:r>
+          </a:p>
+          <a:p>
+            <a:endParaRPr lang="en-IE" sz="2000" dirty="0"/>
+          </a:p>
+          <a:p>
+            <a:r>
+              <a:rPr lang="en-IE" sz="2000" dirty="0" smtClean="0"/>
+              <a:t>We can sub class our Factory Class to make other factories that will inherit all the behaviour of the parent class, with the benefit of being able to modified that behaviour.  This is an important feature of </a:t>
+            </a:r>
+            <a:r>
+              <a:rPr lang="en-IE" sz="2000" dirty="0" smtClean="0"/>
+              <a:t>Factory </a:t>
+            </a:r>
+            <a:r>
+              <a:rPr lang="en-IE" sz="2000" dirty="0" smtClean="0"/>
+              <a:t>Patterns.</a:t>
+            </a:r>
+            <a:endParaRPr lang="en-IE" sz="2000" dirty="0"/>
           </a:p>
         </p:txBody>
       </p:sp>
     </p:spTree>
     <p:extLst>
       <p:ext uri="{BB962C8B-B14F-4D97-AF65-F5344CB8AC3E}">
-        <p14:creationId xmlns:p14="http://schemas.microsoft.com/office/powerpoint/2010/main" val="1665761436"/>
+        <p14:creationId xmlns:p14="http://schemas.microsoft.com/office/powerpoint/2010/main" val="4032532923"/>
       </p:ext>
     </p:extLst>
   </p:cSld>
@@ -7300,89 +8560,96 @@
           </a:p>
         </p:txBody>
       </p:sp>
-      <p:sp>
-        <p:nvSpPr>
-          <p:cNvPr id="3" name="Content Placeholder 2"/>
-          <p:cNvSpPr>
-            <a:spLocks noGrp="1"/>
-          </p:cNvSpPr>
+      <p:pic>
+        <p:nvPicPr>
+          <p:cNvPr id="1026" name="Picture 2" title="Head First Design Patterns"/>
+          <p:cNvPicPr>
+            <a:picLocks noGrp="1" noChangeAspect="1" noChangeArrowheads="1"/>
+          </p:cNvPicPr>
           <p:nvPr>
             <p:ph sz="quarter" idx="10"/>
           </p:nvPr>
+        </p:nvPicPr>
+        <p:blipFill>
+          <a:blip r:embed="rId2">
+            <a:extLst>
+              <a:ext uri="{28A0092B-C50C-407E-A947-70E740481C1C}">
+                <a14:useLocalDpi xmlns:a14="http://schemas.microsoft.com/office/drawing/2010/main" val="0"/>
+              </a:ext>
+            </a:extLst>
+          </a:blip>
+          <a:srcRect/>
+          <a:stretch>
+            <a:fillRect/>
+          </a:stretch>
+        </p:blipFill>
+        <p:spPr bwMode="auto">
+          <a:xfrm>
+            <a:off x="815975" y="1044575"/>
+            <a:ext cx="7486650" cy="4743450"/>
+          </a:xfrm>
+          <a:prstGeom prst="rect">
+            <a:avLst/>
+          </a:prstGeom>
+          <a:noFill/>
+          <a:ln>
+            <a:noFill/>
+          </a:ln>
+          <a:extLst>
+            <a:ext uri="{909E8E84-426E-40DD-AFC4-6F175D3DCCD1}">
+              <a14:hiddenFill xmlns:a14="http://schemas.microsoft.com/office/drawing/2010/main">
+                <a:solidFill>
+                  <a:schemeClr val="accent1"/>
+                </a:solidFill>
+              </a14:hiddenFill>
+            </a:ext>
+            <a:ext uri="{91240B29-F687-4F45-9708-019B960494DF}">
+              <a14:hiddenLine xmlns:a14="http://schemas.microsoft.com/office/drawing/2010/main" w="9525">
+                <a:solidFill>
+                  <a:schemeClr val="tx1"/>
+                </a:solidFill>
+                <a:miter lim="800000"/>
+                <a:headEnd/>
+                <a:tailEnd/>
+              </a14:hiddenLine>
+            </a:ext>
+          </a:extLst>
+        </p:spPr>
+      </p:pic>
+      <p:sp>
+        <p:nvSpPr>
+          <p:cNvPr id="4" name="TextBox 3"/>
+          <p:cNvSpPr txBox="1"/>
+          <p:nvPr/>
         </p:nvSpPr>
         <p:spPr>
           <a:xfrm>
-            <a:off x="130175" y="868232"/>
-            <a:ext cx="8861425" cy="5049967"/>
+            <a:off x="130175" y="683567"/>
+            <a:ext cx="2807307" cy="369332"/>
           </a:xfrm>
+          <a:prstGeom prst="rect">
+            <a:avLst/>
+          </a:prstGeom>
+          <a:noFill/>
         </p:spPr>
         <p:txBody>
-          <a:bodyPr/>
+          <a:bodyPr wrap="none" rtlCol="0">
+            <a:spAutoFit/>
+          </a:bodyPr>
           <a:lstStyle/>
           <a:p>
             <a:r>
-              <a:rPr lang="en-IE" sz="1900" dirty="0" smtClean="0"/>
-              <a:t>The simple factory is not considered to be a pattern, rather it is thought to be more of an programming idiom.</a:t>
-            </a:r>
-          </a:p>
-          <a:p>
-            <a:endParaRPr lang="en-IE" sz="1900" dirty="0"/>
-          </a:p>
-          <a:p>
-            <a:r>
-              <a:rPr lang="en-IE" sz="1900" dirty="0" smtClean="0"/>
-              <a:t>The main point separating the Simple Factory from the Factory Method Pattern (discussing that next!) is that the Simple Factory is a concrete class, and is not intended to be </a:t>
-            </a:r>
-            <a:r>
-              <a:rPr lang="en-IE" sz="1900" dirty="0" err="1" smtClean="0"/>
-              <a:t>subclassed</a:t>
-            </a:r>
-            <a:r>
-              <a:rPr lang="en-IE" sz="1900" dirty="0" smtClean="0"/>
-              <a:t>.   </a:t>
-            </a:r>
-          </a:p>
-          <a:p>
-            <a:endParaRPr lang="en-IE" sz="1900" dirty="0"/>
-          </a:p>
-          <a:p>
-            <a:r>
-              <a:rPr lang="en-IE" sz="1900" dirty="0" smtClean="0"/>
-              <a:t>In the Factory Method Pattern, a factory interface is declared with a </a:t>
-            </a:r>
-            <a:r>
-              <a:rPr lang="en-IE" sz="1900" dirty="0" err="1" smtClean="0"/>
-              <a:t>createMethod</a:t>
-            </a:r>
-            <a:r>
-              <a:rPr lang="en-IE" sz="1900" dirty="0" smtClean="0"/>
-              <a:t>() declaration.  A factory subclass implements the interface, and the decision making is implemented in the sub classes </a:t>
-            </a:r>
-            <a:r>
-              <a:rPr lang="en-IE" sz="1900" dirty="0" err="1" smtClean="0"/>
-              <a:t>createMethod</a:t>
-            </a:r>
-            <a:r>
-              <a:rPr lang="en-IE" sz="1900" dirty="0" smtClean="0"/>
-              <a:t>().</a:t>
-            </a:r>
-          </a:p>
-          <a:p>
-            <a:endParaRPr lang="en-IE" sz="1900" dirty="0"/>
-          </a:p>
-          <a:p>
-            <a:r>
-              <a:rPr lang="en-IE" sz="1900" dirty="0" smtClean="0"/>
-              <a:t>The Factory Method Pattern is therefore a framework, and allows different subclasses to create different groups of objects.  So while the Simple Factory appears very similar to the Factory Method Pattern, it does not have this flexibility.  Transitioning from the Simple Factory to the Factory Method should be relatively easy.</a:t>
-            </a:r>
-            <a:endParaRPr lang="en-IE" sz="1900" dirty="0"/>
+              <a:rPr lang="en-IE" sz="1800" b="1" dirty="0" smtClean="0"/>
+              <a:t>Head First : Design Patterns</a:t>
+            </a:r>
+            <a:endParaRPr lang="en-IE" sz="1800" b="1" dirty="0"/>
           </a:p>
         </p:txBody>
       </p:sp>
     </p:spTree>
     <p:extLst>
       <p:ext uri="{BB962C8B-B14F-4D97-AF65-F5344CB8AC3E}">
-        <p14:creationId xmlns:p14="http://schemas.microsoft.com/office/powerpoint/2010/main" val="2662116496"/>
+        <p14:creationId xmlns:p14="http://schemas.microsoft.com/office/powerpoint/2010/main" val="1665761436"/>
       </p:ext>
     </p:extLst>
   </p:cSld>

</xml_diff>